<commit_message>
Added pictures and some text
</commit_message>
<xml_diff>
--- a/Documentation/UnityGameRequirementsPPT.pptx
+++ b/Documentation/UnityGameRequirementsPPT.pptx
@@ -5,7 +5,7 @@
     <p:sldMasterId id="2147483648" r:id="rId1"/>
   </p:sldMasterIdLst>
   <p:handoutMasterIdLst>
-    <p:handoutMasterId r:id="rId12"/>
+    <p:handoutMasterId r:id="rId13"/>
   </p:handoutMasterIdLst>
   <p:sldIdLst>
     <p:sldId id="256" r:id="rId2"/>
@@ -17,7 +17,8 @@
     <p:sldId id="269" r:id="rId8"/>
     <p:sldId id="270" r:id="rId9"/>
     <p:sldId id="271" r:id="rId10"/>
-    <p:sldId id="272" r:id="rId11"/>
+    <p:sldId id="273" r:id="rId11"/>
+    <p:sldId id="272" r:id="rId12"/>
   </p:sldIdLst>
   <p:sldSz cx="12192000" cy="6858000"/>
   <p:notesSz cx="9312275" cy="6858000"/>
@@ -218,7 +219,7 @@
           <a:p>
             <a:fld id="{36F12CB1-DABA-4CBD-967D-6A1DEAF14A26}" type="datetimeFigureOut">
               <a:rPr lang="en-US" smtClean="0"/>
-              <a:t>2/12/2015</a:t>
+              <a:t>2/16/2015</a:t>
             </a:fld>
             <a:endParaRPr lang="en-US"/>
           </a:p>
@@ -527,7 +528,7 @@
           <a:p>
             <a:fld id="{4BDF68E2-58F2-4D09-BE8B-E3BD06533059}" type="datetimeFigureOut">
               <a:rPr lang="en-US" dirty="0"/>
-              <a:t>2/12/2015</a:t>
+              <a:t>2/16/2015</a:t>
             </a:fld>
             <a:endParaRPr lang="en-US" dirty="0"/>
           </a:p>
@@ -730,7 +731,7 @@
           <a:p>
             <a:fld id="{2E2D6473-DF6D-4702-B328-E0DD40540A4E}" type="datetimeFigureOut">
               <a:rPr lang="en-US" dirty="0"/>
-              <a:t>2/12/2015</a:t>
+              <a:t>2/16/2015</a:t>
             </a:fld>
             <a:endParaRPr lang="en-US" dirty="0"/>
           </a:p>
@@ -981,7 +982,7 @@
           <a:p>
             <a:fld id="{E26F7E3A-B166-407D-9866-32884E7D5B37}" type="datetimeFigureOut">
               <a:rPr lang="en-US" dirty="0"/>
-              <a:t>2/12/2015</a:t>
+              <a:t>2/16/2015</a:t>
             </a:fld>
             <a:endParaRPr lang="en-US" dirty="0"/>
           </a:p>
@@ -1150,7 +1151,7 @@
           <a:p>
             <a:fld id="{528FC5F6-F338-4AE4-BB23-26385BCFC423}" type="datetimeFigureOut">
               <a:rPr lang="en-US" dirty="0"/>
-              <a:t>2/12/2015</a:t>
+              <a:t>2/16/2015</a:t>
             </a:fld>
             <a:endParaRPr lang="en-US" dirty="0"/>
           </a:p>
@@ -1488,7 +1489,7 @@
           <a:p>
             <a:fld id="{20EBB0C4-6273-4C6E-B9BD-2EDC30F1CD52}" type="datetimeFigureOut">
               <a:rPr lang="en-US" dirty="0"/>
-              <a:t>2/12/2015</a:t>
+              <a:t>2/16/2015</a:t>
             </a:fld>
             <a:endParaRPr lang="en-US" dirty="0"/>
           </a:p>
@@ -1758,7 +1759,7 @@
           <a:p>
             <a:fld id="{19AB4D41-86C1-4908-B66A-0B50CEB3BF29}" type="datetimeFigureOut">
               <a:rPr lang="en-US" dirty="0"/>
-              <a:t>2/12/2015</a:t>
+              <a:t>2/16/2015</a:t>
             </a:fld>
             <a:endParaRPr lang="en-US" dirty="0"/>
           </a:p>
@@ -2132,7 +2133,7 @@
           <a:p>
             <a:fld id="{E6426E2C-56C1-4E0D-A793-0088A7FDD37E}" type="datetimeFigureOut">
               <a:rPr lang="en-US" dirty="0"/>
-              <a:t>2/12/2015</a:t>
+              <a:t>2/16/2015</a:t>
             </a:fld>
             <a:endParaRPr lang="en-US" dirty="0"/>
           </a:p>
@@ -2245,7 +2246,7 @@
           <a:p>
             <a:fld id="{C8C39B41-D8B5-4052-B551-9B5525EAA8B6}" type="datetimeFigureOut">
               <a:rPr lang="en-US" dirty="0"/>
-              <a:t>2/12/2015</a:t>
+              <a:t>2/16/2015</a:t>
             </a:fld>
             <a:endParaRPr lang="en-US" dirty="0"/>
           </a:p>
@@ -2411,7 +2412,7 @@
           <a:p>
             <a:fld id="{4D94136C-8742-45B2-AF27-D93DF72833A9}" type="datetimeFigureOut">
               <a:rPr lang="en-US" dirty="0"/>
-              <a:t>2/12/2015</a:t>
+              <a:t>2/16/2015</a:t>
             </a:fld>
             <a:endParaRPr lang="en-US" dirty="0"/>
           </a:p>
@@ -2761,7 +2762,7 @@
           <a:p>
             <a:fld id="{32ABBEA6-7C60-4B02-AE87-00D78D8422AF}" type="datetimeFigureOut">
               <a:rPr lang="en-US" dirty="0"/>
-              <a:t>2/12/2015</a:t>
+              <a:t>2/16/2015</a:t>
             </a:fld>
             <a:endParaRPr lang="en-US" dirty="0"/>
           </a:p>
@@ -3139,7 +3140,7 @@
           <a:p>
             <a:fld id="{C9CAD897-D46E-4AD2-BD9B-49DD3E640873}" type="datetimeFigureOut">
               <a:rPr lang="en-US" dirty="0"/>
-              <a:t>2/12/2015</a:t>
+              <a:t>2/16/2015</a:t>
             </a:fld>
             <a:endParaRPr lang="en-US" dirty="0"/>
           </a:p>
@@ -3421,7 +3422,7 @@
           <a:p>
             <a:fld id="{98624D31-43A5-475A-80CF-332C9F6DCF35}" type="datetimeFigureOut">
               <a:rPr lang="en-US" dirty="0"/>
-              <a:t>2/12/2015</a:t>
+              <a:t>2/16/2015</a:t>
             </a:fld>
             <a:endParaRPr lang="en-US" dirty="0"/>
           </a:p>
@@ -3961,10 +3962,6 @@
               <a:rPr lang="en-US" dirty="0" smtClean="0"/>
               <a:t>Unity Game </a:t>
             </a:r>
-            <a:r>
-              <a:rPr lang="en-US" dirty="0" smtClean="0"/>
-              <a:t/>
-            </a:r>
             <a:br>
               <a:rPr lang="en-US" dirty="0" smtClean="0"/>
             </a:br>
@@ -4007,6 +4004,49 @@
           </a:p>
         </p:txBody>
       </p:sp>
+      <p:pic>
+        <p:nvPicPr>
+          <p:cNvPr id="4" name="Picture 3"/>
+          <p:cNvPicPr>
+            <a:picLocks noChangeAspect="1"/>
+          </p:cNvPicPr>
+          <p:nvPr/>
+        </p:nvPicPr>
+        <p:blipFill>
+          <a:blip r:embed="rId2">
+            <a:extLst>
+              <a:ext uri="{28A0092B-C50C-407E-A947-70E740481C1C}">
+                <a14:useLocalDpi xmlns:a14="http://schemas.microsoft.com/office/drawing/2010/main" val="0"/>
+              </a:ext>
+            </a:extLst>
+          </a:blip>
+          <a:stretch>
+            <a:fillRect/>
+          </a:stretch>
+        </p:blipFill>
+        <p:spPr>
+          <a:xfrm>
+            <a:off x="9172483" y="912793"/>
+            <a:ext cx="2066040" cy="3285751"/>
+          </a:xfrm>
+          <a:prstGeom prst="roundRect">
+            <a:avLst>
+              <a:gd name="adj" fmla="val 8594"/>
+            </a:avLst>
+          </a:prstGeom>
+          <a:solidFill>
+            <a:srgbClr val="FFFFFF">
+              <a:shade val="85000"/>
+            </a:srgbClr>
+          </a:solidFill>
+          <a:ln>
+            <a:noFill/>
+          </a:ln>
+          <a:effectLst>
+            <a:reflection blurRad="12700" stA="38000" endPos="28000" dist="5000" dir="5400000" sy="-100000" algn="bl" rotWithShape="0"/>
+          </a:effectLst>
+        </p:spPr>
+      </p:pic>
     </p:spTree>
     <p:extLst>
       <p:ext uri="{BB962C8B-B14F-4D97-AF65-F5344CB8AC3E}">
@@ -4044,6 +4084,180 @@
           <a:chExt cx="0" cy="0"/>
         </a:xfrm>
       </p:grpSpPr>
+      <p:pic>
+        <p:nvPicPr>
+          <p:cNvPr id="4" name="Picture 3"/>
+          <p:cNvPicPr>
+            <a:picLocks noChangeAspect="1"/>
+          </p:cNvPicPr>
+          <p:nvPr/>
+        </p:nvPicPr>
+        <p:blipFill>
+          <a:blip r:embed="rId2">
+            <a:extLst>
+              <a:ext uri="{28A0092B-C50C-407E-A947-70E740481C1C}">
+                <a14:useLocalDpi xmlns:a14="http://schemas.microsoft.com/office/drawing/2010/main" val="0"/>
+              </a:ext>
+            </a:extLst>
+          </a:blip>
+          <a:stretch>
+            <a:fillRect/>
+          </a:stretch>
+        </p:blipFill>
+        <p:spPr>
+          <a:xfrm>
+            <a:off x="5462954" y="304767"/>
+            <a:ext cx="5080000" cy="6142567"/>
+          </a:xfrm>
+          <a:prstGeom prst="roundRect">
+            <a:avLst>
+              <a:gd name="adj" fmla="val 8594"/>
+            </a:avLst>
+          </a:prstGeom>
+          <a:solidFill>
+            <a:srgbClr val="FFFFFF">
+              <a:shade val="85000"/>
+            </a:srgbClr>
+          </a:solidFill>
+          <a:ln>
+            <a:noFill/>
+          </a:ln>
+          <a:effectLst>
+            <a:reflection blurRad="12700" stA="38000" endPos="28000" dist="5000" dir="5400000" sy="-100000" algn="bl" rotWithShape="0"/>
+          </a:effectLst>
+        </p:spPr>
+      </p:pic>
+      <p:sp>
+        <p:nvSpPr>
+          <p:cNvPr id="5" name="Title 4"/>
+          <p:cNvSpPr>
+            <a:spLocks noGrp="1"/>
+          </p:cNvSpPr>
+          <p:nvPr>
+            <p:ph type="title"/>
+          </p:nvPr>
+        </p:nvSpPr>
+        <p:spPr>
+          <a:xfrm>
+            <a:off x="457200" y="594359"/>
+            <a:ext cx="3200400" cy="749887"/>
+          </a:xfrm>
+        </p:spPr>
+        <p:txBody>
+          <a:bodyPr>
+            <a:normAutofit/>
+          </a:bodyPr>
+          <a:lstStyle/>
+          <a:p>
+            <a:pPr algn="ctr"/>
+            <a:r>
+              <a:rPr lang="en-US" sz="4800" dirty="0" smtClean="0"/>
+              <a:t>The Island</a:t>
+            </a:r>
+            <a:endParaRPr lang="en-US" sz="4800" dirty="0"/>
+          </a:p>
+        </p:txBody>
+      </p:sp>
+      <p:sp>
+        <p:nvSpPr>
+          <p:cNvPr id="7" name="Text Placeholder 6"/>
+          <p:cNvSpPr>
+            <a:spLocks noGrp="1"/>
+          </p:cNvSpPr>
+          <p:nvPr>
+            <p:ph type="body" sz="half" idx="2"/>
+          </p:nvPr>
+        </p:nvSpPr>
+        <p:spPr>
+          <a:xfrm>
+            <a:off x="457200" y="1414585"/>
+            <a:ext cx="3200400" cy="4890619"/>
+          </a:xfrm>
+        </p:spPr>
+        <p:txBody>
+          <a:bodyPr>
+            <a:normAutofit/>
+          </a:bodyPr>
+          <a:lstStyle/>
+          <a:p>
+            <a:pPr marL="457200" indent="-457200">
+              <a:buFont typeface="Wingdings" panose="05000000000000000000" pitchFamily="2" charset="2"/>
+              <a:buChar char="q"/>
+            </a:pPr>
+            <a:r>
+              <a:rPr lang="en-US" sz="2800" dirty="0" smtClean="0"/>
+              <a:t>Player start/end point</a:t>
+            </a:r>
+          </a:p>
+          <a:p>
+            <a:pPr marL="457200" indent="-457200">
+              <a:buFont typeface="Wingdings" panose="05000000000000000000" pitchFamily="2" charset="2"/>
+              <a:buChar char="q"/>
+            </a:pPr>
+            <a:r>
+              <a:rPr lang="en-US" sz="2800" dirty="0" smtClean="0"/>
+              <a:t>Enemy spawn locations</a:t>
+            </a:r>
+          </a:p>
+          <a:p>
+            <a:pPr marL="457200" indent="-457200">
+              <a:buFont typeface="Wingdings" panose="05000000000000000000" pitchFamily="2" charset="2"/>
+              <a:buChar char="q"/>
+            </a:pPr>
+            <a:r>
+              <a:rPr lang="en-US" sz="2800" dirty="0" smtClean="0"/>
+              <a:t>Obstacles</a:t>
+            </a:r>
+          </a:p>
+          <a:p>
+            <a:pPr marL="457200" indent="-457200">
+              <a:buFont typeface="Wingdings" panose="05000000000000000000" pitchFamily="2" charset="2"/>
+              <a:buChar char="q"/>
+            </a:pPr>
+            <a:r>
+              <a:rPr lang="en-US" sz="2800" dirty="0" smtClean="0"/>
+              <a:t>Different terrains</a:t>
+            </a:r>
+          </a:p>
+        </p:txBody>
+      </p:sp>
+    </p:spTree>
+    <p:extLst>
+      <p:ext uri="{BB962C8B-B14F-4D97-AF65-F5344CB8AC3E}">
+        <p14:creationId xmlns:p14="http://schemas.microsoft.com/office/powerpoint/2010/main" val="2279057902"/>
+      </p:ext>
+    </p:extLst>
+  </p:cSld>
+  <p:clrMapOvr>
+    <a:masterClrMapping/>
+  </p:clrMapOvr>
+  <p:timing>
+    <p:tnLst>
+      <p:par>
+        <p:cTn id="1" dur="indefinite" restart="never" nodeType="tmRoot"/>
+      </p:par>
+    </p:tnLst>
+  </p:timing>
+</p:sld>
+</file>
+
+<file path=ppt/slides/slide11.xml><?xml version="1.0" encoding="utf-8"?>
+<p:sld xmlns:a="http://schemas.openxmlformats.org/drawingml/2006/main" xmlns:r="http://schemas.openxmlformats.org/officeDocument/2006/relationships" xmlns:p="http://schemas.openxmlformats.org/presentationml/2006/main">
+  <p:cSld>
+    <p:spTree>
+      <p:nvGrpSpPr>
+        <p:cNvPr id="1" name=""/>
+        <p:cNvGrpSpPr/>
+        <p:nvPr/>
+      </p:nvGrpSpPr>
+      <p:grpSpPr>
+        <a:xfrm>
+          <a:off x="0" y="0"/>
+          <a:ext cx="0" cy="0"/>
+          <a:chOff x="0" y="0"/>
+          <a:chExt cx="0" cy="0"/>
+        </a:xfrm>
+      </p:grpSpPr>
       <p:sp>
         <p:nvSpPr>
           <p:cNvPr id="2" name="Title 1"/>
@@ -4079,13 +4293,102 @@
         </p:nvSpPr>
         <p:spPr/>
         <p:txBody>
-          <a:bodyPr/>
-          <a:lstStyle/>
-          <a:p>
-            <a:endParaRPr lang="en-US"/>
-          </a:p>
-        </p:txBody>
-      </p:sp>
+          <a:bodyPr>
+            <a:normAutofit/>
+          </a:bodyPr>
+          <a:lstStyle/>
+          <a:p>
+            <a:pPr>
+              <a:buFont typeface="Courier New" panose="02070309020205020404" pitchFamily="49" charset="0"/>
+              <a:buChar char="o"/>
+            </a:pPr>
+            <a:r>
+              <a:rPr lang="en-US" sz="2800" dirty="0" smtClean="0"/>
+              <a:t>Game Startup</a:t>
+            </a:r>
+          </a:p>
+          <a:p>
+            <a:pPr lvl="1">
+              <a:buFont typeface="Courier New" panose="02070309020205020404" pitchFamily="49" charset="0"/>
+              <a:buChar char="o"/>
+            </a:pPr>
+            <a:r>
+              <a:rPr lang="en-US" sz="2800" dirty="0" smtClean="0"/>
+              <a:t>Main-Screen/Game loading times</a:t>
+            </a:r>
+          </a:p>
+          <a:p>
+            <a:pPr>
+              <a:buFont typeface="Courier New" panose="02070309020205020404" pitchFamily="49" charset="0"/>
+              <a:buChar char="o"/>
+            </a:pPr>
+            <a:r>
+              <a:rPr lang="en-US" sz="2800" dirty="0" smtClean="0"/>
+              <a:t>In-Game Mechanics</a:t>
+            </a:r>
+          </a:p>
+          <a:p>
+            <a:pPr lvl="1">
+              <a:buFont typeface="Courier New" panose="02070309020205020404" pitchFamily="49" charset="0"/>
+              <a:buChar char="o"/>
+            </a:pPr>
+            <a:r>
+              <a:rPr lang="en-US" sz="2800" dirty="0" smtClean="0"/>
+              <a:t>Character reaction from damage sources</a:t>
+            </a:r>
+          </a:p>
+          <a:p>
+            <a:pPr lvl="1">
+              <a:buFont typeface="Courier New" panose="02070309020205020404" pitchFamily="49" charset="0"/>
+              <a:buChar char="o"/>
+            </a:pPr>
+            <a:r>
+              <a:rPr lang="en-US" sz="2800" dirty="0" smtClean="0"/>
+              <a:t>Character death</a:t>
+            </a:r>
+          </a:p>
+          <a:p>
+            <a:pPr lvl="1">
+              <a:buFont typeface="Courier New" panose="02070309020205020404" pitchFamily="49" charset="0"/>
+              <a:buChar char="o"/>
+            </a:pPr>
+            <a:r>
+              <a:rPr lang="en-US" sz="2800" dirty="0" smtClean="0"/>
+              <a:t>Triggered In-game events</a:t>
+            </a:r>
+          </a:p>
+        </p:txBody>
+      </p:sp>
+      <p:pic>
+        <p:nvPicPr>
+          <p:cNvPr id="5" name="Picture 4"/>
+          <p:cNvPicPr>
+            <a:picLocks noChangeAspect="1"/>
+          </p:cNvPicPr>
+          <p:nvPr/>
+        </p:nvPicPr>
+        <p:blipFill>
+          <a:blip r:embed="rId2">
+            <a:extLst>
+              <a:ext uri="{28A0092B-C50C-407E-A947-70E740481C1C}">
+                <a14:useLocalDpi xmlns:a14="http://schemas.microsoft.com/office/drawing/2010/main" val="0"/>
+              </a:ext>
+            </a:extLst>
+          </a:blip>
+          <a:stretch>
+            <a:fillRect/>
+          </a:stretch>
+        </p:blipFill>
+        <p:spPr>
+          <a:xfrm>
+            <a:off x="7873619" y="2103457"/>
+            <a:ext cx="1962424" cy="3229426"/>
+          </a:xfrm>
+          <a:prstGeom prst="rect">
+            <a:avLst/>
+          </a:prstGeom>
+        </p:spPr>
+      </p:pic>
     </p:spTree>
     <p:extLst>
       <p:ext uri="{BB962C8B-B14F-4D97-AF65-F5344CB8AC3E}">
@@ -4096,6 +4399,13 @@
   <p:clrMapOvr>
     <a:masterClrMapping/>
   </p:clrMapOvr>
+  <p:timing>
+    <p:tnLst>
+      <p:par>
+        <p:cTn id="1" dur="indefinite" restart="never" nodeType="tmRoot"/>
+      </p:par>
+    </p:tnLst>
+  </p:timing>
 </p:sld>
 </file>
 
@@ -4168,6 +4478,13 @@
   <p:clrMapOvr>
     <a:masterClrMapping/>
   </p:clrMapOvr>
+  <p:timing>
+    <p:tnLst>
+      <p:par>
+        <p:cTn id="1" dur="indefinite" restart="never" nodeType="tmRoot"/>
+      </p:par>
+    </p:tnLst>
+  </p:timing>
 </p:sld>
 </file>
 
@@ -4223,13 +4540,117 @@
         </p:nvSpPr>
         <p:spPr/>
         <p:txBody>
-          <a:bodyPr/>
-          <a:lstStyle/>
-          <a:p>
-            <a:endParaRPr lang="en-US"/>
-          </a:p>
-        </p:txBody>
-      </p:sp>
+          <a:bodyPr>
+            <a:normAutofit/>
+          </a:bodyPr>
+          <a:lstStyle/>
+          <a:p>
+            <a:pPr>
+              <a:buFont typeface="Courier New" panose="02070309020205020404" pitchFamily="49" charset="0"/>
+              <a:buChar char="o"/>
+            </a:pPr>
+            <a:r>
+              <a:rPr lang="en-US" sz="2800" dirty="0" smtClean="0"/>
+              <a:t>Standalone, offline video game for the PC.</a:t>
+            </a:r>
+            <a:endParaRPr lang="en-US" sz="2800" dirty="0"/>
+          </a:p>
+          <a:p>
+            <a:pPr>
+              <a:buFont typeface="Courier New" panose="02070309020205020404" pitchFamily="49" charset="0"/>
+              <a:buChar char="o"/>
+            </a:pPr>
+            <a:r>
+              <a:rPr lang="en-US" sz="2800" dirty="0" smtClean="0"/>
+              <a:t>Every player is different.</a:t>
+            </a:r>
+          </a:p>
+          <a:p>
+            <a:pPr>
+              <a:buFont typeface="Courier New" panose="02070309020205020404" pitchFamily="49" charset="0"/>
+              <a:buChar char="o"/>
+            </a:pPr>
+            <a:r>
+              <a:rPr lang="en-US" sz="2800" dirty="0" smtClean="0"/>
+              <a:t>Demo guides players through basic fundamentals of gameplay</a:t>
+            </a:r>
+            <a:endParaRPr lang="en-US" sz="2800" dirty="0"/>
+          </a:p>
+        </p:txBody>
+      </p:sp>
+      <p:pic>
+        <p:nvPicPr>
+          <p:cNvPr id="5" name="Picture 4"/>
+          <p:cNvPicPr>
+            <a:picLocks noChangeAspect="1"/>
+          </p:cNvPicPr>
+          <p:nvPr/>
+        </p:nvPicPr>
+        <p:blipFill>
+          <a:blip r:embed="rId2">
+            <a:extLst>
+              <a:ext uri="{28A0092B-C50C-407E-A947-70E740481C1C}">
+                <a14:useLocalDpi xmlns:a14="http://schemas.microsoft.com/office/drawing/2010/main" val="0"/>
+              </a:ext>
+            </a:extLst>
+          </a:blip>
+          <a:stretch>
+            <a:fillRect/>
+          </a:stretch>
+        </p:blipFill>
+        <p:spPr>
+          <a:xfrm>
+            <a:off x="1813706" y="3579445"/>
+            <a:ext cx="2555094" cy="2747127"/>
+          </a:xfrm>
+          <a:prstGeom prst="roundRect">
+            <a:avLst>
+              <a:gd name="adj" fmla="val 8594"/>
+            </a:avLst>
+          </a:prstGeom>
+          <a:solidFill>
+            <a:srgbClr val="FFFFFF">
+              <a:shade val="85000"/>
+            </a:srgbClr>
+          </a:solidFill>
+          <a:ln>
+            <a:noFill/>
+          </a:ln>
+          <a:effectLst>
+            <a:reflection blurRad="12700" stA="38000" endPos="28000" dist="5000" dir="5400000" sy="-100000" algn="bl" rotWithShape="0"/>
+          </a:effectLst>
+        </p:spPr>
+      </p:pic>
+      <p:pic>
+        <p:nvPicPr>
+          <p:cNvPr id="6" name="Picture 5"/>
+          <p:cNvPicPr>
+            <a:picLocks noChangeAspect="1"/>
+          </p:cNvPicPr>
+          <p:nvPr/>
+        </p:nvPicPr>
+        <p:blipFill>
+          <a:blip r:embed="rId3">
+            <a:extLst>
+              <a:ext uri="{28A0092B-C50C-407E-A947-70E740481C1C}">
+                <a14:useLocalDpi xmlns:a14="http://schemas.microsoft.com/office/drawing/2010/main" val="0"/>
+              </a:ext>
+            </a:extLst>
+          </a:blip>
+          <a:stretch>
+            <a:fillRect/>
+          </a:stretch>
+        </p:blipFill>
+        <p:spPr>
+          <a:xfrm>
+            <a:off x="9801114" y="286603"/>
+            <a:ext cx="1288917" cy="1325638"/>
+          </a:xfrm>
+          <a:prstGeom prst="rect">
+            <a:avLst/>
+          </a:prstGeom>
+        </p:spPr>
+      </p:pic>
     </p:spTree>
     <p:extLst>
       <p:ext uri="{BB962C8B-B14F-4D97-AF65-F5344CB8AC3E}">
@@ -4240,6 +4661,13 @@
   <p:clrMapOvr>
     <a:masterClrMapping/>
   </p:clrMapOvr>
+  <p:timing>
+    <p:tnLst>
+      <p:par>
+        <p:cTn id="1" dur="indefinite" restart="never" nodeType="tmRoot"/>
+      </p:par>
+    </p:tnLst>
+  </p:timing>
 </p:sld>
 </file>
 
@@ -4298,7 +4726,7 @@
           <a:bodyPr/>
           <a:lstStyle/>
           <a:p>
-            <a:endParaRPr lang="en-US"/>
+            <a:endParaRPr lang="en-US" dirty="0"/>
           </a:p>
         </p:txBody>
       </p:sp>
@@ -4312,6 +4740,13 @@
   <p:clrMapOvr>
     <a:masterClrMapping/>
   </p:clrMapOvr>
+  <p:timing>
+    <p:tnLst>
+      <p:par>
+        <p:cTn id="1" dur="indefinite" restart="never" nodeType="tmRoot"/>
+      </p:par>
+    </p:tnLst>
+  </p:timing>
 </p:sld>
 </file>
 
@@ -4367,13 +4802,171 @@
         </p:nvSpPr>
         <p:spPr/>
         <p:txBody>
-          <a:bodyPr/>
-          <a:lstStyle/>
-          <a:p>
-            <a:endParaRPr lang="en-US"/>
-          </a:p>
-        </p:txBody>
-      </p:sp>
+          <a:bodyPr>
+            <a:normAutofit lnSpcReduction="10000"/>
+          </a:bodyPr>
+          <a:lstStyle/>
+          <a:p>
+            <a:pPr>
+              <a:buFont typeface="Courier New" panose="02070309020205020404" pitchFamily="49" charset="0"/>
+              <a:buChar char="o"/>
+            </a:pPr>
+            <a:r>
+              <a:rPr lang="en-US" dirty="0" smtClean="0"/>
+              <a:t>Environment</a:t>
+            </a:r>
+          </a:p>
+          <a:p>
+            <a:pPr lvl="1">
+              <a:buFont typeface="Courier New" panose="02070309020205020404" pitchFamily="49" charset="0"/>
+              <a:buChar char="o"/>
+            </a:pPr>
+            <a:r>
+              <a:rPr lang="en-US" sz="2000" dirty="0" smtClean="0"/>
+              <a:t>Obstacles and puzzles</a:t>
+            </a:r>
+          </a:p>
+          <a:p>
+            <a:pPr lvl="1">
+              <a:buFont typeface="Courier New" panose="02070309020205020404" pitchFamily="49" charset="0"/>
+              <a:buChar char="o"/>
+            </a:pPr>
+            <a:r>
+              <a:rPr lang="en-US" sz="2000" dirty="0" smtClean="0"/>
+              <a:t>Island can be explored to find helpful items</a:t>
+            </a:r>
+          </a:p>
+          <a:p>
+            <a:pPr lvl="1">
+              <a:buFont typeface="Courier New" panose="02070309020205020404" pitchFamily="49" charset="0"/>
+              <a:buChar char="o"/>
+            </a:pPr>
+            <a:r>
+              <a:rPr lang="en-US" sz="2000" dirty="0" smtClean="0"/>
+              <a:t>Day &amp; night cycle with music</a:t>
+            </a:r>
+            <a:endParaRPr lang="en-US" sz="2000" dirty="0"/>
+          </a:p>
+          <a:p>
+            <a:pPr>
+              <a:buFont typeface="Courier New" panose="02070309020205020404" pitchFamily="49" charset="0"/>
+              <a:buChar char="o"/>
+            </a:pPr>
+            <a:r>
+              <a:rPr lang="en-US" dirty="0" smtClean="0"/>
+              <a:t>Characters</a:t>
+            </a:r>
+          </a:p>
+          <a:p>
+            <a:pPr lvl="1">
+              <a:buFont typeface="Courier New" panose="02070309020205020404" pitchFamily="49" charset="0"/>
+              <a:buChar char="o"/>
+            </a:pPr>
+            <a:r>
+              <a:rPr lang="en-US" sz="2000" dirty="0" smtClean="0"/>
+              <a:t>Player character</a:t>
+            </a:r>
+          </a:p>
+          <a:p>
+            <a:pPr lvl="1">
+              <a:buFont typeface="Courier New" panose="02070309020205020404" pitchFamily="49" charset="0"/>
+              <a:buChar char="o"/>
+            </a:pPr>
+            <a:r>
+              <a:rPr lang="en-US" sz="2000" dirty="0" smtClean="0"/>
+              <a:t>Friendly NPC</a:t>
+            </a:r>
+          </a:p>
+          <a:p>
+            <a:pPr lvl="1">
+              <a:buFont typeface="Courier New" panose="02070309020205020404" pitchFamily="49" charset="0"/>
+              <a:buChar char="o"/>
+            </a:pPr>
+            <a:r>
+              <a:rPr lang="en-US" sz="2000" dirty="0" smtClean="0"/>
+              <a:t>Enemy NPCs</a:t>
+            </a:r>
+            <a:endParaRPr lang="en-US" sz="2000" dirty="0"/>
+          </a:p>
+          <a:p>
+            <a:pPr>
+              <a:buFont typeface="Courier New" panose="02070309020205020404" pitchFamily="49" charset="0"/>
+              <a:buChar char="o"/>
+            </a:pPr>
+            <a:r>
+              <a:rPr lang="en-US" dirty="0" smtClean="0"/>
+              <a:t>User Interface</a:t>
+            </a:r>
+          </a:p>
+          <a:p>
+            <a:pPr lvl="1">
+              <a:buFont typeface="Courier New" panose="02070309020205020404" pitchFamily="49" charset="0"/>
+              <a:buChar char="o"/>
+            </a:pPr>
+            <a:r>
+              <a:rPr lang="en-US" sz="2000" dirty="0" smtClean="0"/>
+              <a:t>Minimalist</a:t>
+            </a:r>
+          </a:p>
+          <a:p>
+            <a:pPr lvl="1">
+              <a:buFont typeface="Courier New" panose="02070309020205020404" pitchFamily="49" charset="0"/>
+              <a:buChar char="o"/>
+            </a:pPr>
+            <a:r>
+              <a:rPr lang="en-US" sz="2000" dirty="0" smtClean="0"/>
+              <a:t>In-game pause</a:t>
+            </a:r>
+            <a:endParaRPr lang="en-US" sz="2000" dirty="0"/>
+          </a:p>
+          <a:p>
+            <a:endParaRPr lang="en-US" dirty="0"/>
+          </a:p>
+        </p:txBody>
+      </p:sp>
+      <p:pic>
+        <p:nvPicPr>
+          <p:cNvPr id="5" name="Picture 4"/>
+          <p:cNvPicPr>
+            <a:picLocks noChangeAspect="1"/>
+          </p:cNvPicPr>
+          <p:nvPr/>
+        </p:nvPicPr>
+        <p:blipFill>
+          <a:blip r:embed="rId2">
+            <a:extLst>
+              <a:ext uri="{28A0092B-C50C-407E-A947-70E740481C1C}">
+                <a14:useLocalDpi xmlns:a14="http://schemas.microsoft.com/office/drawing/2010/main" val="0"/>
+              </a:ext>
+            </a:extLst>
+          </a:blip>
+          <a:stretch>
+            <a:fillRect/>
+          </a:stretch>
+        </p:blipFill>
+        <p:spPr>
+          <a:xfrm>
+            <a:off x="7094540" y="1845734"/>
+            <a:ext cx="2979492" cy="4442896"/>
+          </a:xfrm>
+          <a:prstGeom prst="roundRect">
+            <a:avLst>
+              <a:gd name="adj" fmla="val 8594"/>
+            </a:avLst>
+          </a:prstGeom>
+          <a:solidFill>
+            <a:srgbClr val="FFFFFF">
+              <a:shade val="85000"/>
+            </a:srgbClr>
+          </a:solidFill>
+          <a:ln>
+            <a:noFill/>
+          </a:ln>
+          <a:effectLst>
+            <a:reflection blurRad="12700" stA="38000" endPos="28000" dist="5000" dir="5400000" sy="-100000" algn="bl" rotWithShape="0"/>
+          </a:effectLst>
+        </p:spPr>
+      </p:pic>
     </p:spTree>
     <p:extLst>
       <p:ext uri="{BB962C8B-B14F-4D97-AF65-F5344CB8AC3E}">
@@ -4384,6 +4977,13 @@
   <p:clrMapOvr>
     <a:masterClrMapping/>
   </p:clrMapOvr>
+  <p:timing>
+    <p:tnLst>
+      <p:par>
+        <p:cTn id="1" dur="indefinite" restart="never" nodeType="tmRoot"/>
+      </p:par>
+    </p:tnLst>
+  </p:timing>
 </p:sld>
 </file>
 
@@ -4439,13 +5039,161 @@
         </p:nvSpPr>
         <p:spPr/>
         <p:txBody>
-          <a:bodyPr/>
-          <a:lstStyle/>
-          <a:p>
-            <a:endParaRPr lang="en-US"/>
-          </a:p>
-        </p:txBody>
-      </p:sp>
+          <a:bodyPr>
+            <a:normAutofit/>
+          </a:bodyPr>
+          <a:lstStyle/>
+          <a:p>
+            <a:pPr>
+              <a:buFont typeface="Courier New" panose="02070309020205020404" pitchFamily="49" charset="0"/>
+              <a:buChar char="o"/>
+            </a:pPr>
+            <a:r>
+              <a:rPr lang="en-US" sz="2800" dirty="0" smtClean="0"/>
+              <a:t>Targeting gamers of all ages!</a:t>
+            </a:r>
+          </a:p>
+          <a:p>
+            <a:pPr>
+              <a:buFont typeface="Courier New" panose="02070309020205020404" pitchFamily="49" charset="0"/>
+              <a:buChar char="o"/>
+            </a:pPr>
+            <a:r>
+              <a:rPr lang="en-US" sz="2800" dirty="0" smtClean="0"/>
+              <a:t>Serve as a stress reliever, hobby, entertainment, competition</a:t>
+            </a:r>
+          </a:p>
+        </p:txBody>
+      </p:sp>
+      <p:pic>
+        <p:nvPicPr>
+          <p:cNvPr id="6" name="Picture 5"/>
+          <p:cNvPicPr>
+            <a:picLocks noChangeAspect="1"/>
+          </p:cNvPicPr>
+          <p:nvPr/>
+        </p:nvPicPr>
+        <p:blipFill>
+          <a:blip r:embed="rId2">
+            <a:extLst>
+              <a:ext uri="{28A0092B-C50C-407E-A947-70E740481C1C}">
+                <a14:useLocalDpi xmlns:a14="http://schemas.microsoft.com/office/drawing/2010/main" val="0"/>
+              </a:ext>
+            </a:extLst>
+          </a:blip>
+          <a:stretch>
+            <a:fillRect/>
+          </a:stretch>
+        </p:blipFill>
+        <p:spPr>
+          <a:xfrm>
+            <a:off x="1097280" y="3857414"/>
+            <a:ext cx="1580234" cy="2235199"/>
+          </a:xfrm>
+          <a:prstGeom prst="roundRect">
+            <a:avLst>
+              <a:gd name="adj" fmla="val 8594"/>
+            </a:avLst>
+          </a:prstGeom>
+          <a:solidFill>
+            <a:srgbClr val="FFFFFF">
+              <a:shade val="85000"/>
+            </a:srgbClr>
+          </a:solidFill>
+          <a:ln>
+            <a:noFill/>
+          </a:ln>
+          <a:effectLst>
+            <a:reflection blurRad="12700" stA="38000" endPos="28000" dist="5000" dir="5400000" sy="-100000" algn="bl" rotWithShape="0"/>
+          </a:effectLst>
+        </p:spPr>
+      </p:pic>
+      <p:pic>
+        <p:nvPicPr>
+          <p:cNvPr id="7" name="Picture 6"/>
+          <p:cNvPicPr>
+            <a:picLocks noChangeAspect="1"/>
+          </p:cNvPicPr>
+          <p:nvPr/>
+        </p:nvPicPr>
+        <p:blipFill>
+          <a:blip r:embed="rId3">
+            <a:extLst>
+              <a:ext uri="{28A0092B-C50C-407E-A947-70E740481C1C}">
+                <a14:useLocalDpi xmlns:a14="http://schemas.microsoft.com/office/drawing/2010/main" val="0"/>
+              </a:ext>
+            </a:extLst>
+          </a:blip>
+          <a:stretch>
+            <a:fillRect/>
+          </a:stretch>
+        </p:blipFill>
+        <p:spPr>
+          <a:xfrm>
+            <a:off x="8453003" y="1845734"/>
+            <a:ext cx="2218123" cy="4352937"/>
+          </a:xfrm>
+          <a:prstGeom prst="roundRect">
+            <a:avLst>
+              <a:gd name="adj" fmla="val 8594"/>
+            </a:avLst>
+          </a:prstGeom>
+          <a:solidFill>
+            <a:srgbClr val="FFFFFF">
+              <a:shade val="85000"/>
+            </a:srgbClr>
+          </a:solidFill>
+          <a:ln>
+            <a:noFill/>
+          </a:ln>
+          <a:effectLst>
+            <a:reflection blurRad="12700" stA="38000" endPos="28000" dist="5000" dir="5400000" sy="-100000" algn="bl" rotWithShape="0"/>
+          </a:effectLst>
+        </p:spPr>
+      </p:pic>
+      <p:pic>
+        <p:nvPicPr>
+          <p:cNvPr id="8" name="Picture 7"/>
+          <p:cNvPicPr>
+            <a:picLocks noChangeAspect="1"/>
+          </p:cNvPicPr>
+          <p:nvPr/>
+        </p:nvPicPr>
+        <p:blipFill>
+          <a:blip r:embed="rId4">
+            <a:extLst>
+              <a:ext uri="{28A0092B-C50C-407E-A947-70E740481C1C}">
+                <a14:useLocalDpi xmlns:a14="http://schemas.microsoft.com/office/drawing/2010/main" val="0"/>
+              </a:ext>
+            </a:extLst>
+          </a:blip>
+          <a:stretch>
+            <a:fillRect/>
+          </a:stretch>
+        </p:blipFill>
+        <p:spPr>
+          <a:xfrm>
+            <a:off x="4883156" y="2899508"/>
+            <a:ext cx="1104059" cy="3248598"/>
+          </a:xfrm>
+          <a:prstGeom prst="roundRect">
+            <a:avLst>
+              <a:gd name="adj" fmla="val 8594"/>
+            </a:avLst>
+          </a:prstGeom>
+          <a:solidFill>
+            <a:srgbClr val="FFFFFF">
+              <a:shade val="85000"/>
+            </a:srgbClr>
+          </a:solidFill>
+          <a:ln>
+            <a:noFill/>
+          </a:ln>
+          <a:effectLst>
+            <a:reflection blurRad="12700" stA="38000" endPos="28000" dist="5000" dir="5400000" sy="-100000" algn="bl" rotWithShape="0"/>
+          </a:effectLst>
+        </p:spPr>
+      </p:pic>
     </p:spTree>
     <p:extLst>
       <p:ext uri="{BB962C8B-B14F-4D97-AF65-F5344CB8AC3E}">
@@ -4456,6 +5204,13 @@
   <p:clrMapOvr>
     <a:masterClrMapping/>
   </p:clrMapOvr>
+  <p:timing>
+    <p:tnLst>
+      <p:par>
+        <p:cTn id="1" dur="indefinite" restart="never" nodeType="tmRoot"/>
+      </p:par>
+    </p:tnLst>
+  </p:timing>
 </p:sld>
 </file>
 
@@ -4514,6 +5269,258 @@
           <a:bodyPr/>
           <a:lstStyle/>
           <a:p>
+            <a:pPr>
+              <a:buFont typeface="Courier New" panose="02070309020205020404" pitchFamily="49" charset="0"/>
+              <a:buChar char="o"/>
+            </a:pPr>
+            <a:r>
+              <a:rPr lang="en-US" sz="2800" dirty="0" smtClean="0"/>
+              <a:t>Business Constraints</a:t>
+            </a:r>
+            <a:endParaRPr lang="en-US" sz="2800" dirty="0"/>
+          </a:p>
+          <a:p>
+            <a:pPr lvl="1">
+              <a:buFont typeface="Courier New" panose="02070309020205020404" pitchFamily="49" charset="0"/>
+              <a:buChar char="o"/>
+            </a:pPr>
+            <a:r>
+              <a:rPr lang="en-US" sz="2800" dirty="0" smtClean="0"/>
+              <a:t>$500 budget</a:t>
+            </a:r>
+            <a:endParaRPr lang="en-US" sz="2800" dirty="0"/>
+          </a:p>
+          <a:p>
+            <a:pPr lvl="1">
+              <a:buFont typeface="Courier New" panose="02070309020205020404" pitchFamily="49" charset="0"/>
+              <a:buChar char="o"/>
+            </a:pPr>
+            <a:r>
+              <a:rPr lang="en-US" sz="2800" dirty="0" smtClean="0"/>
+              <a:t>English only </a:t>
+            </a:r>
+            <a:r>
+              <a:rPr lang="en-US" sz="2800" dirty="0" smtClean="0">
+                <a:sym typeface="Wingdings" panose="05000000000000000000" pitchFamily="2" charset="2"/>
+              </a:rPr>
+              <a:t></a:t>
+            </a:r>
+            <a:endParaRPr lang="en-US" sz="2800" dirty="0" smtClean="0"/>
+          </a:p>
+          <a:p>
+            <a:pPr>
+              <a:buFont typeface="Courier New" panose="02070309020205020404" pitchFamily="49" charset="0"/>
+              <a:buChar char="o"/>
+            </a:pPr>
+            <a:r>
+              <a:rPr lang="en-US" sz="2800" dirty="0" smtClean="0"/>
+              <a:t>Technical Constraints</a:t>
+            </a:r>
+          </a:p>
+          <a:p>
+            <a:pPr lvl="1">
+              <a:buFont typeface="Courier New" panose="02070309020205020404" pitchFamily="49" charset="0"/>
+              <a:buChar char="o"/>
+            </a:pPr>
+            <a:r>
+              <a:rPr lang="en-US" sz="2800" dirty="0" smtClean="0"/>
+              <a:t>Windows 7 and 8 support</a:t>
+            </a:r>
+          </a:p>
+          <a:p>
+            <a:pPr lvl="1">
+              <a:buFont typeface="Courier New" panose="02070309020205020404" pitchFamily="49" charset="0"/>
+              <a:buChar char="o"/>
+            </a:pPr>
+            <a:r>
+              <a:rPr lang="en-US" sz="2800" dirty="0" smtClean="0"/>
+              <a:t>20 FPS with minimum requirements</a:t>
+            </a:r>
+          </a:p>
+          <a:p>
+            <a:pPr lvl="1">
+              <a:buFont typeface="Courier New" panose="02070309020205020404" pitchFamily="49" charset="0"/>
+              <a:buChar char="o"/>
+            </a:pPr>
+            <a:r>
+              <a:rPr lang="en-US" sz="2800" dirty="0" smtClean="0"/>
+              <a:t>Unity Engine</a:t>
+            </a:r>
+            <a:endParaRPr lang="en-US" sz="2800" dirty="0"/>
+          </a:p>
+          <a:p>
+            <a:endParaRPr lang="en-US" dirty="0"/>
+          </a:p>
+        </p:txBody>
+      </p:sp>
+      <p:sp>
+        <p:nvSpPr>
+          <p:cNvPr id="4" name="Rectangle 3"/>
+          <p:cNvSpPr/>
+          <p:nvPr/>
+        </p:nvSpPr>
+        <p:spPr>
+          <a:xfrm>
+            <a:off x="7065107" y="2211754"/>
+            <a:ext cx="1578708" cy="1219200"/>
+          </a:xfrm>
+          <a:prstGeom prst="rect">
+            <a:avLst/>
+          </a:prstGeom>
+          <a:solidFill>
+            <a:srgbClr val="C00000"/>
+          </a:solidFill>
+        </p:spPr>
+        <p:style>
+          <a:lnRef idx="2">
+            <a:schemeClr val="accent1">
+              <a:shade val="50000"/>
+            </a:schemeClr>
+          </a:lnRef>
+          <a:fillRef idx="1">
+            <a:schemeClr val="accent1"/>
+          </a:fillRef>
+          <a:effectRef idx="0">
+            <a:schemeClr val="accent1"/>
+          </a:effectRef>
+          <a:fontRef idx="minor">
+            <a:schemeClr val="lt1"/>
+          </a:fontRef>
+        </p:style>
+        <p:txBody>
+          <a:bodyPr rtlCol="0" anchor="ctr"/>
+          <a:lstStyle/>
+          <a:p>
+            <a:pPr algn="ctr"/>
+            <a:endParaRPr lang="en-US"/>
+          </a:p>
+        </p:txBody>
+      </p:sp>
+      <p:sp>
+        <p:nvSpPr>
+          <p:cNvPr id="5" name="Rectangle 4"/>
+          <p:cNvSpPr/>
+          <p:nvPr/>
+        </p:nvSpPr>
+        <p:spPr>
+          <a:xfrm>
+            <a:off x="8879840" y="2211754"/>
+            <a:ext cx="1547446" cy="1219200"/>
+          </a:xfrm>
+          <a:prstGeom prst="rect">
+            <a:avLst/>
+          </a:prstGeom>
+          <a:solidFill>
+            <a:srgbClr val="92D050"/>
+          </a:solidFill>
+        </p:spPr>
+        <p:style>
+          <a:lnRef idx="2">
+            <a:schemeClr val="accent1">
+              <a:shade val="50000"/>
+            </a:schemeClr>
+          </a:lnRef>
+          <a:fillRef idx="1">
+            <a:schemeClr val="accent1"/>
+          </a:fillRef>
+          <a:effectRef idx="0">
+            <a:schemeClr val="accent1"/>
+          </a:effectRef>
+          <a:fontRef idx="minor">
+            <a:schemeClr val="lt1"/>
+          </a:fontRef>
+        </p:style>
+        <p:txBody>
+          <a:bodyPr rtlCol="0" anchor="ctr"/>
+          <a:lstStyle/>
+          <a:p>
+            <a:pPr algn="ctr"/>
+            <a:endParaRPr lang="en-US"/>
+          </a:p>
+        </p:txBody>
+      </p:sp>
+      <p:sp>
+        <p:nvSpPr>
+          <p:cNvPr id="6" name="Rectangle 5"/>
+          <p:cNvSpPr/>
+          <p:nvPr/>
+        </p:nvSpPr>
+        <p:spPr>
+          <a:xfrm>
+            <a:off x="7065107" y="3539328"/>
+            <a:ext cx="1578708" cy="1141046"/>
+          </a:xfrm>
+          <a:prstGeom prst="rect">
+            <a:avLst/>
+          </a:prstGeom>
+          <a:solidFill>
+            <a:srgbClr val="00B0F0"/>
+          </a:solidFill>
+        </p:spPr>
+        <p:style>
+          <a:lnRef idx="2">
+            <a:schemeClr val="accent1">
+              <a:shade val="50000"/>
+            </a:schemeClr>
+          </a:lnRef>
+          <a:fillRef idx="1">
+            <a:schemeClr val="accent1"/>
+          </a:fillRef>
+          <a:effectRef idx="0">
+            <a:schemeClr val="accent1"/>
+          </a:effectRef>
+          <a:fontRef idx="minor">
+            <a:schemeClr val="lt1"/>
+          </a:fontRef>
+        </p:style>
+        <p:txBody>
+          <a:bodyPr rtlCol="0" anchor="ctr"/>
+          <a:lstStyle/>
+          <a:p>
+            <a:pPr algn="ctr"/>
+            <a:endParaRPr lang="en-US"/>
+          </a:p>
+        </p:txBody>
+      </p:sp>
+      <p:sp>
+        <p:nvSpPr>
+          <p:cNvPr id="7" name="Rectangle 6"/>
+          <p:cNvSpPr/>
+          <p:nvPr/>
+        </p:nvSpPr>
+        <p:spPr>
+          <a:xfrm>
+            <a:off x="8879840" y="3539328"/>
+            <a:ext cx="1547446" cy="1141046"/>
+          </a:xfrm>
+          <a:prstGeom prst="rect">
+            <a:avLst/>
+          </a:prstGeom>
+          <a:solidFill>
+            <a:srgbClr val="FFFF00"/>
+          </a:solidFill>
+        </p:spPr>
+        <p:style>
+          <a:lnRef idx="2">
+            <a:schemeClr val="accent1">
+              <a:shade val="50000"/>
+            </a:schemeClr>
+          </a:lnRef>
+          <a:fillRef idx="1">
+            <a:schemeClr val="accent1"/>
+          </a:fillRef>
+          <a:effectRef idx="0">
+            <a:schemeClr val="accent1"/>
+          </a:effectRef>
+          <a:fontRef idx="minor">
+            <a:schemeClr val="lt1"/>
+          </a:fontRef>
+        </p:style>
+        <p:txBody>
+          <a:bodyPr rtlCol="0" anchor="ctr"/>
+          <a:lstStyle/>
+          <a:p>
+            <a:pPr algn="ctr"/>
             <a:endParaRPr lang="en-US"/>
           </a:p>
         </p:txBody>
@@ -4528,6 +5535,13 @@
   <p:clrMapOvr>
     <a:masterClrMapping/>
   </p:clrMapOvr>
+  <p:timing>
+    <p:tnLst>
+      <p:par>
+        <p:cTn id="1" dur="indefinite" restart="never" nodeType="tmRoot"/>
+      </p:par>
+    </p:tnLst>
+  </p:timing>
 </p:sld>
 </file>
 
@@ -4583,13 +5597,77 @@
         </p:nvSpPr>
         <p:spPr/>
         <p:txBody>
-          <a:bodyPr/>
-          <a:lstStyle/>
-          <a:p>
-            <a:endParaRPr lang="en-US"/>
-          </a:p>
-        </p:txBody>
-      </p:sp>
+          <a:bodyPr>
+            <a:normAutofit/>
+          </a:bodyPr>
+          <a:lstStyle/>
+          <a:p>
+            <a:pPr>
+              <a:buFont typeface="Courier New" panose="02070309020205020404" pitchFamily="49" charset="0"/>
+              <a:buChar char="o"/>
+            </a:pPr>
+            <a:r>
+              <a:rPr lang="en-US" sz="2800" dirty="0" smtClean="0"/>
+              <a:t>Final product expected to be very stable</a:t>
+            </a:r>
+            <a:endParaRPr lang="en-US" sz="2800" dirty="0"/>
+          </a:p>
+          <a:p>
+            <a:pPr>
+              <a:buFont typeface="Courier New" panose="02070309020205020404" pitchFamily="49" charset="0"/>
+              <a:buChar char="o"/>
+            </a:pPr>
+            <a:r>
+              <a:rPr lang="en-US" sz="2800" dirty="0" smtClean="0"/>
+              <a:t>Mouse &amp; keyboard should feel as an extension of the user to his/her avatar</a:t>
+            </a:r>
+            <a:endParaRPr lang="en-US" sz="2800" dirty="0"/>
+          </a:p>
+        </p:txBody>
+      </p:sp>
+      <p:pic>
+        <p:nvPicPr>
+          <p:cNvPr id="6" name="Picture 5"/>
+          <p:cNvPicPr>
+            <a:picLocks noChangeAspect="1"/>
+          </p:cNvPicPr>
+          <p:nvPr/>
+        </p:nvPicPr>
+        <p:blipFill>
+          <a:blip r:embed="rId2">
+            <a:extLst>
+              <a:ext uri="{28A0092B-C50C-407E-A947-70E740481C1C}">
+                <a14:useLocalDpi xmlns:a14="http://schemas.microsoft.com/office/drawing/2010/main" val="0"/>
+              </a:ext>
+            </a:extLst>
+          </a:blip>
+          <a:stretch>
+            <a:fillRect/>
+          </a:stretch>
+        </p:blipFill>
+        <p:spPr>
+          <a:xfrm rot="5400000">
+            <a:off x="4954856" y="1769814"/>
+            <a:ext cx="1151013" cy="4695092"/>
+          </a:xfrm>
+          <a:prstGeom prst="roundRect">
+            <a:avLst>
+              <a:gd name="adj" fmla="val 8594"/>
+            </a:avLst>
+          </a:prstGeom>
+          <a:solidFill>
+            <a:srgbClr val="FFFFFF">
+              <a:shade val="85000"/>
+            </a:srgbClr>
+          </a:solidFill>
+          <a:ln>
+            <a:noFill/>
+          </a:ln>
+          <a:effectLst>
+            <a:reflection blurRad="12700" stA="38000" endPos="28000" dist="5000" dir="5400000" sy="-100000" algn="bl" rotWithShape="0"/>
+          </a:effectLst>
+        </p:spPr>
+      </p:pic>
     </p:spTree>
     <p:extLst>
       <p:ext uri="{BB962C8B-B14F-4D97-AF65-F5344CB8AC3E}">
@@ -4600,6 +5678,13 @@
   <p:clrMapOvr>
     <a:masterClrMapping/>
   </p:clrMapOvr>
+  <p:timing>
+    <p:tnLst>
+      <p:par>
+        <p:cTn id="1" dur="indefinite" restart="never" nodeType="tmRoot"/>
+      </p:par>
+    </p:tnLst>
+  </p:timing>
 </p:sld>
 </file>
 
@@ -4658,10 +5743,145 @@
           <a:bodyPr/>
           <a:lstStyle/>
           <a:p>
-            <a:endParaRPr lang="en-US"/>
-          </a:p>
-        </p:txBody>
-      </p:sp>
+            <a:pPr>
+              <a:buFont typeface="Courier New" panose="02070309020205020404" pitchFamily="49" charset="0"/>
+              <a:buChar char="o"/>
+            </a:pPr>
+            <a:r>
+              <a:rPr lang="en-US" dirty="0" smtClean="0"/>
+              <a:t>Game Setup and Creation</a:t>
+            </a:r>
+            <a:endParaRPr lang="en-US" dirty="0"/>
+          </a:p>
+          <a:p>
+            <a:pPr lvl="1">
+              <a:buFont typeface="Courier New" panose="02070309020205020404" pitchFamily="49" charset="0"/>
+              <a:buChar char="o"/>
+            </a:pPr>
+            <a:r>
+              <a:rPr lang="en-US" dirty="0" smtClean="0"/>
+              <a:t>Installation</a:t>
+            </a:r>
+          </a:p>
+          <a:p>
+            <a:pPr lvl="1">
+              <a:buFont typeface="Courier New" panose="02070309020205020404" pitchFamily="49" charset="0"/>
+              <a:buChar char="o"/>
+            </a:pPr>
+            <a:r>
+              <a:rPr lang="en-US" dirty="0" smtClean="0"/>
+              <a:t>Start/End Game</a:t>
+            </a:r>
+            <a:endParaRPr lang="en-US" dirty="0"/>
+          </a:p>
+          <a:p>
+            <a:pPr>
+              <a:buFont typeface="Courier New" panose="02070309020205020404" pitchFamily="49" charset="0"/>
+              <a:buChar char="o"/>
+            </a:pPr>
+            <a:r>
+              <a:rPr lang="en-US" dirty="0" smtClean="0"/>
+              <a:t>Gameplay and In-Game Interactions</a:t>
+            </a:r>
+          </a:p>
+          <a:p>
+            <a:pPr lvl="1">
+              <a:buFont typeface="Courier New" panose="02070309020205020404" pitchFamily="49" charset="0"/>
+              <a:buChar char="o"/>
+            </a:pPr>
+            <a:r>
+              <a:rPr lang="en-US" dirty="0" smtClean="0"/>
+              <a:t>Generate game world, player, enemies, friendlies, HUD</a:t>
+            </a:r>
+          </a:p>
+        </p:txBody>
+      </p:sp>
+      <p:pic>
+        <p:nvPicPr>
+          <p:cNvPr id="4" name="Picture 3"/>
+          <p:cNvPicPr>
+            <a:picLocks noChangeAspect="1"/>
+          </p:cNvPicPr>
+          <p:nvPr/>
+        </p:nvPicPr>
+        <p:blipFill>
+          <a:blip r:embed="rId2">
+            <a:extLst>
+              <a:ext uri="{28A0092B-C50C-407E-A947-70E740481C1C}">
+                <a14:useLocalDpi xmlns:a14="http://schemas.microsoft.com/office/drawing/2010/main" val="0"/>
+              </a:ext>
+            </a:extLst>
+          </a:blip>
+          <a:stretch>
+            <a:fillRect/>
+          </a:stretch>
+        </p:blipFill>
+        <p:spPr>
+          <a:xfrm>
+            <a:off x="1097280" y="3654367"/>
+            <a:ext cx="2448267" cy="2581635"/>
+          </a:xfrm>
+          <a:prstGeom prst="roundRect">
+            <a:avLst>
+              <a:gd name="adj" fmla="val 8594"/>
+            </a:avLst>
+          </a:prstGeom>
+          <a:solidFill>
+            <a:srgbClr val="FFFFFF">
+              <a:shade val="85000"/>
+            </a:srgbClr>
+          </a:solidFill>
+          <a:ln>
+            <a:noFill/>
+          </a:ln>
+          <a:effectLst>
+            <a:reflection blurRad="12700" stA="38000" endPos="28000" dist="5000" dir="5400000" sy="-100000" algn="bl" rotWithShape="0"/>
+          </a:effectLst>
+        </p:spPr>
+      </p:pic>
+      <p:pic>
+        <p:nvPicPr>
+          <p:cNvPr id="5" name="Picture 4"/>
+          <p:cNvPicPr>
+            <a:picLocks noChangeAspect="1"/>
+          </p:cNvPicPr>
+          <p:nvPr/>
+        </p:nvPicPr>
+        <p:blipFill>
+          <a:blip r:embed="rId3">
+            <a:extLst>
+              <a:ext uri="{28A0092B-C50C-407E-A947-70E740481C1C}">
+                <a14:useLocalDpi xmlns:a14="http://schemas.microsoft.com/office/drawing/2010/main" val="0"/>
+              </a:ext>
+            </a:extLst>
+          </a:blip>
+          <a:stretch>
+            <a:fillRect/>
+          </a:stretch>
+        </p:blipFill>
+        <p:spPr>
+          <a:xfrm>
+            <a:off x="7232387" y="2083095"/>
+            <a:ext cx="2685336" cy="3894373"/>
+          </a:xfrm>
+          <a:prstGeom prst="roundRect">
+            <a:avLst>
+              <a:gd name="adj" fmla="val 8594"/>
+            </a:avLst>
+          </a:prstGeom>
+          <a:solidFill>
+            <a:srgbClr val="FFFFFF">
+              <a:shade val="85000"/>
+            </a:srgbClr>
+          </a:solidFill>
+          <a:ln>
+            <a:noFill/>
+          </a:ln>
+          <a:effectLst>
+            <a:reflection blurRad="12700" stA="38000" endPos="28000" dist="5000" dir="5400000" sy="-100000" algn="bl" rotWithShape="0"/>
+          </a:effectLst>
+        </p:spPr>
+      </p:pic>
     </p:spTree>
     <p:extLst>
       <p:ext uri="{BB962C8B-B14F-4D97-AF65-F5344CB8AC3E}">
@@ -4672,6 +5892,13 @@
   <p:clrMapOvr>
     <a:masterClrMapping/>
   </p:clrMapOvr>
+  <p:timing>
+    <p:tnLst>
+      <p:par>
+        <p:cTn id="1" dur="indefinite" restart="never" nodeType="tmRoot"/>
+      </p:par>
+    </p:tnLst>
+  </p:timing>
 </p:sld>
 </file>
 

</xml_diff>

<commit_message>
Added some content to slides.  Also reformatted some pictures and grammar.
</commit_message>
<xml_diff>
--- a/Documentation/UnityGameRequirementsPPT.pptx
+++ b/Documentation/UnityGameRequirementsPPT.pptx
@@ -5,20 +5,19 @@
     <p:sldMasterId id="2147483648" r:id="rId1"/>
   </p:sldMasterIdLst>
   <p:handoutMasterIdLst>
-    <p:handoutMasterId r:id="rId13"/>
+    <p:handoutMasterId r:id="rId12"/>
   </p:handoutMasterIdLst>
   <p:sldIdLst>
     <p:sldId id="256" r:id="rId2"/>
     <p:sldId id="264" r:id="rId3"/>
     <p:sldId id="265" r:id="rId4"/>
-    <p:sldId id="266" r:id="rId5"/>
-    <p:sldId id="267" r:id="rId6"/>
-    <p:sldId id="268" r:id="rId7"/>
-    <p:sldId id="269" r:id="rId8"/>
-    <p:sldId id="270" r:id="rId9"/>
-    <p:sldId id="271" r:id="rId10"/>
-    <p:sldId id="273" r:id="rId11"/>
-    <p:sldId id="272" r:id="rId12"/>
+    <p:sldId id="267" r:id="rId5"/>
+    <p:sldId id="268" r:id="rId6"/>
+    <p:sldId id="269" r:id="rId7"/>
+    <p:sldId id="270" r:id="rId8"/>
+    <p:sldId id="271" r:id="rId9"/>
+    <p:sldId id="273" r:id="rId10"/>
+    <p:sldId id="272" r:id="rId11"/>
   </p:sldIdLst>
   <p:sldSz cx="12192000" cy="6858000"/>
   <p:notesSz cx="9312275" cy="6858000"/>
@@ -4084,180 +4083,6 @@
           <a:chExt cx="0" cy="0"/>
         </a:xfrm>
       </p:grpSpPr>
-      <p:pic>
-        <p:nvPicPr>
-          <p:cNvPr id="4" name="Picture 3"/>
-          <p:cNvPicPr>
-            <a:picLocks noChangeAspect="1"/>
-          </p:cNvPicPr>
-          <p:nvPr/>
-        </p:nvPicPr>
-        <p:blipFill>
-          <a:blip r:embed="rId2">
-            <a:extLst>
-              <a:ext uri="{28A0092B-C50C-407E-A947-70E740481C1C}">
-                <a14:useLocalDpi xmlns:a14="http://schemas.microsoft.com/office/drawing/2010/main" val="0"/>
-              </a:ext>
-            </a:extLst>
-          </a:blip>
-          <a:stretch>
-            <a:fillRect/>
-          </a:stretch>
-        </p:blipFill>
-        <p:spPr>
-          <a:xfrm>
-            <a:off x="5462954" y="304767"/>
-            <a:ext cx="5080000" cy="6142567"/>
-          </a:xfrm>
-          <a:prstGeom prst="roundRect">
-            <a:avLst>
-              <a:gd name="adj" fmla="val 8594"/>
-            </a:avLst>
-          </a:prstGeom>
-          <a:solidFill>
-            <a:srgbClr val="FFFFFF">
-              <a:shade val="85000"/>
-            </a:srgbClr>
-          </a:solidFill>
-          <a:ln>
-            <a:noFill/>
-          </a:ln>
-          <a:effectLst>
-            <a:reflection blurRad="12700" stA="38000" endPos="28000" dist="5000" dir="5400000" sy="-100000" algn="bl" rotWithShape="0"/>
-          </a:effectLst>
-        </p:spPr>
-      </p:pic>
-      <p:sp>
-        <p:nvSpPr>
-          <p:cNvPr id="5" name="Title 4"/>
-          <p:cNvSpPr>
-            <a:spLocks noGrp="1"/>
-          </p:cNvSpPr>
-          <p:nvPr>
-            <p:ph type="title"/>
-          </p:nvPr>
-        </p:nvSpPr>
-        <p:spPr>
-          <a:xfrm>
-            <a:off x="457200" y="594359"/>
-            <a:ext cx="3200400" cy="749887"/>
-          </a:xfrm>
-        </p:spPr>
-        <p:txBody>
-          <a:bodyPr>
-            <a:normAutofit/>
-          </a:bodyPr>
-          <a:lstStyle/>
-          <a:p>
-            <a:pPr algn="ctr"/>
-            <a:r>
-              <a:rPr lang="en-US" sz="4800" dirty="0" smtClean="0"/>
-              <a:t>The Island</a:t>
-            </a:r>
-            <a:endParaRPr lang="en-US" sz="4800" dirty="0"/>
-          </a:p>
-        </p:txBody>
-      </p:sp>
-      <p:sp>
-        <p:nvSpPr>
-          <p:cNvPr id="7" name="Text Placeholder 6"/>
-          <p:cNvSpPr>
-            <a:spLocks noGrp="1"/>
-          </p:cNvSpPr>
-          <p:nvPr>
-            <p:ph type="body" sz="half" idx="2"/>
-          </p:nvPr>
-        </p:nvSpPr>
-        <p:spPr>
-          <a:xfrm>
-            <a:off x="457200" y="1414585"/>
-            <a:ext cx="3200400" cy="4890619"/>
-          </a:xfrm>
-        </p:spPr>
-        <p:txBody>
-          <a:bodyPr>
-            <a:normAutofit/>
-          </a:bodyPr>
-          <a:lstStyle/>
-          <a:p>
-            <a:pPr marL="457200" indent="-457200">
-              <a:buFont typeface="Wingdings" panose="05000000000000000000" pitchFamily="2" charset="2"/>
-              <a:buChar char="q"/>
-            </a:pPr>
-            <a:r>
-              <a:rPr lang="en-US" sz="2800" dirty="0" smtClean="0"/>
-              <a:t>Player start/end point</a:t>
-            </a:r>
-          </a:p>
-          <a:p>
-            <a:pPr marL="457200" indent="-457200">
-              <a:buFont typeface="Wingdings" panose="05000000000000000000" pitchFamily="2" charset="2"/>
-              <a:buChar char="q"/>
-            </a:pPr>
-            <a:r>
-              <a:rPr lang="en-US" sz="2800" dirty="0" smtClean="0"/>
-              <a:t>Enemy spawn locations</a:t>
-            </a:r>
-          </a:p>
-          <a:p>
-            <a:pPr marL="457200" indent="-457200">
-              <a:buFont typeface="Wingdings" panose="05000000000000000000" pitchFamily="2" charset="2"/>
-              <a:buChar char="q"/>
-            </a:pPr>
-            <a:r>
-              <a:rPr lang="en-US" sz="2800" dirty="0" smtClean="0"/>
-              <a:t>Obstacles</a:t>
-            </a:r>
-          </a:p>
-          <a:p>
-            <a:pPr marL="457200" indent="-457200">
-              <a:buFont typeface="Wingdings" panose="05000000000000000000" pitchFamily="2" charset="2"/>
-              <a:buChar char="q"/>
-            </a:pPr>
-            <a:r>
-              <a:rPr lang="en-US" sz="2800" dirty="0" smtClean="0"/>
-              <a:t>Different terrains</a:t>
-            </a:r>
-          </a:p>
-        </p:txBody>
-      </p:sp>
-    </p:spTree>
-    <p:extLst>
-      <p:ext uri="{BB962C8B-B14F-4D97-AF65-F5344CB8AC3E}">
-        <p14:creationId xmlns:p14="http://schemas.microsoft.com/office/powerpoint/2010/main" val="2279057902"/>
-      </p:ext>
-    </p:extLst>
-  </p:cSld>
-  <p:clrMapOvr>
-    <a:masterClrMapping/>
-  </p:clrMapOvr>
-  <p:timing>
-    <p:tnLst>
-      <p:par>
-        <p:cTn id="1" dur="indefinite" restart="never" nodeType="tmRoot"/>
-      </p:par>
-    </p:tnLst>
-  </p:timing>
-</p:sld>
-</file>
-
-<file path=ppt/slides/slide11.xml><?xml version="1.0" encoding="utf-8"?>
-<p:sld xmlns:a="http://schemas.openxmlformats.org/drawingml/2006/main" xmlns:r="http://schemas.openxmlformats.org/officeDocument/2006/relationships" xmlns:p="http://schemas.openxmlformats.org/presentationml/2006/main">
-  <p:cSld>
-    <p:spTree>
-      <p:nvGrpSpPr>
-        <p:cNvPr id="1" name=""/>
-        <p:cNvGrpSpPr/>
-        <p:nvPr/>
-      </p:nvGrpSpPr>
-      <p:grpSpPr>
-        <a:xfrm>
-          <a:off x="0" y="0"/>
-          <a:ext cx="0" cy="0"/>
-          <a:chOff x="0" y="0"/>
-          <a:chExt cx="0" cy="0"/>
-        </a:xfrm>
-      </p:grpSpPr>
       <p:sp>
         <p:nvSpPr>
           <p:cNvPr id="2" name="Title 1"/>
@@ -4461,9 +4286,84 @@
         </p:nvSpPr>
         <p:spPr/>
         <p:txBody>
-          <a:bodyPr/>
-          <a:lstStyle/>
-          <a:p>
+          <a:bodyPr>
+            <a:normAutofit/>
+          </a:bodyPr>
+          <a:lstStyle/>
+          <a:p>
+            <a:pPr>
+              <a:buFont typeface="Courier New" panose="02070309020205020404" pitchFamily="49" charset="0"/>
+              <a:buChar char="o"/>
+            </a:pPr>
+            <a:r>
+              <a:rPr lang="en-US" dirty="0" smtClean="0"/>
+              <a:t>A team of students from the College of Creative Studies have built up a collection of artwork including 3D models, textures, video, and sounds.  H</a:t>
+            </a:r>
+            <a:r>
+              <a:rPr lang="en-US" dirty="0" smtClean="0"/>
+              <a:t>owever, they lack the training and experience needed to implement and combine all of these assets in code.</a:t>
+            </a:r>
+            <a:endParaRPr lang="en-US" dirty="0" smtClean="0"/>
+          </a:p>
+          <a:p>
+            <a:pPr>
+              <a:buFont typeface="Courier New" panose="02070309020205020404" pitchFamily="49" charset="0"/>
+              <a:buChar char="o"/>
+            </a:pPr>
+            <a:r>
+              <a:rPr lang="en-US" dirty="0" smtClean="0"/>
+              <a:t>Demo</a:t>
+            </a:r>
+          </a:p>
+          <a:p>
+            <a:pPr>
+              <a:buFont typeface="Courier New" panose="02070309020205020404" pitchFamily="49" charset="0"/>
+              <a:buChar char="o"/>
+            </a:pPr>
+            <a:r>
+              <a:rPr lang="en-US" dirty="0" smtClean="0"/>
+              <a:t>1 Island</a:t>
+            </a:r>
+          </a:p>
+          <a:p>
+            <a:pPr>
+              <a:buFont typeface="Courier New" panose="02070309020205020404" pitchFamily="49" charset="0"/>
+              <a:buChar char="o"/>
+            </a:pPr>
+            <a:r>
+              <a:rPr lang="en-US" dirty="0" smtClean="0"/>
+              <a:t>User-Controlled camera</a:t>
+            </a:r>
+          </a:p>
+          <a:p>
+            <a:pPr>
+              <a:buFont typeface="Courier New" panose="02070309020205020404" pitchFamily="49" charset="0"/>
+              <a:buChar char="o"/>
+            </a:pPr>
+            <a:r>
+              <a:rPr lang="en-US" dirty="0" smtClean="0"/>
+              <a:t>Appropriate animations &amp; sounds</a:t>
+            </a:r>
+          </a:p>
+          <a:p>
+            <a:pPr>
+              <a:buFont typeface="Courier New" panose="02070309020205020404" pitchFamily="49" charset="0"/>
+              <a:buChar char="o"/>
+            </a:pPr>
+            <a:r>
+              <a:rPr lang="en-US" dirty="0" smtClean="0"/>
+              <a:t>Combat system</a:t>
+            </a:r>
+          </a:p>
+          <a:p>
+            <a:pPr>
+              <a:buFont typeface="Courier New" panose="02070309020205020404" pitchFamily="49" charset="0"/>
+              <a:buChar char="o"/>
+            </a:pPr>
+            <a:r>
+              <a:rPr lang="en-US" dirty="0" smtClean="0"/>
+              <a:t>Functional UI</a:t>
+            </a:r>
             <a:endParaRPr lang="en-US" dirty="0"/>
           </a:p>
         </p:txBody>
@@ -4705,7 +4605,7 @@
           <a:p>
             <a:r>
               <a:rPr lang="en-US" dirty="0" smtClean="0"/>
-              <a:t>Product Function</a:t>
+              <a:t>Main Features</a:t>
             </a:r>
             <a:endParaRPr lang="en-US" dirty="0"/>
           </a:p>
@@ -4723,17 +4623,175 @@
         </p:nvSpPr>
         <p:spPr/>
         <p:txBody>
-          <a:bodyPr/>
-          <a:lstStyle/>
-          <a:p>
-            <a:endParaRPr lang="en-US" dirty="0"/>
-          </a:p>
-        </p:txBody>
-      </p:sp>
+          <a:bodyPr>
+            <a:normAutofit lnSpcReduction="10000"/>
+          </a:bodyPr>
+          <a:lstStyle/>
+          <a:p>
+            <a:pPr>
+              <a:buFont typeface="Courier New" panose="02070309020205020404" pitchFamily="49" charset="0"/>
+              <a:buChar char="o"/>
+            </a:pPr>
+            <a:r>
+              <a:rPr lang="en-US" dirty="0" smtClean="0"/>
+              <a:t>Environment</a:t>
+            </a:r>
+          </a:p>
+          <a:p>
+            <a:pPr lvl="1">
+              <a:buFont typeface="Courier New" panose="02070309020205020404" pitchFamily="49" charset="0"/>
+              <a:buChar char="o"/>
+            </a:pPr>
+            <a:r>
+              <a:rPr lang="en-US" sz="2000" dirty="0" smtClean="0"/>
+              <a:t>Obstacles and puzzles</a:t>
+            </a:r>
+          </a:p>
+          <a:p>
+            <a:pPr lvl="1">
+              <a:buFont typeface="Courier New" panose="02070309020205020404" pitchFamily="49" charset="0"/>
+              <a:buChar char="o"/>
+            </a:pPr>
+            <a:r>
+              <a:rPr lang="en-US" sz="2000" dirty="0" smtClean="0"/>
+              <a:t>Island can be explored to find helpful items</a:t>
+            </a:r>
+          </a:p>
+          <a:p>
+            <a:pPr lvl="1">
+              <a:buFont typeface="Courier New" panose="02070309020205020404" pitchFamily="49" charset="0"/>
+              <a:buChar char="o"/>
+            </a:pPr>
+            <a:r>
+              <a:rPr lang="en-US" sz="2000" dirty="0" smtClean="0"/>
+              <a:t>Day &amp; night cycle with music</a:t>
+            </a:r>
+            <a:endParaRPr lang="en-US" sz="2000" dirty="0"/>
+          </a:p>
+          <a:p>
+            <a:pPr>
+              <a:buFont typeface="Courier New" panose="02070309020205020404" pitchFamily="49" charset="0"/>
+              <a:buChar char="o"/>
+            </a:pPr>
+            <a:r>
+              <a:rPr lang="en-US" dirty="0" smtClean="0"/>
+              <a:t>Characters</a:t>
+            </a:r>
+          </a:p>
+          <a:p>
+            <a:pPr lvl="1">
+              <a:buFont typeface="Courier New" panose="02070309020205020404" pitchFamily="49" charset="0"/>
+              <a:buChar char="o"/>
+            </a:pPr>
+            <a:r>
+              <a:rPr lang="en-US" sz="2000" dirty="0" smtClean="0"/>
+              <a:t>Player character</a:t>
+            </a:r>
+          </a:p>
+          <a:p>
+            <a:pPr lvl="1">
+              <a:buFont typeface="Courier New" panose="02070309020205020404" pitchFamily="49" charset="0"/>
+              <a:buChar char="o"/>
+            </a:pPr>
+            <a:r>
+              <a:rPr lang="en-US" sz="2000" dirty="0" smtClean="0"/>
+              <a:t>Friendly NPC</a:t>
+            </a:r>
+          </a:p>
+          <a:p>
+            <a:pPr lvl="1">
+              <a:buFont typeface="Courier New" panose="02070309020205020404" pitchFamily="49" charset="0"/>
+              <a:buChar char="o"/>
+            </a:pPr>
+            <a:r>
+              <a:rPr lang="en-US" sz="2000" dirty="0" smtClean="0"/>
+              <a:t>Enemy NPCs</a:t>
+            </a:r>
+            <a:endParaRPr lang="en-US" sz="2000" dirty="0"/>
+          </a:p>
+          <a:p>
+            <a:pPr>
+              <a:buFont typeface="Courier New" panose="02070309020205020404" pitchFamily="49" charset="0"/>
+              <a:buChar char="o"/>
+            </a:pPr>
+            <a:r>
+              <a:rPr lang="en-US" dirty="0" smtClean="0"/>
+              <a:t>User Interface</a:t>
+            </a:r>
+          </a:p>
+          <a:p>
+            <a:pPr lvl="1">
+              <a:buFont typeface="Courier New" panose="02070309020205020404" pitchFamily="49" charset="0"/>
+              <a:buChar char="o"/>
+            </a:pPr>
+            <a:r>
+              <a:rPr lang="en-US" sz="2000" dirty="0" smtClean="0"/>
+              <a:t>Minimalist</a:t>
+            </a:r>
+          </a:p>
+          <a:p>
+            <a:pPr lvl="1">
+              <a:buFont typeface="Courier New" panose="02070309020205020404" pitchFamily="49" charset="0"/>
+              <a:buChar char="o"/>
+            </a:pPr>
+            <a:r>
+              <a:rPr lang="en-US" sz="2000" dirty="0" smtClean="0"/>
+              <a:t>In-game pause</a:t>
+            </a:r>
+            <a:endParaRPr lang="en-US" sz="2000" dirty="0"/>
+          </a:p>
+          <a:p>
+            <a:endParaRPr lang="en-US" dirty="0"/>
+          </a:p>
+        </p:txBody>
+      </p:sp>
+      <p:pic>
+        <p:nvPicPr>
+          <p:cNvPr id="5" name="Picture 4"/>
+          <p:cNvPicPr>
+            <a:picLocks noChangeAspect="1"/>
+          </p:cNvPicPr>
+          <p:nvPr/>
+        </p:nvPicPr>
+        <p:blipFill>
+          <a:blip r:embed="rId2">
+            <a:extLst>
+              <a:ext uri="{28A0092B-C50C-407E-A947-70E740481C1C}">
+                <a14:useLocalDpi xmlns:a14="http://schemas.microsoft.com/office/drawing/2010/main" val="0"/>
+              </a:ext>
+            </a:extLst>
+          </a:blip>
+          <a:stretch>
+            <a:fillRect/>
+          </a:stretch>
+        </p:blipFill>
+        <p:spPr>
+          <a:xfrm>
+            <a:off x="7094540" y="1845734"/>
+            <a:ext cx="2979492" cy="4442896"/>
+          </a:xfrm>
+          <a:prstGeom prst="roundRect">
+            <a:avLst>
+              <a:gd name="adj" fmla="val 8594"/>
+            </a:avLst>
+          </a:prstGeom>
+          <a:solidFill>
+            <a:srgbClr val="FFFFFF">
+              <a:shade val="85000"/>
+            </a:srgbClr>
+          </a:solidFill>
+          <a:ln>
+            <a:noFill/>
+          </a:ln>
+          <a:effectLst>
+            <a:reflection blurRad="12700" stA="38000" endPos="28000" dist="5000" dir="5400000" sy="-100000" algn="bl" rotWithShape="0"/>
+          </a:effectLst>
+        </p:spPr>
+      </p:pic>
     </p:spTree>
     <p:extLst>
       <p:ext uri="{BB962C8B-B14F-4D97-AF65-F5344CB8AC3E}">
-        <p14:creationId xmlns:p14="http://schemas.microsoft.com/office/powerpoint/2010/main" val="1107178350"/>
+        <p14:creationId xmlns:p14="http://schemas.microsoft.com/office/powerpoint/2010/main" val="399732649"/>
       </p:ext>
     </p:extLst>
   </p:cSld>
@@ -4767,166 +4825,9 @@
           <a:chExt cx="0" cy="0"/>
         </a:xfrm>
       </p:grpSpPr>
-      <p:sp>
-        <p:nvSpPr>
-          <p:cNvPr id="2" name="Title 1"/>
-          <p:cNvSpPr>
-            <a:spLocks noGrp="1"/>
-          </p:cNvSpPr>
-          <p:nvPr>
-            <p:ph type="title"/>
-          </p:nvPr>
-        </p:nvSpPr>
-        <p:spPr/>
-        <p:txBody>
-          <a:bodyPr/>
-          <a:lstStyle/>
-          <a:p>
-            <a:r>
-              <a:rPr lang="en-US" dirty="0" smtClean="0"/>
-              <a:t>Main Features</a:t>
-            </a:r>
-            <a:endParaRPr lang="en-US" dirty="0"/>
-          </a:p>
-        </p:txBody>
-      </p:sp>
-      <p:sp>
-        <p:nvSpPr>
-          <p:cNvPr id="3" name="Content Placeholder 2"/>
-          <p:cNvSpPr>
-            <a:spLocks noGrp="1"/>
-          </p:cNvSpPr>
-          <p:nvPr>
-            <p:ph idx="1"/>
-          </p:nvPr>
-        </p:nvSpPr>
-        <p:spPr/>
-        <p:txBody>
-          <a:bodyPr>
-            <a:normAutofit lnSpcReduction="10000"/>
-          </a:bodyPr>
-          <a:lstStyle/>
-          <a:p>
-            <a:pPr>
-              <a:buFont typeface="Courier New" panose="02070309020205020404" pitchFamily="49" charset="0"/>
-              <a:buChar char="o"/>
-            </a:pPr>
-            <a:r>
-              <a:rPr lang="en-US" dirty="0" smtClean="0"/>
-              <a:t>Environment</a:t>
-            </a:r>
-          </a:p>
-          <a:p>
-            <a:pPr lvl="1">
-              <a:buFont typeface="Courier New" panose="02070309020205020404" pitchFamily="49" charset="0"/>
-              <a:buChar char="o"/>
-            </a:pPr>
-            <a:r>
-              <a:rPr lang="en-US" sz="2000" dirty="0" smtClean="0"/>
-              <a:t>Obstacles and puzzles</a:t>
-            </a:r>
-          </a:p>
-          <a:p>
-            <a:pPr lvl="1">
-              <a:buFont typeface="Courier New" panose="02070309020205020404" pitchFamily="49" charset="0"/>
-              <a:buChar char="o"/>
-            </a:pPr>
-            <a:r>
-              <a:rPr lang="en-US" sz="2000" dirty="0" smtClean="0"/>
-              <a:t>Island can be explored to find helpful items</a:t>
-            </a:r>
-          </a:p>
-          <a:p>
-            <a:pPr lvl="1">
-              <a:buFont typeface="Courier New" panose="02070309020205020404" pitchFamily="49" charset="0"/>
-              <a:buChar char="o"/>
-            </a:pPr>
-            <a:r>
-              <a:rPr lang="en-US" sz="2000" dirty="0" smtClean="0"/>
-              <a:t>Day &amp; night cycle with music</a:t>
-            </a:r>
-            <a:endParaRPr lang="en-US" sz="2000" dirty="0"/>
-          </a:p>
-          <a:p>
-            <a:pPr>
-              <a:buFont typeface="Courier New" panose="02070309020205020404" pitchFamily="49" charset="0"/>
-              <a:buChar char="o"/>
-            </a:pPr>
-            <a:r>
-              <a:rPr lang="en-US" dirty="0" smtClean="0"/>
-              <a:t>Characters</a:t>
-            </a:r>
-          </a:p>
-          <a:p>
-            <a:pPr lvl="1">
-              <a:buFont typeface="Courier New" panose="02070309020205020404" pitchFamily="49" charset="0"/>
-              <a:buChar char="o"/>
-            </a:pPr>
-            <a:r>
-              <a:rPr lang="en-US" sz="2000" dirty="0" smtClean="0"/>
-              <a:t>Player character</a:t>
-            </a:r>
-          </a:p>
-          <a:p>
-            <a:pPr lvl="1">
-              <a:buFont typeface="Courier New" panose="02070309020205020404" pitchFamily="49" charset="0"/>
-              <a:buChar char="o"/>
-            </a:pPr>
-            <a:r>
-              <a:rPr lang="en-US" sz="2000" dirty="0" smtClean="0"/>
-              <a:t>Friendly NPC</a:t>
-            </a:r>
-          </a:p>
-          <a:p>
-            <a:pPr lvl="1">
-              <a:buFont typeface="Courier New" panose="02070309020205020404" pitchFamily="49" charset="0"/>
-              <a:buChar char="o"/>
-            </a:pPr>
-            <a:r>
-              <a:rPr lang="en-US" sz="2000" dirty="0" smtClean="0"/>
-              <a:t>Enemy NPCs</a:t>
-            </a:r>
-            <a:endParaRPr lang="en-US" sz="2000" dirty="0"/>
-          </a:p>
-          <a:p>
-            <a:pPr>
-              <a:buFont typeface="Courier New" panose="02070309020205020404" pitchFamily="49" charset="0"/>
-              <a:buChar char="o"/>
-            </a:pPr>
-            <a:r>
-              <a:rPr lang="en-US" dirty="0" smtClean="0"/>
-              <a:t>User Interface</a:t>
-            </a:r>
-          </a:p>
-          <a:p>
-            <a:pPr lvl="1">
-              <a:buFont typeface="Courier New" panose="02070309020205020404" pitchFamily="49" charset="0"/>
-              <a:buChar char="o"/>
-            </a:pPr>
-            <a:r>
-              <a:rPr lang="en-US" sz="2000" dirty="0" smtClean="0"/>
-              <a:t>Minimalist</a:t>
-            </a:r>
-          </a:p>
-          <a:p>
-            <a:pPr lvl="1">
-              <a:buFont typeface="Courier New" panose="02070309020205020404" pitchFamily="49" charset="0"/>
-              <a:buChar char="o"/>
-            </a:pPr>
-            <a:r>
-              <a:rPr lang="en-US" sz="2000" dirty="0" smtClean="0"/>
-              <a:t>In-game pause</a:t>
-            </a:r>
-            <a:endParaRPr lang="en-US" sz="2000" dirty="0"/>
-          </a:p>
-          <a:p>
-            <a:endParaRPr lang="en-US" dirty="0"/>
-          </a:p>
-        </p:txBody>
-      </p:sp>
       <p:pic>
         <p:nvPicPr>
-          <p:cNvPr id="5" name="Picture 4"/>
+          <p:cNvPr id="7" name="Picture 6"/>
           <p:cNvPicPr>
             <a:picLocks noChangeAspect="1"/>
           </p:cNvPicPr>
@@ -4946,8 +4847,8 @@
         </p:blipFill>
         <p:spPr>
           <a:xfrm>
-            <a:off x="7094540" y="1845734"/>
-            <a:ext cx="2979492" cy="4442896"/>
+            <a:off x="9129250" y="1845734"/>
+            <a:ext cx="2218123" cy="4352937"/>
           </a:xfrm>
           <a:prstGeom prst="roundRect">
             <a:avLst>
@@ -4967,10 +4868,175 @@
           </a:effectLst>
         </p:spPr>
       </p:pic>
+      <p:pic>
+        <p:nvPicPr>
+          <p:cNvPr id="8" name="Picture 7"/>
+          <p:cNvPicPr>
+            <a:picLocks noChangeAspect="1"/>
+          </p:cNvPicPr>
+          <p:nvPr/>
+        </p:nvPicPr>
+        <p:blipFill>
+          <a:blip r:embed="rId3">
+            <a:extLst>
+              <a:ext uri="{28A0092B-C50C-407E-A947-70E740481C1C}">
+                <a14:useLocalDpi xmlns:a14="http://schemas.microsoft.com/office/drawing/2010/main" val="0"/>
+              </a:ext>
+            </a:extLst>
+          </a:blip>
+          <a:stretch>
+            <a:fillRect/>
+          </a:stretch>
+        </p:blipFill>
+        <p:spPr>
+          <a:xfrm>
+            <a:off x="5351352" y="2950073"/>
+            <a:ext cx="1104059" cy="3248598"/>
+          </a:xfrm>
+          <a:prstGeom prst="roundRect">
+            <a:avLst>
+              <a:gd name="adj" fmla="val 8594"/>
+            </a:avLst>
+          </a:prstGeom>
+          <a:solidFill>
+            <a:srgbClr val="FFFFFF">
+              <a:shade val="85000"/>
+            </a:srgbClr>
+          </a:solidFill>
+          <a:ln>
+            <a:noFill/>
+          </a:ln>
+          <a:effectLst>
+            <a:reflection blurRad="12700" stA="38000" endPos="28000" dist="5000" dir="5400000" sy="-100000" algn="bl" rotWithShape="0"/>
+          </a:effectLst>
+        </p:spPr>
+      </p:pic>
+      <p:sp>
+        <p:nvSpPr>
+          <p:cNvPr id="2" name="Title 1"/>
+          <p:cNvSpPr>
+            <a:spLocks noGrp="1"/>
+          </p:cNvSpPr>
+          <p:nvPr>
+            <p:ph type="title"/>
+          </p:nvPr>
+        </p:nvSpPr>
+        <p:spPr/>
+        <p:txBody>
+          <a:bodyPr/>
+          <a:lstStyle/>
+          <a:p>
+            <a:r>
+              <a:rPr lang="en-US" dirty="0" smtClean="0"/>
+              <a:t>User Perspectives</a:t>
+            </a:r>
+            <a:endParaRPr lang="en-US" dirty="0"/>
+          </a:p>
+        </p:txBody>
+      </p:sp>
+      <p:sp>
+        <p:nvSpPr>
+          <p:cNvPr id="3" name="Content Placeholder 2"/>
+          <p:cNvSpPr>
+            <a:spLocks noGrp="1"/>
+          </p:cNvSpPr>
+          <p:nvPr>
+            <p:ph idx="1"/>
+          </p:nvPr>
+        </p:nvSpPr>
+        <p:spPr>
+          <a:xfrm>
+            <a:off x="1097280" y="1845734"/>
+            <a:ext cx="8864867" cy="4023360"/>
+          </a:xfrm>
+        </p:spPr>
+        <p:txBody>
+          <a:bodyPr>
+            <a:normAutofit/>
+          </a:bodyPr>
+          <a:lstStyle/>
+          <a:p>
+            <a:pPr>
+              <a:buFont typeface="Courier New" panose="02070309020205020404" pitchFamily="49" charset="0"/>
+              <a:buChar char="o"/>
+            </a:pPr>
+            <a:r>
+              <a:rPr lang="en-US" sz="2800" dirty="0" smtClean="0"/>
+              <a:t>Targeting gamers of all ages!</a:t>
+            </a:r>
+          </a:p>
+          <a:p>
+            <a:pPr>
+              <a:buFont typeface="Courier New" panose="02070309020205020404" pitchFamily="49" charset="0"/>
+              <a:buChar char="o"/>
+            </a:pPr>
+            <a:r>
+              <a:rPr lang="en-US" sz="2800" dirty="0" smtClean="0"/>
+              <a:t>Will take the role </a:t>
+            </a:r>
+            <a:r>
+              <a:rPr lang="en-US" sz="2800" dirty="0" smtClean="0"/>
+              <a:t>as a </a:t>
+            </a:r>
+            <a:r>
+              <a:rPr lang="en-US" sz="2800" dirty="0" smtClean="0"/>
+              <a:t>stress </a:t>
+            </a:r>
+            <a:r>
+              <a:rPr lang="en-US" sz="2800" dirty="0" smtClean="0"/>
+              <a:t>reliever, hobby/entertainment, or as a competition.</a:t>
+            </a:r>
+            <a:endParaRPr lang="en-US" sz="2800" dirty="0" smtClean="0"/>
+          </a:p>
+        </p:txBody>
+      </p:sp>
+      <p:pic>
+        <p:nvPicPr>
+          <p:cNvPr id="6" name="Picture 5"/>
+          <p:cNvPicPr>
+            <a:picLocks noChangeAspect="1"/>
+          </p:cNvPicPr>
+          <p:nvPr/>
+        </p:nvPicPr>
+        <p:blipFill>
+          <a:blip r:embed="rId4">
+            <a:extLst>
+              <a:ext uri="{28A0092B-C50C-407E-A947-70E740481C1C}">
+                <a14:useLocalDpi xmlns:a14="http://schemas.microsoft.com/office/drawing/2010/main" val="0"/>
+              </a:ext>
+            </a:extLst>
+          </a:blip>
+          <a:stretch>
+            <a:fillRect/>
+          </a:stretch>
+        </p:blipFill>
+        <p:spPr>
+          <a:xfrm>
+            <a:off x="1097280" y="3857414"/>
+            <a:ext cx="1580234" cy="2235199"/>
+          </a:xfrm>
+          <a:prstGeom prst="roundRect">
+            <a:avLst>
+              <a:gd name="adj" fmla="val 8594"/>
+            </a:avLst>
+          </a:prstGeom>
+          <a:solidFill>
+            <a:srgbClr val="FFFFFF">
+              <a:shade val="85000"/>
+            </a:srgbClr>
+          </a:solidFill>
+          <a:ln>
+            <a:noFill/>
+          </a:ln>
+          <a:effectLst>
+            <a:reflection blurRad="12700" stA="38000" endPos="28000" dist="5000" dir="5400000" sy="-100000" algn="bl" rotWithShape="0"/>
+          </a:effectLst>
+        </p:spPr>
+      </p:pic>
     </p:spTree>
     <p:extLst>
       <p:ext uri="{BB962C8B-B14F-4D97-AF65-F5344CB8AC3E}">
-        <p14:creationId xmlns:p14="http://schemas.microsoft.com/office/powerpoint/2010/main" val="399732649"/>
+        <p14:creationId xmlns:p14="http://schemas.microsoft.com/office/powerpoint/2010/main" val="3925709861"/>
       </p:ext>
     </p:extLst>
   </p:cSld>
@@ -5021,7 +5087,7 @@
           <a:p>
             <a:r>
               <a:rPr lang="en-US" dirty="0" smtClean="0"/>
-              <a:t>User Perspectives</a:t>
+              <a:t>Constraints</a:t>
             </a:r>
             <a:endParaRPr lang="en-US" dirty="0"/>
           </a:p>
@@ -5039,9 +5105,7 @@
         </p:nvSpPr>
         <p:spPr/>
         <p:txBody>
-          <a:bodyPr>
-            <a:normAutofit/>
-          </a:bodyPr>
+          <a:bodyPr/>
           <a:lstStyle/>
           <a:p>
             <a:pPr>
@@ -5050,8 +5114,37 @@
             </a:pPr>
             <a:r>
               <a:rPr lang="en-US" sz="2800" dirty="0" smtClean="0"/>
-              <a:t>Targeting gamers of all ages!</a:t>
-            </a:r>
+              <a:t>Business Constraints</a:t>
+            </a:r>
+            <a:endParaRPr lang="en-US" sz="2800" dirty="0"/>
+          </a:p>
+          <a:p>
+            <a:pPr lvl="1">
+              <a:buFont typeface="Courier New" panose="02070309020205020404" pitchFamily="49" charset="0"/>
+              <a:buChar char="o"/>
+            </a:pPr>
+            <a:r>
+              <a:rPr lang="en-US" sz="2800" dirty="0" smtClean="0"/>
+              <a:t>$500 budget</a:t>
+            </a:r>
+            <a:endParaRPr lang="en-US" sz="2800" dirty="0"/>
+          </a:p>
+          <a:p>
+            <a:pPr lvl="1">
+              <a:buFont typeface="Courier New" panose="02070309020205020404" pitchFamily="49" charset="0"/>
+              <a:buChar char="o"/>
+            </a:pPr>
+            <a:r>
+              <a:rPr lang="en-US" sz="2800" dirty="0" smtClean="0"/>
+              <a:t>English only </a:t>
+            </a:r>
+            <a:r>
+              <a:rPr lang="en-US" sz="2800" dirty="0" smtClean="0">
+                <a:sym typeface="Wingdings" panose="05000000000000000000" pitchFamily="2" charset="2"/>
+              </a:rPr>
+              <a:t></a:t>
+            </a:r>
+            <a:endParaRPr lang="en-US" sz="2800" dirty="0" smtClean="0"/>
           </a:p>
           <a:p>
             <a:pPr>
@@ -5060,144 +5153,221 @@
             </a:pPr>
             <a:r>
               <a:rPr lang="en-US" sz="2800" dirty="0" smtClean="0"/>
-              <a:t>Serve as a stress reliever, hobby, entertainment, competition</a:t>
-            </a:r>
-          </a:p>
-        </p:txBody>
-      </p:sp>
-      <p:pic>
-        <p:nvPicPr>
-          <p:cNvPr id="6" name="Picture 5"/>
-          <p:cNvPicPr>
-            <a:picLocks noChangeAspect="1"/>
-          </p:cNvPicPr>
+              <a:t>Technical Constraints</a:t>
+            </a:r>
+          </a:p>
+          <a:p>
+            <a:pPr lvl="1">
+              <a:buFont typeface="Courier New" panose="02070309020205020404" pitchFamily="49" charset="0"/>
+              <a:buChar char="o"/>
+            </a:pPr>
+            <a:r>
+              <a:rPr lang="en-US" sz="2800" dirty="0" smtClean="0"/>
+              <a:t>Windows 7 and 8 support</a:t>
+            </a:r>
+          </a:p>
+          <a:p>
+            <a:pPr lvl="1">
+              <a:buFont typeface="Courier New" panose="02070309020205020404" pitchFamily="49" charset="0"/>
+              <a:buChar char="o"/>
+            </a:pPr>
+            <a:r>
+              <a:rPr lang="en-US" sz="2800" dirty="0" smtClean="0"/>
+              <a:t>20 FPS with minimum requirements</a:t>
+            </a:r>
+          </a:p>
+          <a:p>
+            <a:pPr lvl="1">
+              <a:buFont typeface="Courier New" panose="02070309020205020404" pitchFamily="49" charset="0"/>
+              <a:buChar char="o"/>
+            </a:pPr>
+            <a:r>
+              <a:rPr lang="en-US" sz="2800" dirty="0" smtClean="0"/>
+              <a:t>Unity Engine</a:t>
+            </a:r>
+            <a:endParaRPr lang="en-US" sz="2800" dirty="0"/>
+          </a:p>
+          <a:p>
+            <a:endParaRPr lang="en-US" dirty="0"/>
+          </a:p>
+        </p:txBody>
+      </p:sp>
+      <p:sp>
+        <p:nvSpPr>
+          <p:cNvPr id="4" name="Rectangle 3"/>
+          <p:cNvSpPr/>
           <p:nvPr/>
-        </p:nvPicPr>
-        <p:blipFill>
-          <a:blip r:embed="rId2">
-            <a:extLst>
-              <a:ext uri="{28A0092B-C50C-407E-A947-70E740481C1C}">
-                <a14:useLocalDpi xmlns:a14="http://schemas.microsoft.com/office/drawing/2010/main" val="0"/>
-              </a:ext>
-            </a:extLst>
-          </a:blip>
-          <a:stretch>
-            <a:fillRect/>
-          </a:stretch>
-        </p:blipFill>
-        <p:spPr>
-          <a:xfrm>
-            <a:off x="1097280" y="3857414"/>
-            <a:ext cx="1580234" cy="2235199"/>
-          </a:xfrm>
-          <a:prstGeom prst="roundRect">
-            <a:avLst>
-              <a:gd name="adj" fmla="val 8594"/>
-            </a:avLst>
+        </p:nvSpPr>
+        <p:spPr>
+          <a:xfrm>
+            <a:off x="7065107" y="2211754"/>
+            <a:ext cx="1578708" cy="1219200"/>
+          </a:xfrm>
+          <a:prstGeom prst="rect">
+            <a:avLst/>
           </a:prstGeom>
           <a:solidFill>
-            <a:srgbClr val="FFFFFF">
-              <a:shade val="85000"/>
-            </a:srgbClr>
+            <a:srgbClr val="C00000"/>
           </a:solidFill>
-          <a:ln>
-            <a:noFill/>
-          </a:ln>
-          <a:effectLst>
-            <a:reflection blurRad="12700" stA="38000" endPos="28000" dist="5000" dir="5400000" sy="-100000" algn="bl" rotWithShape="0"/>
-          </a:effectLst>
-        </p:spPr>
-      </p:pic>
-      <p:pic>
-        <p:nvPicPr>
-          <p:cNvPr id="7" name="Picture 6"/>
-          <p:cNvPicPr>
-            <a:picLocks noChangeAspect="1"/>
-          </p:cNvPicPr>
+        </p:spPr>
+        <p:style>
+          <a:lnRef idx="2">
+            <a:schemeClr val="accent1">
+              <a:shade val="50000"/>
+            </a:schemeClr>
+          </a:lnRef>
+          <a:fillRef idx="1">
+            <a:schemeClr val="accent1"/>
+          </a:fillRef>
+          <a:effectRef idx="0">
+            <a:schemeClr val="accent1"/>
+          </a:effectRef>
+          <a:fontRef idx="minor">
+            <a:schemeClr val="lt1"/>
+          </a:fontRef>
+        </p:style>
+        <p:txBody>
+          <a:bodyPr rtlCol="0" anchor="ctr"/>
+          <a:lstStyle/>
+          <a:p>
+            <a:pPr algn="ctr"/>
+            <a:endParaRPr lang="en-US"/>
+          </a:p>
+        </p:txBody>
+      </p:sp>
+      <p:sp>
+        <p:nvSpPr>
+          <p:cNvPr id="5" name="Rectangle 4"/>
+          <p:cNvSpPr/>
           <p:nvPr/>
-        </p:nvPicPr>
-        <p:blipFill>
-          <a:blip r:embed="rId3">
-            <a:extLst>
-              <a:ext uri="{28A0092B-C50C-407E-A947-70E740481C1C}">
-                <a14:useLocalDpi xmlns:a14="http://schemas.microsoft.com/office/drawing/2010/main" val="0"/>
-              </a:ext>
-            </a:extLst>
-          </a:blip>
-          <a:stretch>
-            <a:fillRect/>
-          </a:stretch>
-        </p:blipFill>
-        <p:spPr>
-          <a:xfrm>
-            <a:off x="8453003" y="1845734"/>
-            <a:ext cx="2218123" cy="4352937"/>
-          </a:xfrm>
-          <a:prstGeom prst="roundRect">
-            <a:avLst>
-              <a:gd name="adj" fmla="val 8594"/>
-            </a:avLst>
+        </p:nvSpPr>
+        <p:spPr>
+          <a:xfrm>
+            <a:off x="8879840" y="2211754"/>
+            <a:ext cx="1547446" cy="1219200"/>
+          </a:xfrm>
+          <a:prstGeom prst="rect">
+            <a:avLst/>
           </a:prstGeom>
           <a:solidFill>
-            <a:srgbClr val="FFFFFF">
-              <a:shade val="85000"/>
-            </a:srgbClr>
+            <a:srgbClr val="92D050"/>
           </a:solidFill>
-          <a:ln>
-            <a:noFill/>
-          </a:ln>
-          <a:effectLst>
-            <a:reflection blurRad="12700" stA="38000" endPos="28000" dist="5000" dir="5400000" sy="-100000" algn="bl" rotWithShape="0"/>
-          </a:effectLst>
-        </p:spPr>
-      </p:pic>
-      <p:pic>
-        <p:nvPicPr>
-          <p:cNvPr id="8" name="Picture 7"/>
-          <p:cNvPicPr>
-            <a:picLocks noChangeAspect="1"/>
-          </p:cNvPicPr>
+        </p:spPr>
+        <p:style>
+          <a:lnRef idx="2">
+            <a:schemeClr val="accent1">
+              <a:shade val="50000"/>
+            </a:schemeClr>
+          </a:lnRef>
+          <a:fillRef idx="1">
+            <a:schemeClr val="accent1"/>
+          </a:fillRef>
+          <a:effectRef idx="0">
+            <a:schemeClr val="accent1"/>
+          </a:effectRef>
+          <a:fontRef idx="minor">
+            <a:schemeClr val="lt1"/>
+          </a:fontRef>
+        </p:style>
+        <p:txBody>
+          <a:bodyPr rtlCol="0" anchor="ctr"/>
+          <a:lstStyle/>
+          <a:p>
+            <a:pPr algn="ctr"/>
+            <a:endParaRPr lang="en-US"/>
+          </a:p>
+        </p:txBody>
+      </p:sp>
+      <p:sp>
+        <p:nvSpPr>
+          <p:cNvPr id="6" name="Rectangle 5"/>
+          <p:cNvSpPr/>
           <p:nvPr/>
-        </p:nvPicPr>
-        <p:blipFill>
-          <a:blip r:embed="rId4">
-            <a:extLst>
-              <a:ext uri="{28A0092B-C50C-407E-A947-70E740481C1C}">
-                <a14:useLocalDpi xmlns:a14="http://schemas.microsoft.com/office/drawing/2010/main" val="0"/>
-              </a:ext>
-            </a:extLst>
-          </a:blip>
-          <a:stretch>
-            <a:fillRect/>
-          </a:stretch>
-        </p:blipFill>
-        <p:spPr>
-          <a:xfrm>
-            <a:off x="4883156" y="2899508"/>
-            <a:ext cx="1104059" cy="3248598"/>
-          </a:xfrm>
-          <a:prstGeom prst="roundRect">
-            <a:avLst>
-              <a:gd name="adj" fmla="val 8594"/>
-            </a:avLst>
+        </p:nvSpPr>
+        <p:spPr>
+          <a:xfrm>
+            <a:off x="7065107" y="3539328"/>
+            <a:ext cx="1578708" cy="1141046"/>
+          </a:xfrm>
+          <a:prstGeom prst="rect">
+            <a:avLst/>
           </a:prstGeom>
           <a:solidFill>
-            <a:srgbClr val="FFFFFF">
-              <a:shade val="85000"/>
-            </a:srgbClr>
+            <a:srgbClr val="00B0F0"/>
           </a:solidFill>
-          <a:ln>
-            <a:noFill/>
-          </a:ln>
-          <a:effectLst>
-            <a:reflection blurRad="12700" stA="38000" endPos="28000" dist="5000" dir="5400000" sy="-100000" algn="bl" rotWithShape="0"/>
-          </a:effectLst>
-        </p:spPr>
-      </p:pic>
+        </p:spPr>
+        <p:style>
+          <a:lnRef idx="2">
+            <a:schemeClr val="accent1">
+              <a:shade val="50000"/>
+            </a:schemeClr>
+          </a:lnRef>
+          <a:fillRef idx="1">
+            <a:schemeClr val="accent1"/>
+          </a:fillRef>
+          <a:effectRef idx="0">
+            <a:schemeClr val="accent1"/>
+          </a:effectRef>
+          <a:fontRef idx="minor">
+            <a:schemeClr val="lt1"/>
+          </a:fontRef>
+        </p:style>
+        <p:txBody>
+          <a:bodyPr rtlCol="0" anchor="ctr"/>
+          <a:lstStyle/>
+          <a:p>
+            <a:pPr algn="ctr"/>
+            <a:endParaRPr lang="en-US"/>
+          </a:p>
+        </p:txBody>
+      </p:sp>
+      <p:sp>
+        <p:nvSpPr>
+          <p:cNvPr id="7" name="Rectangle 6"/>
+          <p:cNvSpPr/>
+          <p:nvPr/>
+        </p:nvSpPr>
+        <p:spPr>
+          <a:xfrm>
+            <a:off x="8879840" y="3539328"/>
+            <a:ext cx="1547446" cy="1141046"/>
+          </a:xfrm>
+          <a:prstGeom prst="rect">
+            <a:avLst/>
+          </a:prstGeom>
+          <a:solidFill>
+            <a:srgbClr val="FFFF00"/>
+          </a:solidFill>
+        </p:spPr>
+        <p:style>
+          <a:lnRef idx="2">
+            <a:schemeClr val="accent1">
+              <a:shade val="50000"/>
+            </a:schemeClr>
+          </a:lnRef>
+          <a:fillRef idx="1">
+            <a:schemeClr val="accent1"/>
+          </a:fillRef>
+          <a:effectRef idx="0">
+            <a:schemeClr val="accent1"/>
+          </a:effectRef>
+          <a:fontRef idx="minor">
+            <a:schemeClr val="lt1"/>
+          </a:fontRef>
+        </p:style>
+        <p:txBody>
+          <a:bodyPr rtlCol="0" anchor="ctr"/>
+          <a:lstStyle/>
+          <a:p>
+            <a:pPr algn="ctr"/>
+            <a:endParaRPr lang="en-US"/>
+          </a:p>
+        </p:txBody>
+      </p:sp>
     </p:spTree>
     <p:extLst>
       <p:ext uri="{BB962C8B-B14F-4D97-AF65-F5344CB8AC3E}">
-        <p14:creationId xmlns:p14="http://schemas.microsoft.com/office/powerpoint/2010/main" val="3925709861"/>
+        <p14:creationId xmlns:p14="http://schemas.microsoft.com/office/powerpoint/2010/main" val="2528391778"/>
       </p:ext>
     </p:extLst>
   </p:cSld>
@@ -5231,6 +5401,49 @@
           <a:chExt cx="0" cy="0"/>
         </a:xfrm>
       </p:grpSpPr>
+      <p:pic>
+        <p:nvPicPr>
+          <p:cNvPr id="6" name="Picture 5"/>
+          <p:cNvPicPr>
+            <a:picLocks noChangeAspect="1"/>
+          </p:cNvPicPr>
+          <p:nvPr/>
+        </p:nvPicPr>
+        <p:blipFill>
+          <a:blip r:embed="rId2">
+            <a:extLst>
+              <a:ext uri="{28A0092B-C50C-407E-A947-70E740481C1C}">
+                <a14:useLocalDpi xmlns:a14="http://schemas.microsoft.com/office/drawing/2010/main" val="0"/>
+              </a:ext>
+            </a:extLst>
+          </a:blip>
+          <a:stretch>
+            <a:fillRect/>
+          </a:stretch>
+        </p:blipFill>
+        <p:spPr>
+          <a:xfrm rot="5400000">
+            <a:off x="4915301" y="1402444"/>
+            <a:ext cx="2422357" cy="6034320"/>
+          </a:xfrm>
+          <a:prstGeom prst="roundRect">
+            <a:avLst>
+              <a:gd name="adj" fmla="val 8594"/>
+            </a:avLst>
+          </a:prstGeom>
+          <a:solidFill>
+            <a:srgbClr val="FFFFFF">
+              <a:shade val="85000"/>
+            </a:srgbClr>
+          </a:solidFill>
+          <a:ln>
+            <a:noFill/>
+          </a:ln>
+          <a:effectLst>
+            <a:reflection blurRad="12700" stA="38000" endPos="28000" dist="5000" dir="5400000" sy="-100000" algn="bl" rotWithShape="0"/>
+          </a:effectLst>
+        </p:spPr>
+      </p:pic>
       <p:sp>
         <p:nvSpPr>
           <p:cNvPr id="2" name="Title 1"/>
@@ -5248,7 +5461,7 @@
           <a:p>
             <a:r>
               <a:rPr lang="en-US" dirty="0" smtClean="0"/>
-              <a:t>Constraints</a:t>
+              <a:t>Game Features</a:t>
             </a:r>
             <a:endParaRPr lang="en-US" dirty="0"/>
           </a:p>
@@ -5266,7 +5479,9 @@
         </p:nvSpPr>
         <p:spPr/>
         <p:txBody>
-          <a:bodyPr/>
+          <a:bodyPr>
+            <a:normAutofit/>
+          </a:bodyPr>
           <a:lstStyle/>
           <a:p>
             <a:pPr>
@@ -5275,37 +5490,9 @@
             </a:pPr>
             <a:r>
               <a:rPr lang="en-US" sz="2800" dirty="0" smtClean="0"/>
-              <a:t>Business Constraints</a:t>
+              <a:t>Final product expected to be very stable</a:t>
             </a:r>
             <a:endParaRPr lang="en-US" sz="2800" dirty="0"/>
-          </a:p>
-          <a:p>
-            <a:pPr lvl="1">
-              <a:buFont typeface="Courier New" panose="02070309020205020404" pitchFamily="49" charset="0"/>
-              <a:buChar char="o"/>
-            </a:pPr>
-            <a:r>
-              <a:rPr lang="en-US" sz="2800" dirty="0" smtClean="0"/>
-              <a:t>$500 budget</a:t>
-            </a:r>
-            <a:endParaRPr lang="en-US" sz="2800" dirty="0"/>
-          </a:p>
-          <a:p>
-            <a:pPr lvl="1">
-              <a:buFont typeface="Courier New" panose="02070309020205020404" pitchFamily="49" charset="0"/>
-              <a:buChar char="o"/>
-            </a:pPr>
-            <a:r>
-              <a:rPr lang="en-US" sz="2800" dirty="0" smtClean="0"/>
-              <a:t>English only </a:t>
-            </a:r>
-            <a:r>
-              <a:rPr lang="en-US" sz="2800" dirty="0" smtClean="0">
-                <a:sym typeface="Wingdings" panose="05000000000000000000" pitchFamily="2" charset="2"/>
-              </a:rPr>
-              <a:t></a:t>
-            </a:r>
-            <a:endParaRPr lang="en-US" sz="2800" dirty="0" smtClean="0"/>
           </a:p>
           <a:p>
             <a:pPr>
@@ -5314,221 +5501,20 @@
             </a:pPr>
             <a:r>
               <a:rPr lang="en-US" sz="2800" dirty="0" smtClean="0"/>
-              <a:t>Technical Constraints</a:t>
-            </a:r>
-          </a:p>
-          <a:p>
-            <a:pPr lvl="1">
-              <a:buFont typeface="Courier New" panose="02070309020205020404" pitchFamily="49" charset="0"/>
-              <a:buChar char="o"/>
-            </a:pPr>
+              <a:t>Mouse &amp; keyboard should feel as an extension of the user to his/her </a:t>
+            </a:r>
             <a:r>
               <a:rPr lang="en-US" sz="2800" dirty="0" smtClean="0"/>
-              <a:t>Windows 7 and 8 support</a:t>
-            </a:r>
-          </a:p>
-          <a:p>
-            <a:pPr lvl="1">
-              <a:buFont typeface="Courier New" panose="02070309020205020404" pitchFamily="49" charset="0"/>
-              <a:buChar char="o"/>
-            </a:pPr>
-            <a:r>
-              <a:rPr lang="en-US" sz="2800" dirty="0" smtClean="0"/>
-              <a:t>20 FPS with minimum requirements</a:t>
-            </a:r>
-          </a:p>
-          <a:p>
-            <a:pPr lvl="1">
-              <a:buFont typeface="Courier New" panose="02070309020205020404" pitchFamily="49" charset="0"/>
-              <a:buChar char="o"/>
-            </a:pPr>
-            <a:r>
-              <a:rPr lang="en-US" sz="2800" dirty="0" smtClean="0"/>
-              <a:t>Unity Engine</a:t>
+              <a:t>avatar.</a:t>
             </a:r>
             <a:endParaRPr lang="en-US" sz="2800" dirty="0"/>
-          </a:p>
-          <a:p>
-            <a:endParaRPr lang="en-US" dirty="0"/>
-          </a:p>
-        </p:txBody>
-      </p:sp>
-      <p:sp>
-        <p:nvSpPr>
-          <p:cNvPr id="4" name="Rectangle 3"/>
-          <p:cNvSpPr/>
-          <p:nvPr/>
-        </p:nvSpPr>
-        <p:spPr>
-          <a:xfrm>
-            <a:off x="7065107" y="2211754"/>
-            <a:ext cx="1578708" cy="1219200"/>
-          </a:xfrm>
-          <a:prstGeom prst="rect">
-            <a:avLst/>
-          </a:prstGeom>
-          <a:solidFill>
-            <a:srgbClr val="C00000"/>
-          </a:solidFill>
-        </p:spPr>
-        <p:style>
-          <a:lnRef idx="2">
-            <a:schemeClr val="accent1">
-              <a:shade val="50000"/>
-            </a:schemeClr>
-          </a:lnRef>
-          <a:fillRef idx="1">
-            <a:schemeClr val="accent1"/>
-          </a:fillRef>
-          <a:effectRef idx="0">
-            <a:schemeClr val="accent1"/>
-          </a:effectRef>
-          <a:fontRef idx="minor">
-            <a:schemeClr val="lt1"/>
-          </a:fontRef>
-        </p:style>
-        <p:txBody>
-          <a:bodyPr rtlCol="0" anchor="ctr"/>
-          <a:lstStyle/>
-          <a:p>
-            <a:pPr algn="ctr"/>
-            <a:endParaRPr lang="en-US"/>
-          </a:p>
-        </p:txBody>
-      </p:sp>
-      <p:sp>
-        <p:nvSpPr>
-          <p:cNvPr id="5" name="Rectangle 4"/>
-          <p:cNvSpPr/>
-          <p:nvPr/>
-        </p:nvSpPr>
-        <p:spPr>
-          <a:xfrm>
-            <a:off x="8879840" y="2211754"/>
-            <a:ext cx="1547446" cy="1219200"/>
-          </a:xfrm>
-          <a:prstGeom prst="rect">
-            <a:avLst/>
-          </a:prstGeom>
-          <a:solidFill>
-            <a:srgbClr val="92D050"/>
-          </a:solidFill>
-        </p:spPr>
-        <p:style>
-          <a:lnRef idx="2">
-            <a:schemeClr val="accent1">
-              <a:shade val="50000"/>
-            </a:schemeClr>
-          </a:lnRef>
-          <a:fillRef idx="1">
-            <a:schemeClr val="accent1"/>
-          </a:fillRef>
-          <a:effectRef idx="0">
-            <a:schemeClr val="accent1"/>
-          </a:effectRef>
-          <a:fontRef idx="minor">
-            <a:schemeClr val="lt1"/>
-          </a:fontRef>
-        </p:style>
-        <p:txBody>
-          <a:bodyPr rtlCol="0" anchor="ctr"/>
-          <a:lstStyle/>
-          <a:p>
-            <a:pPr algn="ctr"/>
-            <a:endParaRPr lang="en-US"/>
-          </a:p>
-        </p:txBody>
-      </p:sp>
-      <p:sp>
-        <p:nvSpPr>
-          <p:cNvPr id="6" name="Rectangle 5"/>
-          <p:cNvSpPr/>
-          <p:nvPr/>
-        </p:nvSpPr>
-        <p:spPr>
-          <a:xfrm>
-            <a:off x="7065107" y="3539328"/>
-            <a:ext cx="1578708" cy="1141046"/>
-          </a:xfrm>
-          <a:prstGeom prst="rect">
-            <a:avLst/>
-          </a:prstGeom>
-          <a:solidFill>
-            <a:srgbClr val="00B0F0"/>
-          </a:solidFill>
-        </p:spPr>
-        <p:style>
-          <a:lnRef idx="2">
-            <a:schemeClr val="accent1">
-              <a:shade val="50000"/>
-            </a:schemeClr>
-          </a:lnRef>
-          <a:fillRef idx="1">
-            <a:schemeClr val="accent1"/>
-          </a:fillRef>
-          <a:effectRef idx="0">
-            <a:schemeClr val="accent1"/>
-          </a:effectRef>
-          <a:fontRef idx="minor">
-            <a:schemeClr val="lt1"/>
-          </a:fontRef>
-        </p:style>
-        <p:txBody>
-          <a:bodyPr rtlCol="0" anchor="ctr"/>
-          <a:lstStyle/>
-          <a:p>
-            <a:pPr algn="ctr"/>
-            <a:endParaRPr lang="en-US"/>
-          </a:p>
-        </p:txBody>
-      </p:sp>
-      <p:sp>
-        <p:nvSpPr>
-          <p:cNvPr id="7" name="Rectangle 6"/>
-          <p:cNvSpPr/>
-          <p:nvPr/>
-        </p:nvSpPr>
-        <p:spPr>
-          <a:xfrm>
-            <a:off x="8879840" y="3539328"/>
-            <a:ext cx="1547446" cy="1141046"/>
-          </a:xfrm>
-          <a:prstGeom prst="rect">
-            <a:avLst/>
-          </a:prstGeom>
-          <a:solidFill>
-            <a:srgbClr val="FFFF00"/>
-          </a:solidFill>
-        </p:spPr>
-        <p:style>
-          <a:lnRef idx="2">
-            <a:schemeClr val="accent1">
-              <a:shade val="50000"/>
-            </a:schemeClr>
-          </a:lnRef>
-          <a:fillRef idx="1">
-            <a:schemeClr val="accent1"/>
-          </a:fillRef>
-          <a:effectRef idx="0">
-            <a:schemeClr val="accent1"/>
-          </a:effectRef>
-          <a:fontRef idx="minor">
-            <a:schemeClr val="lt1"/>
-          </a:fontRef>
-        </p:style>
-        <p:txBody>
-          <a:bodyPr rtlCol="0" anchor="ctr"/>
-          <a:lstStyle/>
-          <a:p>
-            <a:pPr algn="ctr"/>
-            <a:endParaRPr lang="en-US"/>
           </a:p>
         </p:txBody>
       </p:sp>
     </p:spTree>
     <p:extLst>
       <p:ext uri="{BB962C8B-B14F-4D97-AF65-F5344CB8AC3E}">
-        <p14:creationId xmlns:p14="http://schemas.microsoft.com/office/powerpoint/2010/main" val="2528391778"/>
+        <p14:creationId xmlns:p14="http://schemas.microsoft.com/office/powerpoint/2010/main" val="3059164976"/>
       </p:ext>
     </p:extLst>
   </p:cSld>
@@ -5579,7 +5565,7 @@
           <a:p>
             <a:r>
               <a:rPr lang="en-US" dirty="0" smtClean="0"/>
-              <a:t>Game Features</a:t>
+              <a:t>Functional Requirements</a:t>
             </a:r>
             <a:endParaRPr lang="en-US" dirty="0"/>
           </a:p>
@@ -5597,9 +5583,7 @@
         </p:nvSpPr>
         <p:spPr/>
         <p:txBody>
-          <a:bodyPr>
-            <a:normAutofit/>
-          </a:bodyPr>
+          <a:bodyPr/>
           <a:lstStyle/>
           <a:p>
             <a:pPr>
@@ -5607,10 +5591,31 @@
               <a:buChar char="o"/>
             </a:pPr>
             <a:r>
-              <a:rPr lang="en-US" sz="2800" dirty="0" smtClean="0"/>
-              <a:t>Final product expected to be very stable</a:t>
-            </a:r>
-            <a:endParaRPr lang="en-US" sz="2800" dirty="0"/>
+              <a:rPr lang="en-US" dirty="0" smtClean="0"/>
+              <a:t>Game Setup and Creation</a:t>
+            </a:r>
+            <a:endParaRPr lang="en-US" dirty="0"/>
+          </a:p>
+          <a:p>
+            <a:pPr lvl="1">
+              <a:buFont typeface="Courier New" panose="02070309020205020404" pitchFamily="49" charset="0"/>
+              <a:buChar char="o"/>
+            </a:pPr>
+            <a:r>
+              <a:rPr lang="en-US" dirty="0" smtClean="0"/>
+              <a:t>Installation</a:t>
+            </a:r>
+          </a:p>
+          <a:p>
+            <a:pPr lvl="1">
+              <a:buFont typeface="Courier New" panose="02070309020205020404" pitchFamily="49" charset="0"/>
+              <a:buChar char="o"/>
+            </a:pPr>
+            <a:r>
+              <a:rPr lang="en-US" dirty="0" smtClean="0"/>
+              <a:t>Start/End Game</a:t>
+            </a:r>
+            <a:endParaRPr lang="en-US" dirty="0"/>
           </a:p>
           <a:p>
             <a:pPr>
@@ -5618,16 +5623,25 @@
               <a:buChar char="o"/>
             </a:pPr>
             <a:r>
-              <a:rPr lang="en-US" sz="2800" dirty="0" smtClean="0"/>
-              <a:t>Mouse &amp; keyboard should feel as an extension of the user to his/her avatar</a:t>
-            </a:r>
-            <a:endParaRPr lang="en-US" sz="2800" dirty="0"/>
+              <a:rPr lang="en-US" dirty="0" smtClean="0"/>
+              <a:t>Gameplay and In-Game Interactions</a:t>
+            </a:r>
+          </a:p>
+          <a:p>
+            <a:pPr lvl="1">
+              <a:buFont typeface="Courier New" panose="02070309020205020404" pitchFamily="49" charset="0"/>
+              <a:buChar char="o"/>
+            </a:pPr>
+            <a:r>
+              <a:rPr lang="en-US" dirty="0" smtClean="0"/>
+              <a:t>Generate game world, player, enemies, friendlies, HUD</a:t>
+            </a:r>
           </a:p>
         </p:txBody>
       </p:sp>
       <p:pic>
         <p:nvPicPr>
-          <p:cNvPr id="6" name="Picture 5"/>
+          <p:cNvPr id="4" name="Picture 3"/>
           <p:cNvPicPr>
             <a:picLocks noChangeAspect="1"/>
           </p:cNvPicPr>
@@ -5646,9 +5660,9 @@
           </a:stretch>
         </p:blipFill>
         <p:spPr>
-          <a:xfrm rot="5400000">
-            <a:off x="4954856" y="1769814"/>
-            <a:ext cx="1151013" cy="4695092"/>
+          <a:xfrm>
+            <a:off x="1097280" y="3670409"/>
+            <a:ext cx="2448267" cy="2581635"/>
           </a:xfrm>
           <a:prstGeom prst="roundRect">
             <a:avLst>
@@ -5668,10 +5682,53 @@
           </a:effectLst>
         </p:spPr>
       </p:pic>
+      <p:pic>
+        <p:nvPicPr>
+          <p:cNvPr id="5" name="Picture 4"/>
+          <p:cNvPicPr>
+            <a:picLocks noChangeAspect="1"/>
+          </p:cNvPicPr>
+          <p:nvPr/>
+        </p:nvPicPr>
+        <p:blipFill>
+          <a:blip r:embed="rId3">
+            <a:extLst>
+              <a:ext uri="{28A0092B-C50C-407E-A947-70E740481C1C}">
+                <a14:useLocalDpi xmlns:a14="http://schemas.microsoft.com/office/drawing/2010/main" val="0"/>
+              </a:ext>
+            </a:extLst>
+          </a:blip>
+          <a:stretch>
+            <a:fillRect/>
+          </a:stretch>
+        </p:blipFill>
+        <p:spPr>
+          <a:xfrm>
+            <a:off x="7874071" y="1974721"/>
+            <a:ext cx="2685336" cy="3894373"/>
+          </a:xfrm>
+          <a:prstGeom prst="roundRect">
+            <a:avLst>
+              <a:gd name="adj" fmla="val 8594"/>
+            </a:avLst>
+          </a:prstGeom>
+          <a:solidFill>
+            <a:srgbClr val="FFFFFF">
+              <a:shade val="85000"/>
+            </a:srgbClr>
+          </a:solidFill>
+          <a:ln>
+            <a:noFill/>
+          </a:ln>
+          <a:effectLst>
+            <a:reflection blurRad="12700" stA="38000" endPos="28000" dist="5000" dir="5400000" sy="-100000" algn="bl" rotWithShape="0"/>
+          </a:effectLst>
+        </p:spPr>
+      </p:pic>
     </p:spTree>
     <p:extLst>
       <p:ext uri="{BB962C8B-B14F-4D97-AF65-F5344CB8AC3E}">
-        <p14:creationId xmlns:p14="http://schemas.microsoft.com/office/powerpoint/2010/main" val="3059164976"/>
+        <p14:creationId xmlns:p14="http://schemas.microsoft.com/office/powerpoint/2010/main" val="2886218978"/>
       </p:ext>
     </p:extLst>
   </p:cSld>
@@ -5705,97 +5762,6 @@
           <a:chExt cx="0" cy="0"/>
         </a:xfrm>
       </p:grpSpPr>
-      <p:sp>
-        <p:nvSpPr>
-          <p:cNvPr id="2" name="Title 1"/>
-          <p:cNvSpPr>
-            <a:spLocks noGrp="1"/>
-          </p:cNvSpPr>
-          <p:nvPr>
-            <p:ph type="title"/>
-          </p:nvPr>
-        </p:nvSpPr>
-        <p:spPr/>
-        <p:txBody>
-          <a:bodyPr/>
-          <a:lstStyle/>
-          <a:p>
-            <a:r>
-              <a:rPr lang="en-US" dirty="0" smtClean="0"/>
-              <a:t>Functional Requirements</a:t>
-            </a:r>
-            <a:endParaRPr lang="en-US" dirty="0"/>
-          </a:p>
-        </p:txBody>
-      </p:sp>
-      <p:sp>
-        <p:nvSpPr>
-          <p:cNvPr id="3" name="Content Placeholder 2"/>
-          <p:cNvSpPr>
-            <a:spLocks noGrp="1"/>
-          </p:cNvSpPr>
-          <p:nvPr>
-            <p:ph idx="1"/>
-          </p:nvPr>
-        </p:nvSpPr>
-        <p:spPr/>
-        <p:txBody>
-          <a:bodyPr/>
-          <a:lstStyle/>
-          <a:p>
-            <a:pPr>
-              <a:buFont typeface="Courier New" panose="02070309020205020404" pitchFamily="49" charset="0"/>
-              <a:buChar char="o"/>
-            </a:pPr>
-            <a:r>
-              <a:rPr lang="en-US" dirty="0" smtClean="0"/>
-              <a:t>Game Setup and Creation</a:t>
-            </a:r>
-            <a:endParaRPr lang="en-US" dirty="0"/>
-          </a:p>
-          <a:p>
-            <a:pPr lvl="1">
-              <a:buFont typeface="Courier New" panose="02070309020205020404" pitchFamily="49" charset="0"/>
-              <a:buChar char="o"/>
-            </a:pPr>
-            <a:r>
-              <a:rPr lang="en-US" dirty="0" smtClean="0"/>
-              <a:t>Installation</a:t>
-            </a:r>
-          </a:p>
-          <a:p>
-            <a:pPr lvl="1">
-              <a:buFont typeface="Courier New" panose="02070309020205020404" pitchFamily="49" charset="0"/>
-              <a:buChar char="o"/>
-            </a:pPr>
-            <a:r>
-              <a:rPr lang="en-US" dirty="0" smtClean="0"/>
-              <a:t>Start/End Game</a:t>
-            </a:r>
-            <a:endParaRPr lang="en-US" dirty="0"/>
-          </a:p>
-          <a:p>
-            <a:pPr>
-              <a:buFont typeface="Courier New" panose="02070309020205020404" pitchFamily="49" charset="0"/>
-              <a:buChar char="o"/>
-            </a:pPr>
-            <a:r>
-              <a:rPr lang="en-US" dirty="0" smtClean="0"/>
-              <a:t>Gameplay and In-Game Interactions</a:t>
-            </a:r>
-          </a:p>
-          <a:p>
-            <a:pPr lvl="1">
-              <a:buFont typeface="Courier New" panose="02070309020205020404" pitchFamily="49" charset="0"/>
-              <a:buChar char="o"/>
-            </a:pPr>
-            <a:r>
-              <a:rPr lang="en-US" dirty="0" smtClean="0"/>
-              <a:t>Generate game world, player, enemies, friendlies, HUD</a:t>
-            </a:r>
-          </a:p>
-        </p:txBody>
-      </p:sp>
       <p:pic>
         <p:nvPicPr>
           <p:cNvPr id="4" name="Picture 3"/>
@@ -5818,8 +5784,8 @@
         </p:blipFill>
         <p:spPr>
           <a:xfrm>
-            <a:off x="1097280" y="3654367"/>
-            <a:ext cx="2448267" cy="2581635"/>
+            <a:off x="5462954" y="304767"/>
+            <a:ext cx="5080000" cy="6142567"/>
           </a:xfrm>
           <a:prstGeom prst="roundRect">
             <a:avLst>
@@ -5839,53 +5805,104 @@
           </a:effectLst>
         </p:spPr>
       </p:pic>
-      <p:pic>
-        <p:nvPicPr>
-          <p:cNvPr id="5" name="Picture 4"/>
-          <p:cNvPicPr>
-            <a:picLocks noChangeAspect="1"/>
-          </p:cNvPicPr>
-          <p:nvPr/>
-        </p:nvPicPr>
-        <p:blipFill>
-          <a:blip r:embed="rId3">
-            <a:extLst>
-              <a:ext uri="{28A0092B-C50C-407E-A947-70E740481C1C}">
-                <a14:useLocalDpi xmlns:a14="http://schemas.microsoft.com/office/drawing/2010/main" val="0"/>
-              </a:ext>
-            </a:extLst>
-          </a:blip>
-          <a:stretch>
-            <a:fillRect/>
-          </a:stretch>
-        </p:blipFill>
-        <p:spPr>
-          <a:xfrm>
-            <a:off x="7232387" y="2083095"/>
-            <a:ext cx="2685336" cy="3894373"/>
-          </a:xfrm>
-          <a:prstGeom prst="roundRect">
-            <a:avLst>
-              <a:gd name="adj" fmla="val 8594"/>
-            </a:avLst>
-          </a:prstGeom>
-          <a:solidFill>
-            <a:srgbClr val="FFFFFF">
-              <a:shade val="85000"/>
-            </a:srgbClr>
-          </a:solidFill>
-          <a:ln>
-            <a:noFill/>
-          </a:ln>
-          <a:effectLst>
-            <a:reflection blurRad="12700" stA="38000" endPos="28000" dist="5000" dir="5400000" sy="-100000" algn="bl" rotWithShape="0"/>
-          </a:effectLst>
-        </p:spPr>
-      </p:pic>
+      <p:sp>
+        <p:nvSpPr>
+          <p:cNvPr id="5" name="Title 4"/>
+          <p:cNvSpPr>
+            <a:spLocks noGrp="1"/>
+          </p:cNvSpPr>
+          <p:nvPr>
+            <p:ph type="title"/>
+          </p:nvPr>
+        </p:nvSpPr>
+        <p:spPr>
+          <a:xfrm>
+            <a:off x="457200" y="594359"/>
+            <a:ext cx="3200400" cy="749887"/>
+          </a:xfrm>
+        </p:spPr>
+        <p:txBody>
+          <a:bodyPr>
+            <a:normAutofit/>
+          </a:bodyPr>
+          <a:lstStyle/>
+          <a:p>
+            <a:pPr algn="ctr"/>
+            <a:r>
+              <a:rPr lang="en-US" sz="4800" dirty="0" smtClean="0"/>
+              <a:t>The Island</a:t>
+            </a:r>
+            <a:endParaRPr lang="en-US" sz="4800" dirty="0"/>
+          </a:p>
+        </p:txBody>
+      </p:sp>
+      <p:sp>
+        <p:nvSpPr>
+          <p:cNvPr id="7" name="Text Placeholder 6"/>
+          <p:cNvSpPr>
+            <a:spLocks noGrp="1"/>
+          </p:cNvSpPr>
+          <p:nvPr>
+            <p:ph type="body" sz="half" idx="2"/>
+          </p:nvPr>
+        </p:nvSpPr>
+        <p:spPr>
+          <a:xfrm>
+            <a:off x="457200" y="1414585"/>
+            <a:ext cx="3200400" cy="4890619"/>
+          </a:xfrm>
+        </p:spPr>
+        <p:txBody>
+          <a:bodyPr>
+            <a:normAutofit/>
+          </a:bodyPr>
+          <a:lstStyle/>
+          <a:p>
+            <a:pPr marL="457200" indent="-457200">
+              <a:buFont typeface="Wingdings" panose="05000000000000000000" pitchFamily="2" charset="2"/>
+              <a:buChar char="q"/>
+            </a:pPr>
+            <a:r>
+              <a:rPr lang="en-US" sz="2800" dirty="0" smtClean="0"/>
+              <a:t>Player start/end point</a:t>
+            </a:r>
+          </a:p>
+          <a:p>
+            <a:pPr marL="457200" indent="-457200">
+              <a:buFont typeface="Wingdings" panose="05000000000000000000" pitchFamily="2" charset="2"/>
+              <a:buChar char="q"/>
+            </a:pPr>
+            <a:r>
+              <a:rPr lang="en-US" sz="2800" dirty="0" smtClean="0"/>
+              <a:t>Enemy spawn locations</a:t>
+            </a:r>
+          </a:p>
+          <a:p>
+            <a:pPr marL="457200" indent="-457200">
+              <a:buFont typeface="Wingdings" panose="05000000000000000000" pitchFamily="2" charset="2"/>
+              <a:buChar char="q"/>
+            </a:pPr>
+            <a:r>
+              <a:rPr lang="en-US" sz="2800" dirty="0" smtClean="0"/>
+              <a:t>Obstacles</a:t>
+            </a:r>
+          </a:p>
+          <a:p>
+            <a:pPr marL="457200" indent="-457200">
+              <a:buFont typeface="Wingdings" panose="05000000000000000000" pitchFamily="2" charset="2"/>
+              <a:buChar char="q"/>
+            </a:pPr>
+            <a:r>
+              <a:rPr lang="en-US" sz="2800" dirty="0" smtClean="0"/>
+              <a:t>Different terrains</a:t>
+            </a:r>
+          </a:p>
+        </p:txBody>
+      </p:sp>
     </p:spTree>
     <p:extLst>
       <p:ext uri="{BB962C8B-B14F-4D97-AF65-F5344CB8AC3E}">
-        <p14:creationId xmlns:p14="http://schemas.microsoft.com/office/powerpoint/2010/main" val="2886218978"/>
+        <p14:creationId xmlns:p14="http://schemas.microsoft.com/office/powerpoint/2010/main" val="2279057902"/>
       </p:ext>
     </p:extLst>
   </p:cSld>

</xml_diff>

<commit_message>
Very minor changes to documentations.
</commit_message>
<xml_diff>
--- a/Documentation/UnityGameRequirementsPPT.pptx
+++ b/Documentation/UnityGameRequirementsPPT.pptx
@@ -4297,13 +4297,8 @@
             </a:pPr>
             <a:r>
               <a:rPr lang="en-US" dirty="0" smtClean="0"/>
-              <a:t>A team of students from the College of Creative Studies have built up a collection of artwork including 3D models, textures, video, and sounds.  H</a:t>
-            </a:r>
-            <a:r>
-              <a:rPr lang="en-US" dirty="0" smtClean="0"/>
-              <a:t>owever, they lack the training and experience needed to implement and combine all of these assets in code.</a:t>
-            </a:r>
-            <a:endParaRPr lang="en-US" dirty="0" smtClean="0"/>
+              <a:t>A team of students from the College of Creative Studies have built up a collection of artwork including 3D models, textures, video, and sounds.  However, they lack the training and experience needed to implement and combine all of these assets in code.</a:t>
+            </a:r>
           </a:p>
           <a:p>
             <a:pPr>
@@ -4972,21 +4967,8 @@
             </a:pPr>
             <a:r>
               <a:rPr lang="en-US" sz="2800" dirty="0" smtClean="0"/>
-              <a:t>Will take the role </a:t>
-            </a:r>
-            <a:r>
-              <a:rPr lang="en-US" sz="2800" dirty="0" smtClean="0"/>
-              <a:t>as a </a:t>
-            </a:r>
-            <a:r>
-              <a:rPr lang="en-US" sz="2800" dirty="0" smtClean="0"/>
-              <a:t>stress </a:t>
-            </a:r>
-            <a:r>
-              <a:rPr lang="en-US" sz="2800" dirty="0" smtClean="0"/>
-              <a:t>reliever, hobby/entertainment, or as a competition.</a:t>
-            </a:r>
-            <a:endParaRPr lang="en-US" sz="2800" dirty="0" smtClean="0"/>
+              <a:t>Will take the role as a stress reliever, hobby/entertainment, or as a competition.</a:t>
+            </a:r>
           </a:p>
         </p:txBody>
       </p:sp>
@@ -5138,13 +5120,6 @@
               <a:rPr lang="en-US" sz="2800" dirty="0" smtClean="0"/>
               <a:t>English only </a:t>
             </a:r>
-            <a:r>
-              <a:rPr lang="en-US" sz="2800" dirty="0" smtClean="0">
-                <a:sym typeface="Wingdings" panose="05000000000000000000" pitchFamily="2" charset="2"/>
-              </a:rPr>
-              <a:t></a:t>
-            </a:r>
-            <a:endParaRPr lang="en-US" sz="2800" dirty="0" smtClean="0"/>
           </a:p>
           <a:p>
             <a:pPr>
@@ -5501,11 +5476,7 @@
             </a:pPr>
             <a:r>
               <a:rPr lang="en-US" sz="2800" dirty="0" smtClean="0"/>
-              <a:t>Mouse &amp; keyboard should feel as an extension of the user to his/her </a:t>
-            </a:r>
-            <a:r>
-              <a:rPr lang="en-US" sz="2800" dirty="0" smtClean="0"/>
-              <a:t>avatar.</a:t>
+              <a:t>Mouse &amp; keyboard should feel as an extension of the user to his/her avatar.</a:t>
             </a:r>
             <a:endParaRPr lang="en-US" sz="2800" dirty="0"/>
           </a:p>

</xml_diff>

<commit_message>
Added screenshots of the menu, in-game menu, and in-game w/ HUD
</commit_message>
<xml_diff>
--- a/Documentation/UnityGameRequirementsPPT.pptx
+++ b/Documentation/UnityGameRequirementsPPT.pptx
@@ -5,19 +5,22 @@
     <p:sldMasterId id="2147483648" r:id="rId1"/>
   </p:sldMasterIdLst>
   <p:handoutMasterIdLst>
-    <p:handoutMasterId r:id="rId12"/>
+    <p:handoutMasterId r:id="rId15"/>
   </p:handoutMasterIdLst>
   <p:sldIdLst>
     <p:sldId id="256" r:id="rId2"/>
     <p:sldId id="264" r:id="rId3"/>
     <p:sldId id="265" r:id="rId4"/>
     <p:sldId id="267" r:id="rId5"/>
-    <p:sldId id="268" r:id="rId6"/>
-    <p:sldId id="269" r:id="rId7"/>
-    <p:sldId id="270" r:id="rId8"/>
-    <p:sldId id="271" r:id="rId9"/>
-    <p:sldId id="273" r:id="rId10"/>
-    <p:sldId id="272" r:id="rId11"/>
+    <p:sldId id="274" r:id="rId6"/>
+    <p:sldId id="275" r:id="rId7"/>
+    <p:sldId id="276" r:id="rId8"/>
+    <p:sldId id="268" r:id="rId9"/>
+    <p:sldId id="269" r:id="rId10"/>
+    <p:sldId id="270" r:id="rId11"/>
+    <p:sldId id="271" r:id="rId12"/>
+    <p:sldId id="273" r:id="rId13"/>
+    <p:sldId id="272" r:id="rId14"/>
   </p:sldIdLst>
   <p:sldSz cx="12192000" cy="6858000"/>
   <p:notesSz cx="9312275" cy="6858000"/>
@@ -218,7 +221,7 @@
           <a:p>
             <a:fld id="{36F12CB1-DABA-4CBD-967D-6A1DEAF14A26}" type="datetimeFigureOut">
               <a:rPr lang="en-US" smtClean="0"/>
-              <a:t>2/16/2015</a:t>
+              <a:t>2/18/2015</a:t>
             </a:fld>
             <a:endParaRPr lang="en-US"/>
           </a:p>
@@ -527,7 +530,7 @@
           <a:p>
             <a:fld id="{4BDF68E2-58F2-4D09-BE8B-E3BD06533059}" type="datetimeFigureOut">
               <a:rPr lang="en-US" dirty="0"/>
-              <a:t>2/16/2015</a:t>
+              <a:t>2/18/2015</a:t>
             </a:fld>
             <a:endParaRPr lang="en-US" dirty="0"/>
           </a:p>
@@ -730,7 +733,7 @@
           <a:p>
             <a:fld id="{2E2D6473-DF6D-4702-B328-E0DD40540A4E}" type="datetimeFigureOut">
               <a:rPr lang="en-US" dirty="0"/>
-              <a:t>2/16/2015</a:t>
+              <a:t>2/18/2015</a:t>
             </a:fld>
             <a:endParaRPr lang="en-US" dirty="0"/>
           </a:p>
@@ -981,7 +984,7 @@
           <a:p>
             <a:fld id="{E26F7E3A-B166-407D-9866-32884E7D5B37}" type="datetimeFigureOut">
               <a:rPr lang="en-US" dirty="0"/>
-              <a:t>2/16/2015</a:t>
+              <a:t>2/18/2015</a:t>
             </a:fld>
             <a:endParaRPr lang="en-US" dirty="0"/>
           </a:p>
@@ -1150,7 +1153,7 @@
           <a:p>
             <a:fld id="{528FC5F6-F338-4AE4-BB23-26385BCFC423}" type="datetimeFigureOut">
               <a:rPr lang="en-US" dirty="0"/>
-              <a:t>2/16/2015</a:t>
+              <a:t>2/18/2015</a:t>
             </a:fld>
             <a:endParaRPr lang="en-US" dirty="0"/>
           </a:p>
@@ -1488,7 +1491,7 @@
           <a:p>
             <a:fld id="{20EBB0C4-6273-4C6E-B9BD-2EDC30F1CD52}" type="datetimeFigureOut">
               <a:rPr lang="en-US" dirty="0"/>
-              <a:t>2/16/2015</a:t>
+              <a:t>2/18/2015</a:t>
             </a:fld>
             <a:endParaRPr lang="en-US" dirty="0"/>
           </a:p>
@@ -1758,7 +1761,7 @@
           <a:p>
             <a:fld id="{19AB4D41-86C1-4908-B66A-0B50CEB3BF29}" type="datetimeFigureOut">
               <a:rPr lang="en-US" dirty="0"/>
-              <a:t>2/16/2015</a:t>
+              <a:t>2/18/2015</a:t>
             </a:fld>
             <a:endParaRPr lang="en-US" dirty="0"/>
           </a:p>
@@ -2132,7 +2135,7 @@
           <a:p>
             <a:fld id="{E6426E2C-56C1-4E0D-A793-0088A7FDD37E}" type="datetimeFigureOut">
               <a:rPr lang="en-US" dirty="0"/>
-              <a:t>2/16/2015</a:t>
+              <a:t>2/18/2015</a:t>
             </a:fld>
             <a:endParaRPr lang="en-US" dirty="0"/>
           </a:p>
@@ -2245,7 +2248,7 @@
           <a:p>
             <a:fld id="{C8C39B41-D8B5-4052-B551-9B5525EAA8B6}" type="datetimeFigureOut">
               <a:rPr lang="en-US" dirty="0"/>
-              <a:t>2/16/2015</a:t>
+              <a:t>2/18/2015</a:t>
             </a:fld>
             <a:endParaRPr lang="en-US" dirty="0"/>
           </a:p>
@@ -2411,7 +2414,7 @@
           <a:p>
             <a:fld id="{4D94136C-8742-45B2-AF27-D93DF72833A9}" type="datetimeFigureOut">
               <a:rPr lang="en-US" dirty="0"/>
-              <a:t>2/16/2015</a:t>
+              <a:t>2/18/2015</a:t>
             </a:fld>
             <a:endParaRPr lang="en-US" dirty="0"/>
           </a:p>
@@ -2761,7 +2764,7 @@
           <a:p>
             <a:fld id="{32ABBEA6-7C60-4B02-AE87-00D78D8422AF}" type="datetimeFigureOut">
               <a:rPr lang="en-US" dirty="0"/>
-              <a:t>2/16/2015</a:t>
+              <a:t>2/18/2015</a:t>
             </a:fld>
             <a:endParaRPr lang="en-US" dirty="0"/>
           </a:p>
@@ -3139,7 +3142,7 @@
           <a:p>
             <a:fld id="{C9CAD897-D46E-4AD2-BD9B-49DD3E640873}" type="datetimeFigureOut">
               <a:rPr lang="en-US" dirty="0"/>
-              <a:t>2/16/2015</a:t>
+              <a:t>2/18/2015</a:t>
             </a:fld>
             <a:endParaRPr lang="en-US" dirty="0"/>
           </a:p>
@@ -3421,7 +3424,7 @@
           <a:p>
             <a:fld id="{98624D31-43A5-475A-80CF-332C9F6DCF35}" type="datetimeFigureOut">
               <a:rPr lang="en-US" dirty="0"/>
-              <a:t>2/16/2015</a:t>
+              <a:t>2/18/2015</a:t>
             </a:fld>
             <a:endParaRPr lang="en-US" dirty="0"/>
           </a:p>
@@ -4083,6 +4086,537 @@
           <a:chExt cx="0" cy="0"/>
         </a:xfrm>
       </p:grpSpPr>
+      <p:pic>
+        <p:nvPicPr>
+          <p:cNvPr id="6" name="Picture 5"/>
+          <p:cNvPicPr>
+            <a:picLocks noChangeAspect="1"/>
+          </p:cNvPicPr>
+          <p:nvPr/>
+        </p:nvPicPr>
+        <p:blipFill>
+          <a:blip r:embed="rId2">
+            <a:extLst>
+              <a:ext uri="{28A0092B-C50C-407E-A947-70E740481C1C}">
+                <a14:useLocalDpi xmlns:a14="http://schemas.microsoft.com/office/drawing/2010/main" val="0"/>
+              </a:ext>
+            </a:extLst>
+          </a:blip>
+          <a:stretch>
+            <a:fillRect/>
+          </a:stretch>
+        </p:blipFill>
+        <p:spPr>
+          <a:xfrm rot="5400000">
+            <a:off x="4915301" y="1402444"/>
+            <a:ext cx="2422357" cy="6034320"/>
+          </a:xfrm>
+          <a:prstGeom prst="roundRect">
+            <a:avLst>
+              <a:gd name="adj" fmla="val 8594"/>
+            </a:avLst>
+          </a:prstGeom>
+          <a:solidFill>
+            <a:srgbClr val="FFFFFF">
+              <a:shade val="85000"/>
+            </a:srgbClr>
+          </a:solidFill>
+          <a:ln>
+            <a:noFill/>
+          </a:ln>
+          <a:effectLst>
+            <a:reflection blurRad="12700" stA="38000" endPos="28000" dist="5000" dir="5400000" sy="-100000" algn="bl" rotWithShape="0"/>
+          </a:effectLst>
+        </p:spPr>
+      </p:pic>
+      <p:sp>
+        <p:nvSpPr>
+          <p:cNvPr id="2" name="Title 1"/>
+          <p:cNvSpPr>
+            <a:spLocks noGrp="1"/>
+          </p:cNvSpPr>
+          <p:nvPr>
+            <p:ph type="title"/>
+          </p:nvPr>
+        </p:nvSpPr>
+        <p:spPr/>
+        <p:txBody>
+          <a:bodyPr/>
+          <a:lstStyle/>
+          <a:p>
+            <a:r>
+              <a:rPr lang="en-US" dirty="0" smtClean="0"/>
+              <a:t>Game Features</a:t>
+            </a:r>
+            <a:endParaRPr lang="en-US" dirty="0"/>
+          </a:p>
+        </p:txBody>
+      </p:sp>
+      <p:sp>
+        <p:nvSpPr>
+          <p:cNvPr id="3" name="Content Placeholder 2"/>
+          <p:cNvSpPr>
+            <a:spLocks noGrp="1"/>
+          </p:cNvSpPr>
+          <p:nvPr>
+            <p:ph idx="1"/>
+          </p:nvPr>
+        </p:nvSpPr>
+        <p:spPr/>
+        <p:txBody>
+          <a:bodyPr>
+            <a:normAutofit/>
+          </a:bodyPr>
+          <a:lstStyle/>
+          <a:p>
+            <a:pPr>
+              <a:buFont typeface="Courier New" panose="02070309020205020404" pitchFamily="49" charset="0"/>
+              <a:buChar char="o"/>
+            </a:pPr>
+            <a:r>
+              <a:rPr lang="en-US" sz="2800" dirty="0" smtClean="0"/>
+              <a:t>Final product expected to be very stable</a:t>
+            </a:r>
+            <a:endParaRPr lang="en-US" sz="2800" dirty="0"/>
+          </a:p>
+          <a:p>
+            <a:pPr>
+              <a:buFont typeface="Courier New" panose="02070309020205020404" pitchFamily="49" charset="0"/>
+              <a:buChar char="o"/>
+            </a:pPr>
+            <a:r>
+              <a:rPr lang="en-US" sz="2800" dirty="0" smtClean="0"/>
+              <a:t>Mouse &amp; keyboard should feel as an extension of the user to his/her avatar.</a:t>
+            </a:r>
+            <a:endParaRPr lang="en-US" sz="2800" dirty="0"/>
+          </a:p>
+        </p:txBody>
+      </p:sp>
+    </p:spTree>
+    <p:extLst>
+      <p:ext uri="{BB962C8B-B14F-4D97-AF65-F5344CB8AC3E}">
+        <p14:creationId xmlns:p14="http://schemas.microsoft.com/office/powerpoint/2010/main" val="3059164976"/>
+      </p:ext>
+    </p:extLst>
+  </p:cSld>
+  <p:clrMapOvr>
+    <a:masterClrMapping/>
+  </p:clrMapOvr>
+  <p:timing>
+    <p:tnLst>
+      <p:par>
+        <p:cTn id="1" dur="indefinite" restart="never" nodeType="tmRoot"/>
+      </p:par>
+    </p:tnLst>
+  </p:timing>
+</p:sld>
+</file>
+
+<file path=ppt/slides/slide11.xml><?xml version="1.0" encoding="utf-8"?>
+<p:sld xmlns:a="http://schemas.openxmlformats.org/drawingml/2006/main" xmlns:r="http://schemas.openxmlformats.org/officeDocument/2006/relationships" xmlns:p="http://schemas.openxmlformats.org/presentationml/2006/main">
+  <p:cSld>
+    <p:spTree>
+      <p:nvGrpSpPr>
+        <p:cNvPr id="1" name=""/>
+        <p:cNvGrpSpPr/>
+        <p:nvPr/>
+      </p:nvGrpSpPr>
+      <p:grpSpPr>
+        <a:xfrm>
+          <a:off x="0" y="0"/>
+          <a:ext cx="0" cy="0"/>
+          <a:chOff x="0" y="0"/>
+          <a:chExt cx="0" cy="0"/>
+        </a:xfrm>
+      </p:grpSpPr>
+      <p:sp>
+        <p:nvSpPr>
+          <p:cNvPr id="2" name="Title 1"/>
+          <p:cNvSpPr>
+            <a:spLocks noGrp="1"/>
+          </p:cNvSpPr>
+          <p:nvPr>
+            <p:ph type="title"/>
+          </p:nvPr>
+        </p:nvSpPr>
+        <p:spPr/>
+        <p:txBody>
+          <a:bodyPr/>
+          <a:lstStyle/>
+          <a:p>
+            <a:r>
+              <a:rPr lang="en-US" dirty="0" smtClean="0"/>
+              <a:t>Functional Requirements</a:t>
+            </a:r>
+            <a:endParaRPr lang="en-US" dirty="0"/>
+          </a:p>
+        </p:txBody>
+      </p:sp>
+      <p:sp>
+        <p:nvSpPr>
+          <p:cNvPr id="3" name="Content Placeholder 2"/>
+          <p:cNvSpPr>
+            <a:spLocks noGrp="1"/>
+          </p:cNvSpPr>
+          <p:nvPr>
+            <p:ph idx="1"/>
+          </p:nvPr>
+        </p:nvSpPr>
+        <p:spPr/>
+        <p:txBody>
+          <a:bodyPr/>
+          <a:lstStyle/>
+          <a:p>
+            <a:pPr>
+              <a:buFont typeface="Courier New" panose="02070309020205020404" pitchFamily="49" charset="0"/>
+              <a:buChar char="o"/>
+            </a:pPr>
+            <a:r>
+              <a:rPr lang="en-US" dirty="0" smtClean="0"/>
+              <a:t>Game Setup and Creation</a:t>
+            </a:r>
+            <a:endParaRPr lang="en-US" dirty="0"/>
+          </a:p>
+          <a:p>
+            <a:pPr lvl="1">
+              <a:buFont typeface="Courier New" panose="02070309020205020404" pitchFamily="49" charset="0"/>
+              <a:buChar char="o"/>
+            </a:pPr>
+            <a:r>
+              <a:rPr lang="en-US" dirty="0" smtClean="0"/>
+              <a:t>Installation</a:t>
+            </a:r>
+          </a:p>
+          <a:p>
+            <a:pPr lvl="1">
+              <a:buFont typeface="Courier New" panose="02070309020205020404" pitchFamily="49" charset="0"/>
+              <a:buChar char="o"/>
+            </a:pPr>
+            <a:r>
+              <a:rPr lang="en-US" dirty="0" smtClean="0"/>
+              <a:t>Start/End Game</a:t>
+            </a:r>
+            <a:endParaRPr lang="en-US" dirty="0"/>
+          </a:p>
+          <a:p>
+            <a:pPr>
+              <a:buFont typeface="Courier New" panose="02070309020205020404" pitchFamily="49" charset="0"/>
+              <a:buChar char="o"/>
+            </a:pPr>
+            <a:r>
+              <a:rPr lang="en-US" dirty="0" smtClean="0"/>
+              <a:t>Gameplay and In-Game Interactions</a:t>
+            </a:r>
+          </a:p>
+          <a:p>
+            <a:pPr lvl="1">
+              <a:buFont typeface="Courier New" panose="02070309020205020404" pitchFamily="49" charset="0"/>
+              <a:buChar char="o"/>
+            </a:pPr>
+            <a:r>
+              <a:rPr lang="en-US" dirty="0" smtClean="0"/>
+              <a:t>Generate game world, player, enemies, friendlies, HUD</a:t>
+            </a:r>
+          </a:p>
+        </p:txBody>
+      </p:sp>
+      <p:pic>
+        <p:nvPicPr>
+          <p:cNvPr id="4" name="Picture 3"/>
+          <p:cNvPicPr>
+            <a:picLocks noChangeAspect="1"/>
+          </p:cNvPicPr>
+          <p:nvPr/>
+        </p:nvPicPr>
+        <p:blipFill>
+          <a:blip r:embed="rId2">
+            <a:extLst>
+              <a:ext uri="{28A0092B-C50C-407E-A947-70E740481C1C}">
+                <a14:useLocalDpi xmlns:a14="http://schemas.microsoft.com/office/drawing/2010/main" val="0"/>
+              </a:ext>
+            </a:extLst>
+          </a:blip>
+          <a:stretch>
+            <a:fillRect/>
+          </a:stretch>
+        </p:blipFill>
+        <p:spPr>
+          <a:xfrm>
+            <a:off x="1097280" y="3670409"/>
+            <a:ext cx="2448267" cy="2581635"/>
+          </a:xfrm>
+          <a:prstGeom prst="roundRect">
+            <a:avLst>
+              <a:gd name="adj" fmla="val 8594"/>
+            </a:avLst>
+          </a:prstGeom>
+          <a:solidFill>
+            <a:srgbClr val="FFFFFF">
+              <a:shade val="85000"/>
+            </a:srgbClr>
+          </a:solidFill>
+          <a:ln>
+            <a:noFill/>
+          </a:ln>
+          <a:effectLst>
+            <a:reflection blurRad="12700" stA="38000" endPos="28000" dist="5000" dir="5400000" sy="-100000" algn="bl" rotWithShape="0"/>
+          </a:effectLst>
+        </p:spPr>
+      </p:pic>
+      <p:pic>
+        <p:nvPicPr>
+          <p:cNvPr id="5" name="Picture 4"/>
+          <p:cNvPicPr>
+            <a:picLocks noChangeAspect="1"/>
+          </p:cNvPicPr>
+          <p:nvPr/>
+        </p:nvPicPr>
+        <p:blipFill>
+          <a:blip r:embed="rId3">
+            <a:extLst>
+              <a:ext uri="{28A0092B-C50C-407E-A947-70E740481C1C}">
+                <a14:useLocalDpi xmlns:a14="http://schemas.microsoft.com/office/drawing/2010/main" val="0"/>
+              </a:ext>
+            </a:extLst>
+          </a:blip>
+          <a:stretch>
+            <a:fillRect/>
+          </a:stretch>
+        </p:blipFill>
+        <p:spPr>
+          <a:xfrm>
+            <a:off x="7874071" y="1974721"/>
+            <a:ext cx="2685336" cy="3894373"/>
+          </a:xfrm>
+          <a:prstGeom prst="roundRect">
+            <a:avLst>
+              <a:gd name="adj" fmla="val 8594"/>
+            </a:avLst>
+          </a:prstGeom>
+          <a:solidFill>
+            <a:srgbClr val="FFFFFF">
+              <a:shade val="85000"/>
+            </a:srgbClr>
+          </a:solidFill>
+          <a:ln>
+            <a:noFill/>
+          </a:ln>
+          <a:effectLst>
+            <a:reflection blurRad="12700" stA="38000" endPos="28000" dist="5000" dir="5400000" sy="-100000" algn="bl" rotWithShape="0"/>
+          </a:effectLst>
+        </p:spPr>
+      </p:pic>
+    </p:spTree>
+    <p:extLst>
+      <p:ext uri="{BB962C8B-B14F-4D97-AF65-F5344CB8AC3E}">
+        <p14:creationId xmlns:p14="http://schemas.microsoft.com/office/powerpoint/2010/main" val="2886218978"/>
+      </p:ext>
+    </p:extLst>
+  </p:cSld>
+  <p:clrMapOvr>
+    <a:masterClrMapping/>
+  </p:clrMapOvr>
+  <p:timing>
+    <p:tnLst>
+      <p:par>
+        <p:cTn id="1" dur="indefinite" restart="never" nodeType="tmRoot"/>
+      </p:par>
+    </p:tnLst>
+  </p:timing>
+</p:sld>
+</file>
+
+<file path=ppt/slides/slide12.xml><?xml version="1.0" encoding="utf-8"?>
+<p:sld xmlns:a="http://schemas.openxmlformats.org/drawingml/2006/main" xmlns:r="http://schemas.openxmlformats.org/officeDocument/2006/relationships" xmlns:p="http://schemas.openxmlformats.org/presentationml/2006/main">
+  <p:cSld>
+    <p:spTree>
+      <p:nvGrpSpPr>
+        <p:cNvPr id="1" name=""/>
+        <p:cNvGrpSpPr/>
+        <p:nvPr/>
+      </p:nvGrpSpPr>
+      <p:grpSpPr>
+        <a:xfrm>
+          <a:off x="0" y="0"/>
+          <a:ext cx="0" cy="0"/>
+          <a:chOff x="0" y="0"/>
+          <a:chExt cx="0" cy="0"/>
+        </a:xfrm>
+      </p:grpSpPr>
+      <p:pic>
+        <p:nvPicPr>
+          <p:cNvPr id="4" name="Picture 3"/>
+          <p:cNvPicPr>
+            <a:picLocks noChangeAspect="1"/>
+          </p:cNvPicPr>
+          <p:nvPr/>
+        </p:nvPicPr>
+        <p:blipFill>
+          <a:blip r:embed="rId2">
+            <a:extLst>
+              <a:ext uri="{28A0092B-C50C-407E-A947-70E740481C1C}">
+                <a14:useLocalDpi xmlns:a14="http://schemas.microsoft.com/office/drawing/2010/main" val="0"/>
+              </a:ext>
+            </a:extLst>
+          </a:blip>
+          <a:stretch>
+            <a:fillRect/>
+          </a:stretch>
+        </p:blipFill>
+        <p:spPr>
+          <a:xfrm>
+            <a:off x="5462954" y="304767"/>
+            <a:ext cx="5080000" cy="6142567"/>
+          </a:xfrm>
+          <a:prstGeom prst="roundRect">
+            <a:avLst>
+              <a:gd name="adj" fmla="val 8594"/>
+            </a:avLst>
+          </a:prstGeom>
+          <a:solidFill>
+            <a:srgbClr val="FFFFFF">
+              <a:shade val="85000"/>
+            </a:srgbClr>
+          </a:solidFill>
+          <a:ln>
+            <a:noFill/>
+          </a:ln>
+          <a:effectLst>
+            <a:reflection blurRad="12700" stA="38000" endPos="28000" dist="5000" dir="5400000" sy="-100000" algn="bl" rotWithShape="0"/>
+          </a:effectLst>
+        </p:spPr>
+      </p:pic>
+      <p:sp>
+        <p:nvSpPr>
+          <p:cNvPr id="5" name="Title 4"/>
+          <p:cNvSpPr>
+            <a:spLocks noGrp="1"/>
+          </p:cNvSpPr>
+          <p:nvPr>
+            <p:ph type="title"/>
+          </p:nvPr>
+        </p:nvSpPr>
+        <p:spPr>
+          <a:xfrm>
+            <a:off x="457200" y="594359"/>
+            <a:ext cx="3200400" cy="749887"/>
+          </a:xfrm>
+        </p:spPr>
+        <p:txBody>
+          <a:bodyPr>
+            <a:normAutofit/>
+          </a:bodyPr>
+          <a:lstStyle/>
+          <a:p>
+            <a:pPr algn="ctr"/>
+            <a:r>
+              <a:rPr lang="en-US" sz="4800" dirty="0" smtClean="0"/>
+              <a:t>The Island</a:t>
+            </a:r>
+            <a:endParaRPr lang="en-US" sz="4800" dirty="0"/>
+          </a:p>
+        </p:txBody>
+      </p:sp>
+      <p:sp>
+        <p:nvSpPr>
+          <p:cNvPr id="7" name="Text Placeholder 6"/>
+          <p:cNvSpPr>
+            <a:spLocks noGrp="1"/>
+          </p:cNvSpPr>
+          <p:nvPr>
+            <p:ph type="body" sz="half" idx="2"/>
+          </p:nvPr>
+        </p:nvSpPr>
+        <p:spPr>
+          <a:xfrm>
+            <a:off x="457200" y="1414585"/>
+            <a:ext cx="3200400" cy="4890619"/>
+          </a:xfrm>
+        </p:spPr>
+        <p:txBody>
+          <a:bodyPr>
+            <a:normAutofit/>
+          </a:bodyPr>
+          <a:lstStyle/>
+          <a:p>
+            <a:pPr marL="457200" indent="-457200">
+              <a:buFont typeface="Wingdings" panose="05000000000000000000" pitchFamily="2" charset="2"/>
+              <a:buChar char="q"/>
+            </a:pPr>
+            <a:r>
+              <a:rPr lang="en-US" sz="2800" dirty="0" smtClean="0"/>
+              <a:t>Player start/end point</a:t>
+            </a:r>
+          </a:p>
+          <a:p>
+            <a:pPr marL="457200" indent="-457200">
+              <a:buFont typeface="Wingdings" panose="05000000000000000000" pitchFamily="2" charset="2"/>
+              <a:buChar char="q"/>
+            </a:pPr>
+            <a:r>
+              <a:rPr lang="en-US" sz="2800" dirty="0" smtClean="0"/>
+              <a:t>Enemy spawn locations</a:t>
+            </a:r>
+          </a:p>
+          <a:p>
+            <a:pPr marL="457200" indent="-457200">
+              <a:buFont typeface="Wingdings" panose="05000000000000000000" pitchFamily="2" charset="2"/>
+              <a:buChar char="q"/>
+            </a:pPr>
+            <a:r>
+              <a:rPr lang="en-US" sz="2800" dirty="0" smtClean="0"/>
+              <a:t>Obstacles</a:t>
+            </a:r>
+          </a:p>
+          <a:p>
+            <a:pPr marL="457200" indent="-457200">
+              <a:buFont typeface="Wingdings" panose="05000000000000000000" pitchFamily="2" charset="2"/>
+              <a:buChar char="q"/>
+            </a:pPr>
+            <a:r>
+              <a:rPr lang="en-US" sz="2800" dirty="0" smtClean="0"/>
+              <a:t>Different terrains</a:t>
+            </a:r>
+          </a:p>
+        </p:txBody>
+      </p:sp>
+    </p:spTree>
+    <p:extLst>
+      <p:ext uri="{BB962C8B-B14F-4D97-AF65-F5344CB8AC3E}">
+        <p14:creationId xmlns:p14="http://schemas.microsoft.com/office/powerpoint/2010/main" val="2279057902"/>
+      </p:ext>
+    </p:extLst>
+  </p:cSld>
+  <p:clrMapOvr>
+    <a:masterClrMapping/>
+  </p:clrMapOvr>
+  <p:timing>
+    <p:tnLst>
+      <p:par>
+        <p:cTn id="1" dur="indefinite" restart="never" nodeType="tmRoot"/>
+      </p:par>
+    </p:tnLst>
+  </p:timing>
+</p:sld>
+</file>
+
+<file path=ppt/slides/slide13.xml><?xml version="1.0" encoding="utf-8"?>
+<p:sld xmlns:a="http://schemas.openxmlformats.org/drawingml/2006/main" xmlns:r="http://schemas.openxmlformats.org/officeDocument/2006/relationships" xmlns:p="http://schemas.openxmlformats.org/presentationml/2006/main">
+  <p:cSld>
+    <p:spTree>
+      <p:nvGrpSpPr>
+        <p:cNvPr id="1" name=""/>
+        <p:cNvGrpSpPr/>
+        <p:nvPr/>
+      </p:nvGrpSpPr>
+      <p:grpSpPr>
+        <a:xfrm>
+          <a:off x="0" y="0"/>
+          <a:ext cx="0" cy="0"/>
+          <a:chOff x="0" y="0"/>
+          <a:chExt cx="0" cy="0"/>
+        </a:xfrm>
+      </p:grpSpPr>
       <p:sp>
         <p:nvSpPr>
           <p:cNvPr id="2" name="Title 1"/>
@@ -4820,6 +5354,234 @@
           <a:chExt cx="0" cy="0"/>
         </a:xfrm>
       </p:grpSpPr>
+      <p:sp>
+        <p:nvSpPr>
+          <p:cNvPr id="2" name="Title 1"/>
+          <p:cNvSpPr>
+            <a:spLocks noGrp="1"/>
+          </p:cNvSpPr>
+          <p:nvPr>
+            <p:ph type="title"/>
+          </p:nvPr>
+        </p:nvSpPr>
+        <p:spPr/>
+        <p:txBody>
+          <a:bodyPr/>
+          <a:lstStyle/>
+          <a:p>
+            <a:r>
+              <a:rPr lang="en-US" dirty="0" smtClean="0"/>
+              <a:t>Menu Screen</a:t>
+            </a:r>
+            <a:endParaRPr lang="en-US" dirty="0"/>
+          </a:p>
+        </p:txBody>
+      </p:sp>
+      <p:pic>
+        <p:nvPicPr>
+          <p:cNvPr id="4" name="Picture 3"/>
+          <p:cNvPicPr>
+            <a:picLocks noChangeAspect="1"/>
+          </p:cNvPicPr>
+          <p:nvPr/>
+        </p:nvPicPr>
+        <p:blipFill rotWithShape="1">
+          <a:blip r:embed="rId2"/>
+          <a:srcRect l="278" t="14393" r="12222" b="8495"/>
+          <a:stretch/>
+        </p:blipFill>
+        <p:spPr>
+          <a:xfrm>
+            <a:off x="1676830" y="1845734"/>
+            <a:ext cx="8899300" cy="4409381"/>
+          </a:xfrm>
+          <a:prstGeom prst="rect">
+            <a:avLst/>
+          </a:prstGeom>
+        </p:spPr>
+      </p:pic>
+    </p:spTree>
+    <p:extLst>
+      <p:ext uri="{BB962C8B-B14F-4D97-AF65-F5344CB8AC3E}">
+        <p14:creationId xmlns:p14="http://schemas.microsoft.com/office/powerpoint/2010/main" val="1011527283"/>
+      </p:ext>
+    </p:extLst>
+  </p:cSld>
+  <p:clrMapOvr>
+    <a:masterClrMapping/>
+  </p:clrMapOvr>
+</p:sld>
+</file>
+
+<file path=ppt/slides/slide6.xml><?xml version="1.0" encoding="utf-8"?>
+<p:sld xmlns:a="http://schemas.openxmlformats.org/drawingml/2006/main" xmlns:r="http://schemas.openxmlformats.org/officeDocument/2006/relationships" xmlns:p="http://schemas.openxmlformats.org/presentationml/2006/main">
+  <p:cSld>
+    <p:spTree>
+      <p:nvGrpSpPr>
+        <p:cNvPr id="1" name=""/>
+        <p:cNvGrpSpPr/>
+        <p:nvPr/>
+      </p:nvGrpSpPr>
+      <p:grpSpPr>
+        <a:xfrm>
+          <a:off x="0" y="0"/>
+          <a:ext cx="0" cy="0"/>
+          <a:chOff x="0" y="0"/>
+          <a:chExt cx="0" cy="0"/>
+        </a:xfrm>
+      </p:grpSpPr>
+      <p:sp>
+        <p:nvSpPr>
+          <p:cNvPr id="2" name="Title 1"/>
+          <p:cNvSpPr>
+            <a:spLocks noGrp="1"/>
+          </p:cNvSpPr>
+          <p:nvPr>
+            <p:ph type="title"/>
+          </p:nvPr>
+        </p:nvSpPr>
+        <p:spPr/>
+        <p:txBody>
+          <a:bodyPr/>
+          <a:lstStyle/>
+          <a:p>
+            <a:r>
+              <a:rPr lang="en-US" dirty="0" smtClean="0"/>
+              <a:t>In-Game</a:t>
+            </a:r>
+            <a:endParaRPr lang="en-US" dirty="0"/>
+          </a:p>
+        </p:txBody>
+      </p:sp>
+      <p:pic>
+        <p:nvPicPr>
+          <p:cNvPr id="6" name="Picture 5"/>
+          <p:cNvPicPr>
+            <a:picLocks noChangeAspect="1"/>
+          </p:cNvPicPr>
+          <p:nvPr/>
+        </p:nvPicPr>
+        <p:blipFill rotWithShape="1">
+          <a:blip r:embed="rId2"/>
+          <a:srcRect l="376" t="14392" r="838" b="8319"/>
+          <a:stretch/>
+        </p:blipFill>
+        <p:spPr>
+          <a:xfrm>
+            <a:off x="1149192" y="1880316"/>
+            <a:ext cx="9954576" cy="4378816"/>
+          </a:xfrm>
+          <a:prstGeom prst="rect">
+            <a:avLst/>
+          </a:prstGeom>
+        </p:spPr>
+      </p:pic>
+    </p:spTree>
+    <p:extLst>
+      <p:ext uri="{BB962C8B-B14F-4D97-AF65-F5344CB8AC3E}">
+        <p14:creationId xmlns:p14="http://schemas.microsoft.com/office/powerpoint/2010/main" val="2017368839"/>
+      </p:ext>
+    </p:extLst>
+  </p:cSld>
+  <p:clrMapOvr>
+    <a:masterClrMapping/>
+  </p:clrMapOvr>
+</p:sld>
+</file>
+
+<file path=ppt/slides/slide7.xml><?xml version="1.0" encoding="utf-8"?>
+<p:sld xmlns:a="http://schemas.openxmlformats.org/drawingml/2006/main" xmlns:r="http://schemas.openxmlformats.org/officeDocument/2006/relationships" xmlns:p="http://schemas.openxmlformats.org/presentationml/2006/main">
+  <p:cSld>
+    <p:spTree>
+      <p:nvGrpSpPr>
+        <p:cNvPr id="1" name=""/>
+        <p:cNvGrpSpPr/>
+        <p:nvPr/>
+      </p:nvGrpSpPr>
+      <p:grpSpPr>
+        <a:xfrm>
+          <a:off x="0" y="0"/>
+          <a:ext cx="0" cy="0"/>
+          <a:chOff x="0" y="0"/>
+          <a:chExt cx="0" cy="0"/>
+        </a:xfrm>
+      </p:grpSpPr>
+      <p:sp>
+        <p:nvSpPr>
+          <p:cNvPr id="2" name="Title 1"/>
+          <p:cNvSpPr>
+            <a:spLocks noGrp="1"/>
+          </p:cNvSpPr>
+          <p:nvPr>
+            <p:ph type="title"/>
+          </p:nvPr>
+        </p:nvSpPr>
+        <p:spPr/>
+        <p:txBody>
+          <a:bodyPr/>
+          <a:lstStyle/>
+          <a:p>
+            <a:r>
+              <a:rPr lang="en-US" dirty="0" smtClean="0"/>
+              <a:t>In-Game Menu</a:t>
+            </a:r>
+            <a:endParaRPr lang="en-US" dirty="0"/>
+          </a:p>
+        </p:txBody>
+      </p:sp>
+      <p:pic>
+        <p:nvPicPr>
+          <p:cNvPr id="6" name="Picture 5"/>
+          <p:cNvPicPr>
+            <a:picLocks noChangeAspect="1"/>
+          </p:cNvPicPr>
+          <p:nvPr/>
+        </p:nvPicPr>
+        <p:blipFill rotWithShape="1">
+          <a:blip r:embed="rId2"/>
+          <a:srcRect l="574" t="14569" r="-646" b="8495"/>
+          <a:stretch/>
+        </p:blipFill>
+        <p:spPr>
+          <a:xfrm>
+            <a:off x="1110336" y="1858329"/>
+            <a:ext cx="10032287" cy="4336410"/>
+          </a:xfrm>
+          <a:prstGeom prst="rect">
+            <a:avLst/>
+          </a:prstGeom>
+        </p:spPr>
+      </p:pic>
+    </p:spTree>
+    <p:extLst>
+      <p:ext uri="{BB962C8B-B14F-4D97-AF65-F5344CB8AC3E}">
+        <p14:creationId xmlns:p14="http://schemas.microsoft.com/office/powerpoint/2010/main" val="721650355"/>
+      </p:ext>
+    </p:extLst>
+  </p:cSld>
+  <p:clrMapOvr>
+    <a:masterClrMapping/>
+  </p:clrMapOvr>
+</p:sld>
+</file>
+
+<file path=ppt/slides/slide8.xml><?xml version="1.0" encoding="utf-8"?>
+<p:sld xmlns:a="http://schemas.openxmlformats.org/drawingml/2006/main" xmlns:r="http://schemas.openxmlformats.org/officeDocument/2006/relationships" xmlns:p="http://schemas.openxmlformats.org/presentationml/2006/main">
+  <p:cSld>
+    <p:spTree>
+      <p:nvGrpSpPr>
+        <p:cNvPr id="1" name=""/>
+        <p:cNvGrpSpPr/>
+        <p:nvPr/>
+      </p:nvGrpSpPr>
+      <p:grpSpPr>
+        <a:xfrm>
+          <a:off x="0" y="0"/>
+          <a:ext cx="0" cy="0"/>
+          <a:chOff x="0" y="0"/>
+          <a:chExt cx="0" cy="0"/>
+        </a:xfrm>
+      </p:grpSpPr>
       <p:pic>
         <p:nvPicPr>
           <p:cNvPr id="7" name="Picture 6"/>
@@ -5019,687 +5781,6 @@
     <p:extLst>
       <p:ext uri="{BB962C8B-B14F-4D97-AF65-F5344CB8AC3E}">
         <p14:creationId xmlns:p14="http://schemas.microsoft.com/office/powerpoint/2010/main" val="3925709861"/>
-      </p:ext>
-    </p:extLst>
-  </p:cSld>
-  <p:clrMapOvr>
-    <a:masterClrMapping/>
-  </p:clrMapOvr>
-  <p:timing>
-    <p:tnLst>
-      <p:par>
-        <p:cTn id="1" dur="indefinite" restart="never" nodeType="tmRoot"/>
-      </p:par>
-    </p:tnLst>
-  </p:timing>
-</p:sld>
-</file>
-
-<file path=ppt/slides/slide6.xml><?xml version="1.0" encoding="utf-8"?>
-<p:sld xmlns:a="http://schemas.openxmlformats.org/drawingml/2006/main" xmlns:r="http://schemas.openxmlformats.org/officeDocument/2006/relationships" xmlns:p="http://schemas.openxmlformats.org/presentationml/2006/main">
-  <p:cSld>
-    <p:spTree>
-      <p:nvGrpSpPr>
-        <p:cNvPr id="1" name=""/>
-        <p:cNvGrpSpPr/>
-        <p:nvPr/>
-      </p:nvGrpSpPr>
-      <p:grpSpPr>
-        <a:xfrm>
-          <a:off x="0" y="0"/>
-          <a:ext cx="0" cy="0"/>
-          <a:chOff x="0" y="0"/>
-          <a:chExt cx="0" cy="0"/>
-        </a:xfrm>
-      </p:grpSpPr>
-      <p:sp>
-        <p:nvSpPr>
-          <p:cNvPr id="2" name="Title 1"/>
-          <p:cNvSpPr>
-            <a:spLocks noGrp="1"/>
-          </p:cNvSpPr>
-          <p:nvPr>
-            <p:ph type="title"/>
-          </p:nvPr>
-        </p:nvSpPr>
-        <p:spPr/>
-        <p:txBody>
-          <a:bodyPr/>
-          <a:lstStyle/>
-          <a:p>
-            <a:r>
-              <a:rPr lang="en-US" dirty="0" smtClean="0"/>
-              <a:t>Constraints</a:t>
-            </a:r>
-            <a:endParaRPr lang="en-US" dirty="0"/>
-          </a:p>
-        </p:txBody>
-      </p:sp>
-      <p:sp>
-        <p:nvSpPr>
-          <p:cNvPr id="3" name="Content Placeholder 2"/>
-          <p:cNvSpPr>
-            <a:spLocks noGrp="1"/>
-          </p:cNvSpPr>
-          <p:nvPr>
-            <p:ph idx="1"/>
-          </p:nvPr>
-        </p:nvSpPr>
-        <p:spPr/>
-        <p:txBody>
-          <a:bodyPr/>
-          <a:lstStyle/>
-          <a:p>
-            <a:pPr>
-              <a:buFont typeface="Courier New" panose="02070309020205020404" pitchFamily="49" charset="0"/>
-              <a:buChar char="o"/>
-            </a:pPr>
-            <a:r>
-              <a:rPr lang="en-US" sz="2800" dirty="0" smtClean="0"/>
-              <a:t>Business Constraints</a:t>
-            </a:r>
-            <a:endParaRPr lang="en-US" sz="2800" dirty="0"/>
-          </a:p>
-          <a:p>
-            <a:pPr lvl="1">
-              <a:buFont typeface="Courier New" panose="02070309020205020404" pitchFamily="49" charset="0"/>
-              <a:buChar char="o"/>
-            </a:pPr>
-            <a:r>
-              <a:rPr lang="en-US" sz="2800" dirty="0" smtClean="0"/>
-              <a:t>$500 budget</a:t>
-            </a:r>
-            <a:endParaRPr lang="en-US" sz="2800" dirty="0"/>
-          </a:p>
-          <a:p>
-            <a:pPr lvl="1">
-              <a:buFont typeface="Courier New" panose="02070309020205020404" pitchFamily="49" charset="0"/>
-              <a:buChar char="o"/>
-            </a:pPr>
-            <a:r>
-              <a:rPr lang="en-US" sz="2800" dirty="0" smtClean="0"/>
-              <a:t>English only </a:t>
-            </a:r>
-          </a:p>
-          <a:p>
-            <a:pPr>
-              <a:buFont typeface="Courier New" panose="02070309020205020404" pitchFamily="49" charset="0"/>
-              <a:buChar char="o"/>
-            </a:pPr>
-            <a:r>
-              <a:rPr lang="en-US" sz="2800" dirty="0" smtClean="0"/>
-              <a:t>Technical Constraints</a:t>
-            </a:r>
-          </a:p>
-          <a:p>
-            <a:pPr lvl="1">
-              <a:buFont typeface="Courier New" panose="02070309020205020404" pitchFamily="49" charset="0"/>
-              <a:buChar char="o"/>
-            </a:pPr>
-            <a:r>
-              <a:rPr lang="en-US" sz="2800" dirty="0" smtClean="0"/>
-              <a:t>Windows 7 and 8 support</a:t>
-            </a:r>
-          </a:p>
-          <a:p>
-            <a:pPr lvl="1">
-              <a:buFont typeface="Courier New" panose="02070309020205020404" pitchFamily="49" charset="0"/>
-              <a:buChar char="o"/>
-            </a:pPr>
-            <a:r>
-              <a:rPr lang="en-US" sz="2800" dirty="0" smtClean="0"/>
-              <a:t>20 FPS with minimum requirements</a:t>
-            </a:r>
-          </a:p>
-          <a:p>
-            <a:pPr lvl="1">
-              <a:buFont typeface="Courier New" panose="02070309020205020404" pitchFamily="49" charset="0"/>
-              <a:buChar char="o"/>
-            </a:pPr>
-            <a:r>
-              <a:rPr lang="en-US" sz="2800" dirty="0" smtClean="0"/>
-              <a:t>Unity Engine</a:t>
-            </a:r>
-            <a:endParaRPr lang="en-US" sz="2800" dirty="0"/>
-          </a:p>
-          <a:p>
-            <a:endParaRPr lang="en-US" dirty="0"/>
-          </a:p>
-        </p:txBody>
-      </p:sp>
-      <p:sp>
-        <p:nvSpPr>
-          <p:cNvPr id="4" name="Rectangle 3"/>
-          <p:cNvSpPr/>
-          <p:nvPr/>
-        </p:nvSpPr>
-        <p:spPr>
-          <a:xfrm>
-            <a:off x="7065107" y="2211754"/>
-            <a:ext cx="1578708" cy="1219200"/>
-          </a:xfrm>
-          <a:prstGeom prst="rect">
-            <a:avLst/>
-          </a:prstGeom>
-          <a:solidFill>
-            <a:srgbClr val="C00000"/>
-          </a:solidFill>
-        </p:spPr>
-        <p:style>
-          <a:lnRef idx="2">
-            <a:schemeClr val="accent1">
-              <a:shade val="50000"/>
-            </a:schemeClr>
-          </a:lnRef>
-          <a:fillRef idx="1">
-            <a:schemeClr val="accent1"/>
-          </a:fillRef>
-          <a:effectRef idx="0">
-            <a:schemeClr val="accent1"/>
-          </a:effectRef>
-          <a:fontRef idx="minor">
-            <a:schemeClr val="lt1"/>
-          </a:fontRef>
-        </p:style>
-        <p:txBody>
-          <a:bodyPr rtlCol="0" anchor="ctr"/>
-          <a:lstStyle/>
-          <a:p>
-            <a:pPr algn="ctr"/>
-            <a:endParaRPr lang="en-US"/>
-          </a:p>
-        </p:txBody>
-      </p:sp>
-      <p:sp>
-        <p:nvSpPr>
-          <p:cNvPr id="5" name="Rectangle 4"/>
-          <p:cNvSpPr/>
-          <p:nvPr/>
-        </p:nvSpPr>
-        <p:spPr>
-          <a:xfrm>
-            <a:off x="8879840" y="2211754"/>
-            <a:ext cx="1547446" cy="1219200"/>
-          </a:xfrm>
-          <a:prstGeom prst="rect">
-            <a:avLst/>
-          </a:prstGeom>
-          <a:solidFill>
-            <a:srgbClr val="92D050"/>
-          </a:solidFill>
-        </p:spPr>
-        <p:style>
-          <a:lnRef idx="2">
-            <a:schemeClr val="accent1">
-              <a:shade val="50000"/>
-            </a:schemeClr>
-          </a:lnRef>
-          <a:fillRef idx="1">
-            <a:schemeClr val="accent1"/>
-          </a:fillRef>
-          <a:effectRef idx="0">
-            <a:schemeClr val="accent1"/>
-          </a:effectRef>
-          <a:fontRef idx="minor">
-            <a:schemeClr val="lt1"/>
-          </a:fontRef>
-        </p:style>
-        <p:txBody>
-          <a:bodyPr rtlCol="0" anchor="ctr"/>
-          <a:lstStyle/>
-          <a:p>
-            <a:pPr algn="ctr"/>
-            <a:endParaRPr lang="en-US"/>
-          </a:p>
-        </p:txBody>
-      </p:sp>
-      <p:sp>
-        <p:nvSpPr>
-          <p:cNvPr id="6" name="Rectangle 5"/>
-          <p:cNvSpPr/>
-          <p:nvPr/>
-        </p:nvSpPr>
-        <p:spPr>
-          <a:xfrm>
-            <a:off x="7065107" y="3539328"/>
-            <a:ext cx="1578708" cy="1141046"/>
-          </a:xfrm>
-          <a:prstGeom prst="rect">
-            <a:avLst/>
-          </a:prstGeom>
-          <a:solidFill>
-            <a:srgbClr val="00B0F0"/>
-          </a:solidFill>
-        </p:spPr>
-        <p:style>
-          <a:lnRef idx="2">
-            <a:schemeClr val="accent1">
-              <a:shade val="50000"/>
-            </a:schemeClr>
-          </a:lnRef>
-          <a:fillRef idx="1">
-            <a:schemeClr val="accent1"/>
-          </a:fillRef>
-          <a:effectRef idx="0">
-            <a:schemeClr val="accent1"/>
-          </a:effectRef>
-          <a:fontRef idx="minor">
-            <a:schemeClr val="lt1"/>
-          </a:fontRef>
-        </p:style>
-        <p:txBody>
-          <a:bodyPr rtlCol="0" anchor="ctr"/>
-          <a:lstStyle/>
-          <a:p>
-            <a:pPr algn="ctr"/>
-            <a:endParaRPr lang="en-US"/>
-          </a:p>
-        </p:txBody>
-      </p:sp>
-      <p:sp>
-        <p:nvSpPr>
-          <p:cNvPr id="7" name="Rectangle 6"/>
-          <p:cNvSpPr/>
-          <p:nvPr/>
-        </p:nvSpPr>
-        <p:spPr>
-          <a:xfrm>
-            <a:off x="8879840" y="3539328"/>
-            <a:ext cx="1547446" cy="1141046"/>
-          </a:xfrm>
-          <a:prstGeom prst="rect">
-            <a:avLst/>
-          </a:prstGeom>
-          <a:solidFill>
-            <a:srgbClr val="FFFF00"/>
-          </a:solidFill>
-        </p:spPr>
-        <p:style>
-          <a:lnRef idx="2">
-            <a:schemeClr val="accent1">
-              <a:shade val="50000"/>
-            </a:schemeClr>
-          </a:lnRef>
-          <a:fillRef idx="1">
-            <a:schemeClr val="accent1"/>
-          </a:fillRef>
-          <a:effectRef idx="0">
-            <a:schemeClr val="accent1"/>
-          </a:effectRef>
-          <a:fontRef idx="minor">
-            <a:schemeClr val="lt1"/>
-          </a:fontRef>
-        </p:style>
-        <p:txBody>
-          <a:bodyPr rtlCol="0" anchor="ctr"/>
-          <a:lstStyle/>
-          <a:p>
-            <a:pPr algn="ctr"/>
-            <a:endParaRPr lang="en-US"/>
-          </a:p>
-        </p:txBody>
-      </p:sp>
-    </p:spTree>
-    <p:extLst>
-      <p:ext uri="{BB962C8B-B14F-4D97-AF65-F5344CB8AC3E}">
-        <p14:creationId xmlns:p14="http://schemas.microsoft.com/office/powerpoint/2010/main" val="2528391778"/>
-      </p:ext>
-    </p:extLst>
-  </p:cSld>
-  <p:clrMapOvr>
-    <a:masterClrMapping/>
-  </p:clrMapOvr>
-  <p:timing>
-    <p:tnLst>
-      <p:par>
-        <p:cTn id="1" dur="indefinite" restart="never" nodeType="tmRoot"/>
-      </p:par>
-    </p:tnLst>
-  </p:timing>
-</p:sld>
-</file>
-
-<file path=ppt/slides/slide7.xml><?xml version="1.0" encoding="utf-8"?>
-<p:sld xmlns:a="http://schemas.openxmlformats.org/drawingml/2006/main" xmlns:r="http://schemas.openxmlformats.org/officeDocument/2006/relationships" xmlns:p="http://schemas.openxmlformats.org/presentationml/2006/main">
-  <p:cSld>
-    <p:spTree>
-      <p:nvGrpSpPr>
-        <p:cNvPr id="1" name=""/>
-        <p:cNvGrpSpPr/>
-        <p:nvPr/>
-      </p:nvGrpSpPr>
-      <p:grpSpPr>
-        <a:xfrm>
-          <a:off x="0" y="0"/>
-          <a:ext cx="0" cy="0"/>
-          <a:chOff x="0" y="0"/>
-          <a:chExt cx="0" cy="0"/>
-        </a:xfrm>
-      </p:grpSpPr>
-      <p:pic>
-        <p:nvPicPr>
-          <p:cNvPr id="6" name="Picture 5"/>
-          <p:cNvPicPr>
-            <a:picLocks noChangeAspect="1"/>
-          </p:cNvPicPr>
-          <p:nvPr/>
-        </p:nvPicPr>
-        <p:blipFill>
-          <a:blip r:embed="rId2">
-            <a:extLst>
-              <a:ext uri="{28A0092B-C50C-407E-A947-70E740481C1C}">
-                <a14:useLocalDpi xmlns:a14="http://schemas.microsoft.com/office/drawing/2010/main" val="0"/>
-              </a:ext>
-            </a:extLst>
-          </a:blip>
-          <a:stretch>
-            <a:fillRect/>
-          </a:stretch>
-        </p:blipFill>
-        <p:spPr>
-          <a:xfrm rot="5400000">
-            <a:off x="4915301" y="1402444"/>
-            <a:ext cx="2422357" cy="6034320"/>
-          </a:xfrm>
-          <a:prstGeom prst="roundRect">
-            <a:avLst>
-              <a:gd name="adj" fmla="val 8594"/>
-            </a:avLst>
-          </a:prstGeom>
-          <a:solidFill>
-            <a:srgbClr val="FFFFFF">
-              <a:shade val="85000"/>
-            </a:srgbClr>
-          </a:solidFill>
-          <a:ln>
-            <a:noFill/>
-          </a:ln>
-          <a:effectLst>
-            <a:reflection blurRad="12700" stA="38000" endPos="28000" dist="5000" dir="5400000" sy="-100000" algn="bl" rotWithShape="0"/>
-          </a:effectLst>
-        </p:spPr>
-      </p:pic>
-      <p:sp>
-        <p:nvSpPr>
-          <p:cNvPr id="2" name="Title 1"/>
-          <p:cNvSpPr>
-            <a:spLocks noGrp="1"/>
-          </p:cNvSpPr>
-          <p:nvPr>
-            <p:ph type="title"/>
-          </p:nvPr>
-        </p:nvSpPr>
-        <p:spPr/>
-        <p:txBody>
-          <a:bodyPr/>
-          <a:lstStyle/>
-          <a:p>
-            <a:r>
-              <a:rPr lang="en-US" dirty="0" smtClean="0"/>
-              <a:t>Game Features</a:t>
-            </a:r>
-            <a:endParaRPr lang="en-US" dirty="0"/>
-          </a:p>
-        </p:txBody>
-      </p:sp>
-      <p:sp>
-        <p:nvSpPr>
-          <p:cNvPr id="3" name="Content Placeholder 2"/>
-          <p:cNvSpPr>
-            <a:spLocks noGrp="1"/>
-          </p:cNvSpPr>
-          <p:nvPr>
-            <p:ph idx="1"/>
-          </p:nvPr>
-        </p:nvSpPr>
-        <p:spPr/>
-        <p:txBody>
-          <a:bodyPr>
-            <a:normAutofit/>
-          </a:bodyPr>
-          <a:lstStyle/>
-          <a:p>
-            <a:pPr>
-              <a:buFont typeface="Courier New" panose="02070309020205020404" pitchFamily="49" charset="0"/>
-              <a:buChar char="o"/>
-            </a:pPr>
-            <a:r>
-              <a:rPr lang="en-US" sz="2800" dirty="0" smtClean="0"/>
-              <a:t>Final product expected to be very stable</a:t>
-            </a:r>
-            <a:endParaRPr lang="en-US" sz="2800" dirty="0"/>
-          </a:p>
-          <a:p>
-            <a:pPr>
-              <a:buFont typeface="Courier New" panose="02070309020205020404" pitchFamily="49" charset="0"/>
-              <a:buChar char="o"/>
-            </a:pPr>
-            <a:r>
-              <a:rPr lang="en-US" sz="2800" dirty="0" smtClean="0"/>
-              <a:t>Mouse &amp; keyboard should feel as an extension of the user to his/her avatar.</a:t>
-            </a:r>
-            <a:endParaRPr lang="en-US" sz="2800" dirty="0"/>
-          </a:p>
-        </p:txBody>
-      </p:sp>
-    </p:spTree>
-    <p:extLst>
-      <p:ext uri="{BB962C8B-B14F-4D97-AF65-F5344CB8AC3E}">
-        <p14:creationId xmlns:p14="http://schemas.microsoft.com/office/powerpoint/2010/main" val="3059164976"/>
-      </p:ext>
-    </p:extLst>
-  </p:cSld>
-  <p:clrMapOvr>
-    <a:masterClrMapping/>
-  </p:clrMapOvr>
-  <p:timing>
-    <p:tnLst>
-      <p:par>
-        <p:cTn id="1" dur="indefinite" restart="never" nodeType="tmRoot"/>
-      </p:par>
-    </p:tnLst>
-  </p:timing>
-</p:sld>
-</file>
-
-<file path=ppt/slides/slide8.xml><?xml version="1.0" encoding="utf-8"?>
-<p:sld xmlns:a="http://schemas.openxmlformats.org/drawingml/2006/main" xmlns:r="http://schemas.openxmlformats.org/officeDocument/2006/relationships" xmlns:p="http://schemas.openxmlformats.org/presentationml/2006/main">
-  <p:cSld>
-    <p:spTree>
-      <p:nvGrpSpPr>
-        <p:cNvPr id="1" name=""/>
-        <p:cNvGrpSpPr/>
-        <p:nvPr/>
-      </p:nvGrpSpPr>
-      <p:grpSpPr>
-        <a:xfrm>
-          <a:off x="0" y="0"/>
-          <a:ext cx="0" cy="0"/>
-          <a:chOff x="0" y="0"/>
-          <a:chExt cx="0" cy="0"/>
-        </a:xfrm>
-      </p:grpSpPr>
-      <p:sp>
-        <p:nvSpPr>
-          <p:cNvPr id="2" name="Title 1"/>
-          <p:cNvSpPr>
-            <a:spLocks noGrp="1"/>
-          </p:cNvSpPr>
-          <p:nvPr>
-            <p:ph type="title"/>
-          </p:nvPr>
-        </p:nvSpPr>
-        <p:spPr/>
-        <p:txBody>
-          <a:bodyPr/>
-          <a:lstStyle/>
-          <a:p>
-            <a:r>
-              <a:rPr lang="en-US" dirty="0" smtClean="0"/>
-              <a:t>Functional Requirements</a:t>
-            </a:r>
-            <a:endParaRPr lang="en-US" dirty="0"/>
-          </a:p>
-        </p:txBody>
-      </p:sp>
-      <p:sp>
-        <p:nvSpPr>
-          <p:cNvPr id="3" name="Content Placeholder 2"/>
-          <p:cNvSpPr>
-            <a:spLocks noGrp="1"/>
-          </p:cNvSpPr>
-          <p:nvPr>
-            <p:ph idx="1"/>
-          </p:nvPr>
-        </p:nvSpPr>
-        <p:spPr/>
-        <p:txBody>
-          <a:bodyPr/>
-          <a:lstStyle/>
-          <a:p>
-            <a:pPr>
-              <a:buFont typeface="Courier New" panose="02070309020205020404" pitchFamily="49" charset="0"/>
-              <a:buChar char="o"/>
-            </a:pPr>
-            <a:r>
-              <a:rPr lang="en-US" dirty="0" smtClean="0"/>
-              <a:t>Game Setup and Creation</a:t>
-            </a:r>
-            <a:endParaRPr lang="en-US" dirty="0"/>
-          </a:p>
-          <a:p>
-            <a:pPr lvl="1">
-              <a:buFont typeface="Courier New" panose="02070309020205020404" pitchFamily="49" charset="0"/>
-              <a:buChar char="o"/>
-            </a:pPr>
-            <a:r>
-              <a:rPr lang="en-US" dirty="0" smtClean="0"/>
-              <a:t>Installation</a:t>
-            </a:r>
-          </a:p>
-          <a:p>
-            <a:pPr lvl="1">
-              <a:buFont typeface="Courier New" panose="02070309020205020404" pitchFamily="49" charset="0"/>
-              <a:buChar char="o"/>
-            </a:pPr>
-            <a:r>
-              <a:rPr lang="en-US" dirty="0" smtClean="0"/>
-              <a:t>Start/End Game</a:t>
-            </a:r>
-            <a:endParaRPr lang="en-US" dirty="0"/>
-          </a:p>
-          <a:p>
-            <a:pPr>
-              <a:buFont typeface="Courier New" panose="02070309020205020404" pitchFamily="49" charset="0"/>
-              <a:buChar char="o"/>
-            </a:pPr>
-            <a:r>
-              <a:rPr lang="en-US" dirty="0" smtClean="0"/>
-              <a:t>Gameplay and In-Game Interactions</a:t>
-            </a:r>
-          </a:p>
-          <a:p>
-            <a:pPr lvl="1">
-              <a:buFont typeface="Courier New" panose="02070309020205020404" pitchFamily="49" charset="0"/>
-              <a:buChar char="o"/>
-            </a:pPr>
-            <a:r>
-              <a:rPr lang="en-US" dirty="0" smtClean="0"/>
-              <a:t>Generate game world, player, enemies, friendlies, HUD</a:t>
-            </a:r>
-          </a:p>
-        </p:txBody>
-      </p:sp>
-      <p:pic>
-        <p:nvPicPr>
-          <p:cNvPr id="4" name="Picture 3"/>
-          <p:cNvPicPr>
-            <a:picLocks noChangeAspect="1"/>
-          </p:cNvPicPr>
-          <p:nvPr/>
-        </p:nvPicPr>
-        <p:blipFill>
-          <a:blip r:embed="rId2">
-            <a:extLst>
-              <a:ext uri="{28A0092B-C50C-407E-A947-70E740481C1C}">
-                <a14:useLocalDpi xmlns:a14="http://schemas.microsoft.com/office/drawing/2010/main" val="0"/>
-              </a:ext>
-            </a:extLst>
-          </a:blip>
-          <a:stretch>
-            <a:fillRect/>
-          </a:stretch>
-        </p:blipFill>
-        <p:spPr>
-          <a:xfrm>
-            <a:off x="1097280" y="3670409"/>
-            <a:ext cx="2448267" cy="2581635"/>
-          </a:xfrm>
-          <a:prstGeom prst="roundRect">
-            <a:avLst>
-              <a:gd name="adj" fmla="val 8594"/>
-            </a:avLst>
-          </a:prstGeom>
-          <a:solidFill>
-            <a:srgbClr val="FFFFFF">
-              <a:shade val="85000"/>
-            </a:srgbClr>
-          </a:solidFill>
-          <a:ln>
-            <a:noFill/>
-          </a:ln>
-          <a:effectLst>
-            <a:reflection blurRad="12700" stA="38000" endPos="28000" dist="5000" dir="5400000" sy="-100000" algn="bl" rotWithShape="0"/>
-          </a:effectLst>
-        </p:spPr>
-      </p:pic>
-      <p:pic>
-        <p:nvPicPr>
-          <p:cNvPr id="5" name="Picture 4"/>
-          <p:cNvPicPr>
-            <a:picLocks noChangeAspect="1"/>
-          </p:cNvPicPr>
-          <p:nvPr/>
-        </p:nvPicPr>
-        <p:blipFill>
-          <a:blip r:embed="rId3">
-            <a:extLst>
-              <a:ext uri="{28A0092B-C50C-407E-A947-70E740481C1C}">
-                <a14:useLocalDpi xmlns:a14="http://schemas.microsoft.com/office/drawing/2010/main" val="0"/>
-              </a:ext>
-            </a:extLst>
-          </a:blip>
-          <a:stretch>
-            <a:fillRect/>
-          </a:stretch>
-        </p:blipFill>
-        <p:spPr>
-          <a:xfrm>
-            <a:off x="7874071" y="1974721"/>
-            <a:ext cx="2685336" cy="3894373"/>
-          </a:xfrm>
-          <a:prstGeom prst="roundRect">
-            <a:avLst>
-              <a:gd name="adj" fmla="val 8594"/>
-            </a:avLst>
-          </a:prstGeom>
-          <a:solidFill>
-            <a:srgbClr val="FFFFFF">
-              <a:shade val="85000"/>
-            </a:srgbClr>
-          </a:solidFill>
-          <a:ln>
-            <a:noFill/>
-          </a:ln>
-          <a:effectLst>
-            <a:reflection blurRad="12700" stA="38000" endPos="28000" dist="5000" dir="5400000" sy="-100000" algn="bl" rotWithShape="0"/>
-          </a:effectLst>
-        </p:spPr>
-      </p:pic>
-    </p:spTree>
-    <p:extLst>
-      <p:ext uri="{BB962C8B-B14F-4D97-AF65-F5344CB8AC3E}">
-        <p14:creationId xmlns:p14="http://schemas.microsoft.com/office/powerpoint/2010/main" val="2886218978"/>
       </p:ext>
     </p:extLst>
   </p:cSld>
@@ -5733,147 +5814,297 @@
           <a:chExt cx="0" cy="0"/>
         </a:xfrm>
       </p:grpSpPr>
-      <p:pic>
-        <p:nvPicPr>
-          <p:cNvPr id="4" name="Picture 3"/>
-          <p:cNvPicPr>
-            <a:picLocks noChangeAspect="1"/>
-          </p:cNvPicPr>
+      <p:sp>
+        <p:nvSpPr>
+          <p:cNvPr id="2" name="Title 1"/>
+          <p:cNvSpPr>
+            <a:spLocks noGrp="1"/>
+          </p:cNvSpPr>
+          <p:nvPr>
+            <p:ph type="title"/>
+          </p:nvPr>
+        </p:nvSpPr>
+        <p:spPr/>
+        <p:txBody>
+          <a:bodyPr/>
+          <a:lstStyle/>
+          <a:p>
+            <a:r>
+              <a:rPr lang="en-US" dirty="0" smtClean="0"/>
+              <a:t>Constraints</a:t>
+            </a:r>
+            <a:endParaRPr lang="en-US" dirty="0"/>
+          </a:p>
+        </p:txBody>
+      </p:sp>
+      <p:sp>
+        <p:nvSpPr>
+          <p:cNvPr id="3" name="Content Placeholder 2"/>
+          <p:cNvSpPr>
+            <a:spLocks noGrp="1"/>
+          </p:cNvSpPr>
+          <p:nvPr>
+            <p:ph idx="1"/>
+          </p:nvPr>
+        </p:nvSpPr>
+        <p:spPr/>
+        <p:txBody>
+          <a:bodyPr/>
+          <a:lstStyle/>
+          <a:p>
+            <a:pPr>
+              <a:buFont typeface="Courier New" panose="02070309020205020404" pitchFamily="49" charset="0"/>
+              <a:buChar char="o"/>
+            </a:pPr>
+            <a:r>
+              <a:rPr lang="en-US" sz="2800" dirty="0" smtClean="0"/>
+              <a:t>Business Constraints</a:t>
+            </a:r>
+            <a:endParaRPr lang="en-US" sz="2800" dirty="0"/>
+          </a:p>
+          <a:p>
+            <a:pPr lvl="1">
+              <a:buFont typeface="Courier New" panose="02070309020205020404" pitchFamily="49" charset="0"/>
+              <a:buChar char="o"/>
+            </a:pPr>
+            <a:r>
+              <a:rPr lang="en-US" sz="2800" dirty="0" smtClean="0"/>
+              <a:t>$500 budget</a:t>
+            </a:r>
+            <a:endParaRPr lang="en-US" sz="2800" dirty="0"/>
+          </a:p>
+          <a:p>
+            <a:pPr lvl="1">
+              <a:buFont typeface="Courier New" panose="02070309020205020404" pitchFamily="49" charset="0"/>
+              <a:buChar char="o"/>
+            </a:pPr>
+            <a:r>
+              <a:rPr lang="en-US" sz="2800" dirty="0" smtClean="0"/>
+              <a:t>English only </a:t>
+            </a:r>
+          </a:p>
+          <a:p>
+            <a:pPr>
+              <a:buFont typeface="Courier New" panose="02070309020205020404" pitchFamily="49" charset="0"/>
+              <a:buChar char="o"/>
+            </a:pPr>
+            <a:r>
+              <a:rPr lang="en-US" sz="2800" dirty="0" smtClean="0"/>
+              <a:t>Technical Constraints</a:t>
+            </a:r>
+          </a:p>
+          <a:p>
+            <a:pPr lvl="1">
+              <a:buFont typeface="Courier New" panose="02070309020205020404" pitchFamily="49" charset="0"/>
+              <a:buChar char="o"/>
+            </a:pPr>
+            <a:r>
+              <a:rPr lang="en-US" sz="2800" dirty="0" smtClean="0"/>
+              <a:t>Windows 7 and 8 support</a:t>
+            </a:r>
+          </a:p>
+          <a:p>
+            <a:pPr lvl="1">
+              <a:buFont typeface="Courier New" panose="02070309020205020404" pitchFamily="49" charset="0"/>
+              <a:buChar char="o"/>
+            </a:pPr>
+            <a:r>
+              <a:rPr lang="en-US" sz="2800" dirty="0" smtClean="0"/>
+              <a:t>20 FPS with minimum requirements</a:t>
+            </a:r>
+          </a:p>
+          <a:p>
+            <a:pPr lvl="1">
+              <a:buFont typeface="Courier New" panose="02070309020205020404" pitchFamily="49" charset="0"/>
+              <a:buChar char="o"/>
+            </a:pPr>
+            <a:r>
+              <a:rPr lang="en-US" sz="2800" dirty="0" smtClean="0"/>
+              <a:t>Unity Engine</a:t>
+            </a:r>
+            <a:endParaRPr lang="en-US" sz="2800" dirty="0"/>
+          </a:p>
+          <a:p>
+            <a:endParaRPr lang="en-US" dirty="0"/>
+          </a:p>
+        </p:txBody>
+      </p:sp>
+      <p:sp>
+        <p:nvSpPr>
+          <p:cNvPr id="4" name="Rectangle 3"/>
+          <p:cNvSpPr/>
           <p:nvPr/>
-        </p:nvPicPr>
-        <p:blipFill>
-          <a:blip r:embed="rId2">
-            <a:extLst>
-              <a:ext uri="{28A0092B-C50C-407E-A947-70E740481C1C}">
-                <a14:useLocalDpi xmlns:a14="http://schemas.microsoft.com/office/drawing/2010/main" val="0"/>
-              </a:ext>
-            </a:extLst>
-          </a:blip>
-          <a:stretch>
-            <a:fillRect/>
-          </a:stretch>
-        </p:blipFill>
-        <p:spPr>
-          <a:xfrm>
-            <a:off x="5462954" y="304767"/>
-            <a:ext cx="5080000" cy="6142567"/>
-          </a:xfrm>
-          <a:prstGeom prst="roundRect">
-            <a:avLst>
-              <a:gd name="adj" fmla="val 8594"/>
-            </a:avLst>
+        </p:nvSpPr>
+        <p:spPr>
+          <a:xfrm>
+            <a:off x="7065107" y="2211754"/>
+            <a:ext cx="1578708" cy="1219200"/>
+          </a:xfrm>
+          <a:prstGeom prst="rect">
+            <a:avLst/>
           </a:prstGeom>
           <a:solidFill>
-            <a:srgbClr val="FFFFFF">
-              <a:shade val="85000"/>
-            </a:srgbClr>
+            <a:srgbClr val="C00000"/>
           </a:solidFill>
-          <a:ln>
-            <a:noFill/>
-          </a:ln>
-          <a:effectLst>
-            <a:reflection blurRad="12700" stA="38000" endPos="28000" dist="5000" dir="5400000" sy="-100000" algn="bl" rotWithShape="0"/>
-          </a:effectLst>
-        </p:spPr>
-      </p:pic>
-      <p:sp>
-        <p:nvSpPr>
-          <p:cNvPr id="5" name="Title 4"/>
-          <p:cNvSpPr>
-            <a:spLocks noGrp="1"/>
-          </p:cNvSpPr>
-          <p:nvPr>
-            <p:ph type="title"/>
-          </p:nvPr>
-        </p:nvSpPr>
-        <p:spPr>
-          <a:xfrm>
-            <a:off x="457200" y="594359"/>
-            <a:ext cx="3200400" cy="749887"/>
-          </a:xfrm>
-        </p:spPr>
-        <p:txBody>
-          <a:bodyPr>
-            <a:normAutofit/>
-          </a:bodyPr>
+        </p:spPr>
+        <p:style>
+          <a:lnRef idx="2">
+            <a:schemeClr val="accent1">
+              <a:shade val="50000"/>
+            </a:schemeClr>
+          </a:lnRef>
+          <a:fillRef idx="1">
+            <a:schemeClr val="accent1"/>
+          </a:fillRef>
+          <a:effectRef idx="0">
+            <a:schemeClr val="accent1"/>
+          </a:effectRef>
+          <a:fontRef idx="minor">
+            <a:schemeClr val="lt1"/>
+          </a:fontRef>
+        </p:style>
+        <p:txBody>
+          <a:bodyPr rtlCol="0" anchor="ctr"/>
           <a:lstStyle/>
           <a:p>
             <a:pPr algn="ctr"/>
-            <a:r>
-              <a:rPr lang="en-US" sz="4800" dirty="0" smtClean="0"/>
-              <a:t>The Island</a:t>
-            </a:r>
-            <a:endParaRPr lang="en-US" sz="4800" dirty="0"/>
-          </a:p>
-        </p:txBody>
-      </p:sp>
-      <p:sp>
-        <p:nvSpPr>
-          <p:cNvPr id="7" name="Text Placeholder 6"/>
-          <p:cNvSpPr>
-            <a:spLocks noGrp="1"/>
-          </p:cNvSpPr>
-          <p:nvPr>
-            <p:ph type="body" sz="half" idx="2"/>
-          </p:nvPr>
-        </p:nvSpPr>
-        <p:spPr>
-          <a:xfrm>
-            <a:off x="457200" y="1414585"/>
-            <a:ext cx="3200400" cy="4890619"/>
-          </a:xfrm>
-        </p:spPr>
-        <p:txBody>
-          <a:bodyPr>
-            <a:normAutofit/>
-          </a:bodyPr>
-          <a:lstStyle/>
-          <a:p>
-            <a:pPr marL="457200" indent="-457200">
-              <a:buFont typeface="Wingdings" panose="05000000000000000000" pitchFamily="2" charset="2"/>
-              <a:buChar char="q"/>
-            </a:pPr>
-            <a:r>
-              <a:rPr lang="en-US" sz="2800" dirty="0" smtClean="0"/>
-              <a:t>Player start/end point</a:t>
-            </a:r>
-          </a:p>
-          <a:p>
-            <a:pPr marL="457200" indent="-457200">
-              <a:buFont typeface="Wingdings" panose="05000000000000000000" pitchFamily="2" charset="2"/>
-              <a:buChar char="q"/>
-            </a:pPr>
-            <a:r>
-              <a:rPr lang="en-US" sz="2800" dirty="0" smtClean="0"/>
-              <a:t>Enemy spawn locations</a:t>
-            </a:r>
-          </a:p>
-          <a:p>
-            <a:pPr marL="457200" indent="-457200">
-              <a:buFont typeface="Wingdings" panose="05000000000000000000" pitchFamily="2" charset="2"/>
-              <a:buChar char="q"/>
-            </a:pPr>
-            <a:r>
-              <a:rPr lang="en-US" sz="2800" dirty="0" smtClean="0"/>
-              <a:t>Obstacles</a:t>
-            </a:r>
-          </a:p>
-          <a:p>
-            <a:pPr marL="457200" indent="-457200">
-              <a:buFont typeface="Wingdings" panose="05000000000000000000" pitchFamily="2" charset="2"/>
-              <a:buChar char="q"/>
-            </a:pPr>
-            <a:r>
-              <a:rPr lang="en-US" sz="2800" dirty="0" smtClean="0"/>
-              <a:t>Different terrains</a:t>
-            </a:r>
+            <a:endParaRPr lang="en-US"/>
+          </a:p>
+        </p:txBody>
+      </p:sp>
+      <p:sp>
+        <p:nvSpPr>
+          <p:cNvPr id="5" name="Rectangle 4"/>
+          <p:cNvSpPr/>
+          <p:nvPr/>
+        </p:nvSpPr>
+        <p:spPr>
+          <a:xfrm>
+            <a:off x="8879840" y="2211754"/>
+            <a:ext cx="1547446" cy="1219200"/>
+          </a:xfrm>
+          <a:prstGeom prst="rect">
+            <a:avLst/>
+          </a:prstGeom>
+          <a:solidFill>
+            <a:srgbClr val="92D050"/>
+          </a:solidFill>
+        </p:spPr>
+        <p:style>
+          <a:lnRef idx="2">
+            <a:schemeClr val="accent1">
+              <a:shade val="50000"/>
+            </a:schemeClr>
+          </a:lnRef>
+          <a:fillRef idx="1">
+            <a:schemeClr val="accent1"/>
+          </a:fillRef>
+          <a:effectRef idx="0">
+            <a:schemeClr val="accent1"/>
+          </a:effectRef>
+          <a:fontRef idx="minor">
+            <a:schemeClr val="lt1"/>
+          </a:fontRef>
+        </p:style>
+        <p:txBody>
+          <a:bodyPr rtlCol="0" anchor="ctr"/>
+          <a:lstStyle/>
+          <a:p>
+            <a:pPr algn="ctr"/>
+            <a:endParaRPr lang="en-US"/>
+          </a:p>
+        </p:txBody>
+      </p:sp>
+      <p:sp>
+        <p:nvSpPr>
+          <p:cNvPr id="6" name="Rectangle 5"/>
+          <p:cNvSpPr/>
+          <p:nvPr/>
+        </p:nvSpPr>
+        <p:spPr>
+          <a:xfrm>
+            <a:off x="7065107" y="3539328"/>
+            <a:ext cx="1578708" cy="1141046"/>
+          </a:xfrm>
+          <a:prstGeom prst="rect">
+            <a:avLst/>
+          </a:prstGeom>
+          <a:solidFill>
+            <a:srgbClr val="00B0F0"/>
+          </a:solidFill>
+        </p:spPr>
+        <p:style>
+          <a:lnRef idx="2">
+            <a:schemeClr val="accent1">
+              <a:shade val="50000"/>
+            </a:schemeClr>
+          </a:lnRef>
+          <a:fillRef idx="1">
+            <a:schemeClr val="accent1"/>
+          </a:fillRef>
+          <a:effectRef idx="0">
+            <a:schemeClr val="accent1"/>
+          </a:effectRef>
+          <a:fontRef idx="minor">
+            <a:schemeClr val="lt1"/>
+          </a:fontRef>
+        </p:style>
+        <p:txBody>
+          <a:bodyPr rtlCol="0" anchor="ctr"/>
+          <a:lstStyle/>
+          <a:p>
+            <a:pPr algn="ctr"/>
+            <a:endParaRPr lang="en-US"/>
+          </a:p>
+        </p:txBody>
+      </p:sp>
+      <p:sp>
+        <p:nvSpPr>
+          <p:cNvPr id="7" name="Rectangle 6"/>
+          <p:cNvSpPr/>
+          <p:nvPr/>
+        </p:nvSpPr>
+        <p:spPr>
+          <a:xfrm>
+            <a:off x="8879840" y="3539328"/>
+            <a:ext cx="1547446" cy="1141046"/>
+          </a:xfrm>
+          <a:prstGeom prst="rect">
+            <a:avLst/>
+          </a:prstGeom>
+          <a:solidFill>
+            <a:srgbClr val="FFFF00"/>
+          </a:solidFill>
+        </p:spPr>
+        <p:style>
+          <a:lnRef idx="2">
+            <a:schemeClr val="accent1">
+              <a:shade val="50000"/>
+            </a:schemeClr>
+          </a:lnRef>
+          <a:fillRef idx="1">
+            <a:schemeClr val="accent1"/>
+          </a:fillRef>
+          <a:effectRef idx="0">
+            <a:schemeClr val="accent1"/>
+          </a:effectRef>
+          <a:fontRef idx="minor">
+            <a:schemeClr val="lt1"/>
+          </a:fontRef>
+        </p:style>
+        <p:txBody>
+          <a:bodyPr rtlCol="0" anchor="ctr"/>
+          <a:lstStyle/>
+          <a:p>
+            <a:pPr algn="ctr"/>
+            <a:endParaRPr lang="en-US"/>
           </a:p>
         </p:txBody>
       </p:sp>
     </p:spTree>
     <p:extLst>
       <p:ext uri="{BB962C8B-B14F-4D97-AF65-F5344CB8AC3E}">
-        <p14:creationId xmlns:p14="http://schemas.microsoft.com/office/powerpoint/2010/main" val="2279057902"/>
+        <p14:creationId xmlns:p14="http://schemas.microsoft.com/office/powerpoint/2010/main" val="2528391778"/>
       </p:ext>
     </p:extLst>
   </p:cSld>

</xml_diff>

<commit_message>
Small change to order of slides in PowerPoint per Dr. Sam's advice. Added GameFlowDiagram, which is a Visio file for the overall flow of data and the game. Big update in functional requirements section of the SRS document that will need to be formatted tonight when I get home.
</commit_message>
<xml_diff>
--- a/Documentation/UnityGameRequirementsPPT.pptx
+++ b/Documentation/UnityGameRequirementsPPT.pptx
@@ -10,16 +10,16 @@
   <p:sldIdLst>
     <p:sldId id="256" r:id="rId2"/>
     <p:sldId id="264" r:id="rId3"/>
-    <p:sldId id="265" r:id="rId4"/>
-    <p:sldId id="267" r:id="rId5"/>
-    <p:sldId id="274" r:id="rId6"/>
-    <p:sldId id="275" r:id="rId7"/>
-    <p:sldId id="276" r:id="rId8"/>
-    <p:sldId id="268" r:id="rId9"/>
-    <p:sldId id="269" r:id="rId10"/>
-    <p:sldId id="270" r:id="rId11"/>
-    <p:sldId id="271" r:id="rId12"/>
-    <p:sldId id="273" r:id="rId13"/>
+    <p:sldId id="273" r:id="rId4"/>
+    <p:sldId id="265" r:id="rId5"/>
+    <p:sldId id="267" r:id="rId6"/>
+    <p:sldId id="274" r:id="rId7"/>
+    <p:sldId id="275" r:id="rId8"/>
+    <p:sldId id="276" r:id="rId9"/>
+    <p:sldId id="268" r:id="rId10"/>
+    <p:sldId id="269" r:id="rId11"/>
+    <p:sldId id="270" r:id="rId12"/>
+    <p:sldId id="271" r:id="rId13"/>
     <p:sldId id="272" r:id="rId14"/>
   </p:sldIdLst>
   <p:sldSz cx="12192000" cy="6858000"/>
@@ -4086,49 +4086,6 @@
           <a:chExt cx="0" cy="0"/>
         </a:xfrm>
       </p:grpSpPr>
-      <p:pic>
-        <p:nvPicPr>
-          <p:cNvPr id="6" name="Picture 5"/>
-          <p:cNvPicPr>
-            <a:picLocks noChangeAspect="1"/>
-          </p:cNvPicPr>
-          <p:nvPr/>
-        </p:nvPicPr>
-        <p:blipFill>
-          <a:blip r:embed="rId2">
-            <a:extLst>
-              <a:ext uri="{28A0092B-C50C-407E-A947-70E740481C1C}">
-                <a14:useLocalDpi xmlns:a14="http://schemas.microsoft.com/office/drawing/2010/main" val="0"/>
-              </a:ext>
-            </a:extLst>
-          </a:blip>
-          <a:stretch>
-            <a:fillRect/>
-          </a:stretch>
-        </p:blipFill>
-        <p:spPr>
-          <a:xfrm rot="5400000">
-            <a:off x="4915301" y="1402444"/>
-            <a:ext cx="2422357" cy="6034320"/>
-          </a:xfrm>
-          <a:prstGeom prst="roundRect">
-            <a:avLst>
-              <a:gd name="adj" fmla="val 8594"/>
-            </a:avLst>
-          </a:prstGeom>
-          <a:solidFill>
-            <a:srgbClr val="FFFFFF">
-              <a:shade val="85000"/>
-            </a:srgbClr>
-          </a:solidFill>
-          <a:ln>
-            <a:noFill/>
-          </a:ln>
-          <a:effectLst>
-            <a:reflection blurRad="12700" stA="38000" endPos="28000" dist="5000" dir="5400000" sy="-100000" algn="bl" rotWithShape="0"/>
-          </a:effectLst>
-        </p:spPr>
-      </p:pic>
       <p:sp>
         <p:nvSpPr>
           <p:cNvPr id="2" name="Title 1"/>
@@ -4146,7 +4103,7 @@
           <a:p>
             <a:r>
               <a:rPr lang="en-US" dirty="0" smtClean="0"/>
-              <a:t>Game Features</a:t>
+              <a:t>Constraints</a:t>
             </a:r>
             <a:endParaRPr lang="en-US" dirty="0"/>
           </a:p>
@@ -4164,9 +4121,7 @@
         </p:nvSpPr>
         <p:spPr/>
         <p:txBody>
-          <a:bodyPr>
-            <a:normAutofit/>
-          </a:bodyPr>
+          <a:bodyPr/>
           <a:lstStyle/>
           <a:p>
             <a:pPr>
@@ -4175,9 +4130,30 @@
             </a:pPr>
             <a:r>
               <a:rPr lang="en-US" sz="2800" dirty="0" smtClean="0"/>
-              <a:t>Final product expected to be very stable</a:t>
+              <a:t>Business Constraints</a:t>
             </a:r>
             <a:endParaRPr lang="en-US" sz="2800" dirty="0"/>
+          </a:p>
+          <a:p>
+            <a:pPr lvl="1">
+              <a:buFont typeface="Courier New" panose="02070309020205020404" pitchFamily="49" charset="0"/>
+              <a:buChar char="o"/>
+            </a:pPr>
+            <a:r>
+              <a:rPr lang="en-US" sz="2800" dirty="0" smtClean="0"/>
+              <a:t>$500 budget</a:t>
+            </a:r>
+            <a:endParaRPr lang="en-US" sz="2800" dirty="0"/>
+          </a:p>
+          <a:p>
+            <a:pPr lvl="1">
+              <a:buFont typeface="Courier New" panose="02070309020205020404" pitchFamily="49" charset="0"/>
+              <a:buChar char="o"/>
+            </a:pPr>
+            <a:r>
+              <a:rPr lang="en-US" sz="2800" dirty="0" smtClean="0"/>
+              <a:t>English only </a:t>
+            </a:r>
           </a:p>
           <a:p>
             <a:pPr>
@@ -4186,16 +4162,221 @@
             </a:pPr>
             <a:r>
               <a:rPr lang="en-US" sz="2800" dirty="0" smtClean="0"/>
-              <a:t>Mouse &amp; keyboard should feel as an extension of the user to his/her avatar.</a:t>
+              <a:t>Technical Constraints</a:t>
+            </a:r>
+          </a:p>
+          <a:p>
+            <a:pPr lvl="1">
+              <a:buFont typeface="Courier New" panose="02070309020205020404" pitchFamily="49" charset="0"/>
+              <a:buChar char="o"/>
+            </a:pPr>
+            <a:r>
+              <a:rPr lang="en-US" sz="2800" dirty="0" smtClean="0"/>
+              <a:t>Windows 7 and 8 support</a:t>
+            </a:r>
+          </a:p>
+          <a:p>
+            <a:pPr lvl="1">
+              <a:buFont typeface="Courier New" panose="02070309020205020404" pitchFamily="49" charset="0"/>
+              <a:buChar char="o"/>
+            </a:pPr>
+            <a:r>
+              <a:rPr lang="en-US" sz="2800" dirty="0" smtClean="0"/>
+              <a:t>20 FPS with minimum requirements</a:t>
+            </a:r>
+          </a:p>
+          <a:p>
+            <a:pPr lvl="1">
+              <a:buFont typeface="Courier New" panose="02070309020205020404" pitchFamily="49" charset="0"/>
+              <a:buChar char="o"/>
+            </a:pPr>
+            <a:r>
+              <a:rPr lang="en-US" sz="2800" dirty="0" smtClean="0"/>
+              <a:t>Unity Engine</a:t>
             </a:r>
             <a:endParaRPr lang="en-US" sz="2800" dirty="0"/>
+          </a:p>
+          <a:p>
+            <a:endParaRPr lang="en-US" dirty="0"/>
+          </a:p>
+        </p:txBody>
+      </p:sp>
+      <p:sp>
+        <p:nvSpPr>
+          <p:cNvPr id="4" name="Rectangle 3"/>
+          <p:cNvSpPr/>
+          <p:nvPr/>
+        </p:nvSpPr>
+        <p:spPr>
+          <a:xfrm>
+            <a:off x="7065107" y="2211754"/>
+            <a:ext cx="1578708" cy="1219200"/>
+          </a:xfrm>
+          <a:prstGeom prst="rect">
+            <a:avLst/>
+          </a:prstGeom>
+          <a:solidFill>
+            <a:srgbClr val="C00000"/>
+          </a:solidFill>
+        </p:spPr>
+        <p:style>
+          <a:lnRef idx="2">
+            <a:schemeClr val="accent1">
+              <a:shade val="50000"/>
+            </a:schemeClr>
+          </a:lnRef>
+          <a:fillRef idx="1">
+            <a:schemeClr val="accent1"/>
+          </a:fillRef>
+          <a:effectRef idx="0">
+            <a:schemeClr val="accent1"/>
+          </a:effectRef>
+          <a:fontRef idx="minor">
+            <a:schemeClr val="lt1"/>
+          </a:fontRef>
+        </p:style>
+        <p:txBody>
+          <a:bodyPr rtlCol="0" anchor="ctr"/>
+          <a:lstStyle/>
+          <a:p>
+            <a:pPr algn="ctr"/>
+            <a:endParaRPr lang="en-US"/>
+          </a:p>
+        </p:txBody>
+      </p:sp>
+      <p:sp>
+        <p:nvSpPr>
+          <p:cNvPr id="5" name="Rectangle 4"/>
+          <p:cNvSpPr/>
+          <p:nvPr/>
+        </p:nvSpPr>
+        <p:spPr>
+          <a:xfrm>
+            <a:off x="8879840" y="2211754"/>
+            <a:ext cx="1547446" cy="1219200"/>
+          </a:xfrm>
+          <a:prstGeom prst="rect">
+            <a:avLst/>
+          </a:prstGeom>
+          <a:solidFill>
+            <a:srgbClr val="92D050"/>
+          </a:solidFill>
+        </p:spPr>
+        <p:style>
+          <a:lnRef idx="2">
+            <a:schemeClr val="accent1">
+              <a:shade val="50000"/>
+            </a:schemeClr>
+          </a:lnRef>
+          <a:fillRef idx="1">
+            <a:schemeClr val="accent1"/>
+          </a:fillRef>
+          <a:effectRef idx="0">
+            <a:schemeClr val="accent1"/>
+          </a:effectRef>
+          <a:fontRef idx="minor">
+            <a:schemeClr val="lt1"/>
+          </a:fontRef>
+        </p:style>
+        <p:txBody>
+          <a:bodyPr rtlCol="0" anchor="ctr"/>
+          <a:lstStyle/>
+          <a:p>
+            <a:pPr algn="ctr"/>
+            <a:endParaRPr lang="en-US"/>
+          </a:p>
+        </p:txBody>
+      </p:sp>
+      <p:sp>
+        <p:nvSpPr>
+          <p:cNvPr id="6" name="Rectangle 5"/>
+          <p:cNvSpPr/>
+          <p:nvPr/>
+        </p:nvSpPr>
+        <p:spPr>
+          <a:xfrm>
+            <a:off x="7065107" y="3539328"/>
+            <a:ext cx="1578708" cy="1141046"/>
+          </a:xfrm>
+          <a:prstGeom prst="rect">
+            <a:avLst/>
+          </a:prstGeom>
+          <a:solidFill>
+            <a:srgbClr val="00B0F0"/>
+          </a:solidFill>
+        </p:spPr>
+        <p:style>
+          <a:lnRef idx="2">
+            <a:schemeClr val="accent1">
+              <a:shade val="50000"/>
+            </a:schemeClr>
+          </a:lnRef>
+          <a:fillRef idx="1">
+            <a:schemeClr val="accent1"/>
+          </a:fillRef>
+          <a:effectRef idx="0">
+            <a:schemeClr val="accent1"/>
+          </a:effectRef>
+          <a:fontRef idx="minor">
+            <a:schemeClr val="lt1"/>
+          </a:fontRef>
+        </p:style>
+        <p:txBody>
+          <a:bodyPr rtlCol="0" anchor="ctr"/>
+          <a:lstStyle/>
+          <a:p>
+            <a:pPr algn="ctr"/>
+            <a:endParaRPr lang="en-US"/>
+          </a:p>
+        </p:txBody>
+      </p:sp>
+      <p:sp>
+        <p:nvSpPr>
+          <p:cNvPr id="7" name="Rectangle 6"/>
+          <p:cNvSpPr/>
+          <p:nvPr/>
+        </p:nvSpPr>
+        <p:spPr>
+          <a:xfrm>
+            <a:off x="8879840" y="3539328"/>
+            <a:ext cx="1547446" cy="1141046"/>
+          </a:xfrm>
+          <a:prstGeom prst="rect">
+            <a:avLst/>
+          </a:prstGeom>
+          <a:solidFill>
+            <a:srgbClr val="FFFF00"/>
+          </a:solidFill>
+        </p:spPr>
+        <p:style>
+          <a:lnRef idx="2">
+            <a:schemeClr val="accent1">
+              <a:shade val="50000"/>
+            </a:schemeClr>
+          </a:lnRef>
+          <a:fillRef idx="1">
+            <a:schemeClr val="accent1"/>
+          </a:fillRef>
+          <a:effectRef idx="0">
+            <a:schemeClr val="accent1"/>
+          </a:effectRef>
+          <a:fontRef idx="minor">
+            <a:schemeClr val="lt1"/>
+          </a:fontRef>
+        </p:style>
+        <p:txBody>
+          <a:bodyPr rtlCol="0" anchor="ctr"/>
+          <a:lstStyle/>
+          <a:p>
+            <a:pPr algn="ctr"/>
+            <a:endParaRPr lang="en-US"/>
           </a:p>
         </p:txBody>
       </p:sp>
     </p:spTree>
     <p:extLst>
       <p:ext uri="{BB962C8B-B14F-4D97-AF65-F5344CB8AC3E}">
-        <p14:creationId xmlns:p14="http://schemas.microsoft.com/office/powerpoint/2010/main" val="3059164976"/>
+        <p14:creationId xmlns:p14="http://schemas.microsoft.com/office/powerpoint/2010/main" val="2528391778"/>
       </p:ext>
     </p:extLst>
   </p:cSld>
@@ -4229,100 +4410,9 @@
           <a:chExt cx="0" cy="0"/>
         </a:xfrm>
       </p:grpSpPr>
-      <p:sp>
-        <p:nvSpPr>
-          <p:cNvPr id="2" name="Title 1"/>
-          <p:cNvSpPr>
-            <a:spLocks noGrp="1"/>
-          </p:cNvSpPr>
-          <p:nvPr>
-            <p:ph type="title"/>
-          </p:nvPr>
-        </p:nvSpPr>
-        <p:spPr/>
-        <p:txBody>
-          <a:bodyPr/>
-          <a:lstStyle/>
-          <a:p>
-            <a:r>
-              <a:rPr lang="en-US" dirty="0" smtClean="0"/>
-              <a:t>Functional Requirements</a:t>
-            </a:r>
-            <a:endParaRPr lang="en-US" dirty="0"/>
-          </a:p>
-        </p:txBody>
-      </p:sp>
-      <p:sp>
-        <p:nvSpPr>
-          <p:cNvPr id="3" name="Content Placeholder 2"/>
-          <p:cNvSpPr>
-            <a:spLocks noGrp="1"/>
-          </p:cNvSpPr>
-          <p:nvPr>
-            <p:ph idx="1"/>
-          </p:nvPr>
-        </p:nvSpPr>
-        <p:spPr/>
-        <p:txBody>
-          <a:bodyPr/>
-          <a:lstStyle/>
-          <a:p>
-            <a:pPr>
-              <a:buFont typeface="Courier New" panose="02070309020205020404" pitchFamily="49" charset="0"/>
-              <a:buChar char="o"/>
-            </a:pPr>
-            <a:r>
-              <a:rPr lang="en-US" dirty="0" smtClean="0"/>
-              <a:t>Game Setup and Creation</a:t>
-            </a:r>
-            <a:endParaRPr lang="en-US" dirty="0"/>
-          </a:p>
-          <a:p>
-            <a:pPr lvl="1">
-              <a:buFont typeface="Courier New" panose="02070309020205020404" pitchFamily="49" charset="0"/>
-              <a:buChar char="o"/>
-            </a:pPr>
-            <a:r>
-              <a:rPr lang="en-US" dirty="0" smtClean="0"/>
-              <a:t>Installation</a:t>
-            </a:r>
-          </a:p>
-          <a:p>
-            <a:pPr lvl="1">
-              <a:buFont typeface="Courier New" panose="02070309020205020404" pitchFamily="49" charset="0"/>
-              <a:buChar char="o"/>
-            </a:pPr>
-            <a:r>
-              <a:rPr lang="en-US" dirty="0" smtClean="0"/>
-              <a:t>Start/End Game</a:t>
-            </a:r>
-            <a:endParaRPr lang="en-US" dirty="0"/>
-          </a:p>
-          <a:p>
-            <a:pPr>
-              <a:buFont typeface="Courier New" panose="02070309020205020404" pitchFamily="49" charset="0"/>
-              <a:buChar char="o"/>
-            </a:pPr>
-            <a:r>
-              <a:rPr lang="en-US" dirty="0" smtClean="0"/>
-              <a:t>Gameplay and In-Game Interactions</a:t>
-            </a:r>
-          </a:p>
-          <a:p>
-            <a:pPr lvl="1">
-              <a:buFont typeface="Courier New" panose="02070309020205020404" pitchFamily="49" charset="0"/>
-              <a:buChar char="o"/>
-            </a:pPr>
-            <a:r>
-              <a:rPr lang="en-US" dirty="0" smtClean="0"/>
-              <a:t>Generate game world, player, enemies, friendlies, HUD</a:t>
-            </a:r>
-          </a:p>
-        </p:txBody>
-      </p:sp>
       <p:pic>
         <p:nvPicPr>
-          <p:cNvPr id="4" name="Picture 3"/>
+          <p:cNvPr id="6" name="Picture 5"/>
           <p:cNvPicPr>
             <a:picLocks noChangeAspect="1"/>
           </p:cNvPicPr>
@@ -4341,9 +4431,9 @@
           </a:stretch>
         </p:blipFill>
         <p:spPr>
-          <a:xfrm>
-            <a:off x="1097280" y="3670409"/>
-            <a:ext cx="2448267" cy="2581635"/>
+          <a:xfrm rot="5400000">
+            <a:off x="4915301" y="1402444"/>
+            <a:ext cx="2422357" cy="6034320"/>
           </a:xfrm>
           <a:prstGeom prst="roundRect">
             <a:avLst>
@@ -4363,53 +4453,73 @@
           </a:effectLst>
         </p:spPr>
       </p:pic>
-      <p:pic>
-        <p:nvPicPr>
-          <p:cNvPr id="5" name="Picture 4"/>
-          <p:cNvPicPr>
-            <a:picLocks noChangeAspect="1"/>
-          </p:cNvPicPr>
-          <p:nvPr/>
-        </p:nvPicPr>
-        <p:blipFill>
-          <a:blip r:embed="rId3">
-            <a:extLst>
-              <a:ext uri="{28A0092B-C50C-407E-A947-70E740481C1C}">
-                <a14:useLocalDpi xmlns:a14="http://schemas.microsoft.com/office/drawing/2010/main" val="0"/>
-              </a:ext>
-            </a:extLst>
-          </a:blip>
-          <a:stretch>
-            <a:fillRect/>
-          </a:stretch>
-        </p:blipFill>
-        <p:spPr>
-          <a:xfrm>
-            <a:off x="7874071" y="1974721"/>
-            <a:ext cx="2685336" cy="3894373"/>
-          </a:xfrm>
-          <a:prstGeom prst="roundRect">
-            <a:avLst>
-              <a:gd name="adj" fmla="val 8594"/>
-            </a:avLst>
-          </a:prstGeom>
-          <a:solidFill>
-            <a:srgbClr val="FFFFFF">
-              <a:shade val="85000"/>
-            </a:srgbClr>
-          </a:solidFill>
-          <a:ln>
-            <a:noFill/>
-          </a:ln>
-          <a:effectLst>
-            <a:reflection blurRad="12700" stA="38000" endPos="28000" dist="5000" dir="5400000" sy="-100000" algn="bl" rotWithShape="0"/>
-          </a:effectLst>
-        </p:spPr>
-      </p:pic>
+      <p:sp>
+        <p:nvSpPr>
+          <p:cNvPr id="2" name="Title 1"/>
+          <p:cNvSpPr>
+            <a:spLocks noGrp="1"/>
+          </p:cNvSpPr>
+          <p:nvPr>
+            <p:ph type="title"/>
+          </p:nvPr>
+        </p:nvSpPr>
+        <p:spPr/>
+        <p:txBody>
+          <a:bodyPr/>
+          <a:lstStyle/>
+          <a:p>
+            <a:r>
+              <a:rPr lang="en-US" dirty="0" smtClean="0"/>
+              <a:t>Game Features</a:t>
+            </a:r>
+            <a:endParaRPr lang="en-US" dirty="0"/>
+          </a:p>
+        </p:txBody>
+      </p:sp>
+      <p:sp>
+        <p:nvSpPr>
+          <p:cNvPr id="3" name="Content Placeholder 2"/>
+          <p:cNvSpPr>
+            <a:spLocks noGrp="1"/>
+          </p:cNvSpPr>
+          <p:nvPr>
+            <p:ph idx="1"/>
+          </p:nvPr>
+        </p:nvSpPr>
+        <p:spPr/>
+        <p:txBody>
+          <a:bodyPr>
+            <a:normAutofit/>
+          </a:bodyPr>
+          <a:lstStyle/>
+          <a:p>
+            <a:pPr>
+              <a:buFont typeface="Courier New" panose="02070309020205020404" pitchFamily="49" charset="0"/>
+              <a:buChar char="o"/>
+            </a:pPr>
+            <a:r>
+              <a:rPr lang="en-US" sz="2800" dirty="0" smtClean="0"/>
+              <a:t>Final product expected to be very stable</a:t>
+            </a:r>
+            <a:endParaRPr lang="en-US" sz="2800" dirty="0"/>
+          </a:p>
+          <a:p>
+            <a:pPr>
+              <a:buFont typeface="Courier New" panose="02070309020205020404" pitchFamily="49" charset="0"/>
+              <a:buChar char="o"/>
+            </a:pPr>
+            <a:r>
+              <a:rPr lang="en-US" sz="2800" dirty="0" smtClean="0"/>
+              <a:t>Mouse &amp; keyboard should feel as an extension of the user to his/her avatar.</a:t>
+            </a:r>
+            <a:endParaRPr lang="en-US" sz="2800" dirty="0"/>
+          </a:p>
+        </p:txBody>
+      </p:sp>
     </p:spTree>
     <p:extLst>
       <p:ext uri="{BB962C8B-B14F-4D97-AF65-F5344CB8AC3E}">
-        <p14:creationId xmlns:p14="http://schemas.microsoft.com/office/powerpoint/2010/main" val="2886218978"/>
+        <p14:creationId xmlns:p14="http://schemas.microsoft.com/office/powerpoint/2010/main" val="3059164976"/>
       </p:ext>
     </p:extLst>
   </p:cSld>
@@ -4443,6 +4553,97 @@
           <a:chExt cx="0" cy="0"/>
         </a:xfrm>
       </p:grpSpPr>
+      <p:sp>
+        <p:nvSpPr>
+          <p:cNvPr id="2" name="Title 1"/>
+          <p:cNvSpPr>
+            <a:spLocks noGrp="1"/>
+          </p:cNvSpPr>
+          <p:nvPr>
+            <p:ph type="title"/>
+          </p:nvPr>
+        </p:nvSpPr>
+        <p:spPr/>
+        <p:txBody>
+          <a:bodyPr/>
+          <a:lstStyle/>
+          <a:p>
+            <a:r>
+              <a:rPr lang="en-US" dirty="0" smtClean="0"/>
+              <a:t>Functional Requirements</a:t>
+            </a:r>
+            <a:endParaRPr lang="en-US" dirty="0"/>
+          </a:p>
+        </p:txBody>
+      </p:sp>
+      <p:sp>
+        <p:nvSpPr>
+          <p:cNvPr id="3" name="Content Placeholder 2"/>
+          <p:cNvSpPr>
+            <a:spLocks noGrp="1"/>
+          </p:cNvSpPr>
+          <p:nvPr>
+            <p:ph idx="1"/>
+          </p:nvPr>
+        </p:nvSpPr>
+        <p:spPr/>
+        <p:txBody>
+          <a:bodyPr/>
+          <a:lstStyle/>
+          <a:p>
+            <a:pPr>
+              <a:buFont typeface="Courier New" panose="02070309020205020404" pitchFamily="49" charset="0"/>
+              <a:buChar char="o"/>
+            </a:pPr>
+            <a:r>
+              <a:rPr lang="en-US" dirty="0" smtClean="0"/>
+              <a:t>Game Setup and Creation</a:t>
+            </a:r>
+            <a:endParaRPr lang="en-US" dirty="0"/>
+          </a:p>
+          <a:p>
+            <a:pPr lvl="1">
+              <a:buFont typeface="Courier New" panose="02070309020205020404" pitchFamily="49" charset="0"/>
+              <a:buChar char="o"/>
+            </a:pPr>
+            <a:r>
+              <a:rPr lang="en-US" dirty="0" smtClean="0"/>
+              <a:t>Installation</a:t>
+            </a:r>
+          </a:p>
+          <a:p>
+            <a:pPr lvl="1">
+              <a:buFont typeface="Courier New" panose="02070309020205020404" pitchFamily="49" charset="0"/>
+              <a:buChar char="o"/>
+            </a:pPr>
+            <a:r>
+              <a:rPr lang="en-US" dirty="0" smtClean="0"/>
+              <a:t>Start/End Game</a:t>
+            </a:r>
+            <a:endParaRPr lang="en-US" dirty="0"/>
+          </a:p>
+          <a:p>
+            <a:pPr>
+              <a:buFont typeface="Courier New" panose="02070309020205020404" pitchFamily="49" charset="0"/>
+              <a:buChar char="o"/>
+            </a:pPr>
+            <a:r>
+              <a:rPr lang="en-US" dirty="0" smtClean="0"/>
+              <a:t>Gameplay and In-Game Interactions</a:t>
+            </a:r>
+          </a:p>
+          <a:p>
+            <a:pPr lvl="1">
+              <a:buFont typeface="Courier New" panose="02070309020205020404" pitchFamily="49" charset="0"/>
+              <a:buChar char="o"/>
+            </a:pPr>
+            <a:r>
+              <a:rPr lang="en-US" dirty="0" smtClean="0"/>
+              <a:t>Generate game world, player, enemies, friendlies, HUD</a:t>
+            </a:r>
+          </a:p>
+        </p:txBody>
+      </p:sp>
       <p:pic>
         <p:nvPicPr>
           <p:cNvPr id="4" name="Picture 3"/>
@@ -4465,8 +4666,8 @@
         </p:blipFill>
         <p:spPr>
           <a:xfrm>
-            <a:off x="5462954" y="304767"/>
-            <a:ext cx="5080000" cy="6142567"/>
+            <a:off x="1097280" y="3670409"/>
+            <a:ext cx="2448267" cy="2581635"/>
           </a:xfrm>
           <a:prstGeom prst="roundRect">
             <a:avLst>
@@ -4486,104 +4687,53 @@
           </a:effectLst>
         </p:spPr>
       </p:pic>
-      <p:sp>
-        <p:nvSpPr>
-          <p:cNvPr id="5" name="Title 4"/>
-          <p:cNvSpPr>
-            <a:spLocks noGrp="1"/>
-          </p:cNvSpPr>
-          <p:nvPr>
-            <p:ph type="title"/>
-          </p:nvPr>
-        </p:nvSpPr>
-        <p:spPr>
-          <a:xfrm>
-            <a:off x="457200" y="594359"/>
-            <a:ext cx="3200400" cy="749887"/>
-          </a:xfrm>
-        </p:spPr>
-        <p:txBody>
-          <a:bodyPr>
-            <a:normAutofit/>
-          </a:bodyPr>
-          <a:lstStyle/>
-          <a:p>
-            <a:pPr algn="ctr"/>
-            <a:r>
-              <a:rPr lang="en-US" sz="4800" dirty="0" smtClean="0"/>
-              <a:t>The Island</a:t>
-            </a:r>
-            <a:endParaRPr lang="en-US" sz="4800" dirty="0"/>
-          </a:p>
-        </p:txBody>
-      </p:sp>
-      <p:sp>
-        <p:nvSpPr>
-          <p:cNvPr id="7" name="Text Placeholder 6"/>
-          <p:cNvSpPr>
-            <a:spLocks noGrp="1"/>
-          </p:cNvSpPr>
-          <p:nvPr>
-            <p:ph type="body" sz="half" idx="2"/>
-          </p:nvPr>
-        </p:nvSpPr>
-        <p:spPr>
-          <a:xfrm>
-            <a:off x="457200" y="1414585"/>
-            <a:ext cx="3200400" cy="4890619"/>
-          </a:xfrm>
-        </p:spPr>
-        <p:txBody>
-          <a:bodyPr>
-            <a:normAutofit/>
-          </a:bodyPr>
-          <a:lstStyle/>
-          <a:p>
-            <a:pPr marL="457200" indent="-457200">
-              <a:buFont typeface="Wingdings" panose="05000000000000000000" pitchFamily="2" charset="2"/>
-              <a:buChar char="q"/>
-            </a:pPr>
-            <a:r>
-              <a:rPr lang="en-US" sz="2800" dirty="0" smtClean="0"/>
-              <a:t>Player start/end point</a:t>
-            </a:r>
-          </a:p>
-          <a:p>
-            <a:pPr marL="457200" indent="-457200">
-              <a:buFont typeface="Wingdings" panose="05000000000000000000" pitchFamily="2" charset="2"/>
-              <a:buChar char="q"/>
-            </a:pPr>
-            <a:r>
-              <a:rPr lang="en-US" sz="2800" dirty="0" smtClean="0"/>
-              <a:t>Enemy spawn locations</a:t>
-            </a:r>
-          </a:p>
-          <a:p>
-            <a:pPr marL="457200" indent="-457200">
-              <a:buFont typeface="Wingdings" panose="05000000000000000000" pitchFamily="2" charset="2"/>
-              <a:buChar char="q"/>
-            </a:pPr>
-            <a:r>
-              <a:rPr lang="en-US" sz="2800" dirty="0" smtClean="0"/>
-              <a:t>Obstacles</a:t>
-            </a:r>
-          </a:p>
-          <a:p>
-            <a:pPr marL="457200" indent="-457200">
-              <a:buFont typeface="Wingdings" panose="05000000000000000000" pitchFamily="2" charset="2"/>
-              <a:buChar char="q"/>
-            </a:pPr>
-            <a:r>
-              <a:rPr lang="en-US" sz="2800" dirty="0" smtClean="0"/>
-              <a:t>Different terrains</a:t>
-            </a:r>
-          </a:p>
-        </p:txBody>
-      </p:sp>
+      <p:pic>
+        <p:nvPicPr>
+          <p:cNvPr id="5" name="Picture 4"/>
+          <p:cNvPicPr>
+            <a:picLocks noChangeAspect="1"/>
+          </p:cNvPicPr>
+          <p:nvPr/>
+        </p:nvPicPr>
+        <p:blipFill>
+          <a:blip r:embed="rId3">
+            <a:extLst>
+              <a:ext uri="{28A0092B-C50C-407E-A947-70E740481C1C}">
+                <a14:useLocalDpi xmlns:a14="http://schemas.microsoft.com/office/drawing/2010/main" val="0"/>
+              </a:ext>
+            </a:extLst>
+          </a:blip>
+          <a:stretch>
+            <a:fillRect/>
+          </a:stretch>
+        </p:blipFill>
+        <p:spPr>
+          <a:xfrm>
+            <a:off x="7874071" y="1974721"/>
+            <a:ext cx="2685336" cy="3894373"/>
+          </a:xfrm>
+          <a:prstGeom prst="roundRect">
+            <a:avLst>
+              <a:gd name="adj" fmla="val 8594"/>
+            </a:avLst>
+          </a:prstGeom>
+          <a:solidFill>
+            <a:srgbClr val="FFFFFF">
+              <a:shade val="85000"/>
+            </a:srgbClr>
+          </a:solidFill>
+          <a:ln>
+            <a:noFill/>
+          </a:ln>
+          <a:effectLst>
+            <a:reflection blurRad="12700" stA="38000" endPos="28000" dist="5000" dir="5400000" sy="-100000" algn="bl" rotWithShape="0"/>
+          </a:effectLst>
+        </p:spPr>
+      </p:pic>
     </p:spTree>
     <p:extLst>
       <p:ext uri="{BB962C8B-B14F-4D97-AF65-F5344CB8AC3E}">
-        <p14:creationId xmlns:p14="http://schemas.microsoft.com/office/powerpoint/2010/main" val="2279057902"/>
+        <p14:creationId xmlns:p14="http://schemas.microsoft.com/office/powerpoint/2010/main" val="2886218978"/>
       </p:ext>
     </p:extLst>
   </p:cSld>
@@ -4934,82 +5084,9 @@
           <a:chExt cx="0" cy="0"/>
         </a:xfrm>
       </p:grpSpPr>
-      <p:sp>
-        <p:nvSpPr>
-          <p:cNvPr id="2" name="Title 1"/>
-          <p:cNvSpPr>
-            <a:spLocks noGrp="1"/>
-          </p:cNvSpPr>
-          <p:nvPr>
-            <p:ph type="title"/>
-          </p:nvPr>
-        </p:nvSpPr>
-        <p:spPr/>
-        <p:txBody>
-          <a:bodyPr/>
-          <a:lstStyle/>
-          <a:p>
-            <a:r>
-              <a:rPr lang="en-US" dirty="0" smtClean="0"/>
-              <a:t>Product Perspective</a:t>
-            </a:r>
-            <a:endParaRPr lang="en-US" dirty="0"/>
-          </a:p>
-        </p:txBody>
-      </p:sp>
-      <p:sp>
-        <p:nvSpPr>
-          <p:cNvPr id="3" name="Content Placeholder 2"/>
-          <p:cNvSpPr>
-            <a:spLocks noGrp="1"/>
-          </p:cNvSpPr>
-          <p:nvPr>
-            <p:ph idx="1"/>
-          </p:nvPr>
-        </p:nvSpPr>
-        <p:spPr/>
-        <p:txBody>
-          <a:bodyPr>
-            <a:normAutofit/>
-          </a:bodyPr>
-          <a:lstStyle/>
-          <a:p>
-            <a:pPr>
-              <a:buFont typeface="Courier New" panose="02070309020205020404" pitchFamily="49" charset="0"/>
-              <a:buChar char="o"/>
-            </a:pPr>
-            <a:r>
-              <a:rPr lang="en-US" sz="2800" dirty="0" smtClean="0"/>
-              <a:t>Standalone, offline video game for the PC.</a:t>
-            </a:r>
-            <a:endParaRPr lang="en-US" sz="2800" dirty="0"/>
-          </a:p>
-          <a:p>
-            <a:pPr>
-              <a:buFont typeface="Courier New" panose="02070309020205020404" pitchFamily="49" charset="0"/>
-              <a:buChar char="o"/>
-            </a:pPr>
-            <a:r>
-              <a:rPr lang="en-US" sz="2800" dirty="0" smtClean="0"/>
-              <a:t>Every player is different.</a:t>
-            </a:r>
-          </a:p>
-          <a:p>
-            <a:pPr>
-              <a:buFont typeface="Courier New" panose="02070309020205020404" pitchFamily="49" charset="0"/>
-              <a:buChar char="o"/>
-            </a:pPr>
-            <a:r>
-              <a:rPr lang="en-US" sz="2800" dirty="0" smtClean="0"/>
-              <a:t>Demo guides players through basic fundamentals of gameplay</a:t>
-            </a:r>
-            <a:endParaRPr lang="en-US" sz="2800" dirty="0"/>
-          </a:p>
-        </p:txBody>
-      </p:sp>
       <p:pic>
         <p:nvPicPr>
-          <p:cNvPr id="5" name="Picture 4"/>
+          <p:cNvPr id="4" name="Picture 3"/>
           <p:cNvPicPr>
             <a:picLocks noChangeAspect="1"/>
           </p:cNvPicPr>
@@ -5029,8 +5106,8 @@
         </p:blipFill>
         <p:spPr>
           <a:xfrm>
-            <a:off x="1813706" y="3579445"/>
-            <a:ext cx="2555094" cy="2747127"/>
+            <a:off x="5462954" y="304767"/>
+            <a:ext cx="5080000" cy="6142567"/>
           </a:xfrm>
           <a:prstGeom prst="roundRect">
             <a:avLst>
@@ -5050,40 +5127,104 @@
           </a:effectLst>
         </p:spPr>
       </p:pic>
-      <p:pic>
-        <p:nvPicPr>
-          <p:cNvPr id="6" name="Picture 5"/>
-          <p:cNvPicPr>
-            <a:picLocks noChangeAspect="1"/>
-          </p:cNvPicPr>
-          <p:nvPr/>
-        </p:nvPicPr>
-        <p:blipFill>
-          <a:blip r:embed="rId3">
-            <a:extLst>
-              <a:ext uri="{28A0092B-C50C-407E-A947-70E740481C1C}">
-                <a14:useLocalDpi xmlns:a14="http://schemas.microsoft.com/office/drawing/2010/main" val="0"/>
-              </a:ext>
-            </a:extLst>
-          </a:blip>
-          <a:stretch>
-            <a:fillRect/>
-          </a:stretch>
-        </p:blipFill>
-        <p:spPr>
-          <a:xfrm>
-            <a:off x="9801114" y="286603"/>
-            <a:ext cx="1288917" cy="1325638"/>
-          </a:xfrm>
-          <a:prstGeom prst="rect">
-            <a:avLst/>
-          </a:prstGeom>
-        </p:spPr>
-      </p:pic>
+      <p:sp>
+        <p:nvSpPr>
+          <p:cNvPr id="5" name="Title 4"/>
+          <p:cNvSpPr>
+            <a:spLocks noGrp="1"/>
+          </p:cNvSpPr>
+          <p:nvPr>
+            <p:ph type="title"/>
+          </p:nvPr>
+        </p:nvSpPr>
+        <p:spPr>
+          <a:xfrm>
+            <a:off x="457200" y="594359"/>
+            <a:ext cx="3200400" cy="749887"/>
+          </a:xfrm>
+        </p:spPr>
+        <p:txBody>
+          <a:bodyPr>
+            <a:normAutofit/>
+          </a:bodyPr>
+          <a:lstStyle/>
+          <a:p>
+            <a:pPr algn="ctr"/>
+            <a:r>
+              <a:rPr lang="en-US" sz="4800" dirty="0" smtClean="0"/>
+              <a:t>The Island</a:t>
+            </a:r>
+            <a:endParaRPr lang="en-US" sz="4800" dirty="0"/>
+          </a:p>
+        </p:txBody>
+      </p:sp>
+      <p:sp>
+        <p:nvSpPr>
+          <p:cNvPr id="7" name="Text Placeholder 6"/>
+          <p:cNvSpPr>
+            <a:spLocks noGrp="1"/>
+          </p:cNvSpPr>
+          <p:nvPr>
+            <p:ph type="body" sz="half" idx="2"/>
+          </p:nvPr>
+        </p:nvSpPr>
+        <p:spPr>
+          <a:xfrm>
+            <a:off x="457200" y="1414585"/>
+            <a:ext cx="3200400" cy="4890619"/>
+          </a:xfrm>
+        </p:spPr>
+        <p:txBody>
+          <a:bodyPr>
+            <a:normAutofit/>
+          </a:bodyPr>
+          <a:lstStyle/>
+          <a:p>
+            <a:pPr marL="457200" indent="-457200">
+              <a:buFont typeface="Wingdings" panose="05000000000000000000" pitchFamily="2" charset="2"/>
+              <a:buChar char="q"/>
+            </a:pPr>
+            <a:r>
+              <a:rPr lang="en-US" sz="2800" dirty="0" smtClean="0"/>
+              <a:t>Player start/end point</a:t>
+            </a:r>
+          </a:p>
+          <a:p>
+            <a:pPr marL="457200" indent="-457200">
+              <a:buFont typeface="Wingdings" panose="05000000000000000000" pitchFamily="2" charset="2"/>
+              <a:buChar char="q"/>
+            </a:pPr>
+            <a:r>
+              <a:rPr lang="en-US" sz="2800" dirty="0" smtClean="0"/>
+              <a:t>Enemy spawn locations</a:t>
+            </a:r>
+          </a:p>
+          <a:p>
+            <a:pPr marL="457200" indent="-457200">
+              <a:buFont typeface="Wingdings" panose="05000000000000000000" pitchFamily="2" charset="2"/>
+              <a:buChar char="q"/>
+            </a:pPr>
+            <a:r>
+              <a:rPr lang="en-US" sz="2800" dirty="0" smtClean="0"/>
+              <a:t>Obstacles</a:t>
+            </a:r>
+          </a:p>
+          <a:p>
+            <a:pPr marL="457200" indent="-457200">
+              <a:buFont typeface="Wingdings" panose="05000000000000000000" pitchFamily="2" charset="2"/>
+              <a:buChar char="q"/>
+            </a:pPr>
+            <a:r>
+              <a:rPr lang="en-US" sz="2800" dirty="0" smtClean="0"/>
+              <a:t>Different terrains</a:t>
+            </a:r>
+          </a:p>
+        </p:txBody>
+      </p:sp>
     </p:spTree>
     <p:extLst>
       <p:ext uri="{BB962C8B-B14F-4D97-AF65-F5344CB8AC3E}">
-        <p14:creationId xmlns:p14="http://schemas.microsoft.com/office/powerpoint/2010/main" val="204447137"/>
+        <p14:creationId xmlns:p14="http://schemas.microsoft.com/office/powerpoint/2010/main" val="2279057902"/>
       </p:ext>
     </p:extLst>
   </p:cSld>
@@ -5134,7 +5275,7 @@
           <a:p>
             <a:r>
               <a:rPr lang="en-US" dirty="0" smtClean="0"/>
-              <a:t>Main Features</a:t>
+              <a:t>Product Perspective</a:t>
             </a:r>
             <a:endParaRPr lang="en-US" dirty="0"/>
           </a:p>
@@ -5153,7 +5294,7 @@
         <p:spPr/>
         <p:txBody>
           <a:bodyPr>
-            <a:normAutofit lnSpcReduction="10000"/>
+            <a:normAutofit/>
           </a:bodyPr>
           <a:lstStyle/>
           <a:p>
@@ -5162,40 +5303,10 @@
               <a:buChar char="o"/>
             </a:pPr>
             <a:r>
-              <a:rPr lang="en-US" dirty="0" smtClean="0"/>
-              <a:t>Environment</a:t>
-            </a:r>
-          </a:p>
-          <a:p>
-            <a:pPr lvl="1">
-              <a:buFont typeface="Courier New" panose="02070309020205020404" pitchFamily="49" charset="0"/>
-              <a:buChar char="o"/>
-            </a:pPr>
-            <a:r>
-              <a:rPr lang="en-US" sz="2000" dirty="0" smtClean="0"/>
-              <a:t>Obstacles and puzzles</a:t>
-            </a:r>
-          </a:p>
-          <a:p>
-            <a:pPr lvl="1">
-              <a:buFont typeface="Courier New" panose="02070309020205020404" pitchFamily="49" charset="0"/>
-              <a:buChar char="o"/>
-            </a:pPr>
-            <a:r>
-              <a:rPr lang="en-US" sz="2000" dirty="0" smtClean="0"/>
-              <a:t>Island can be explored to find helpful items</a:t>
-            </a:r>
-          </a:p>
-          <a:p>
-            <a:pPr lvl="1">
-              <a:buFont typeface="Courier New" panose="02070309020205020404" pitchFamily="49" charset="0"/>
-              <a:buChar char="o"/>
-            </a:pPr>
-            <a:r>
-              <a:rPr lang="en-US" sz="2000" dirty="0" smtClean="0"/>
-              <a:t>Day &amp; night cycle with music</a:t>
-            </a:r>
-            <a:endParaRPr lang="en-US" sz="2000" dirty="0"/>
+              <a:rPr lang="en-US" sz="2800" dirty="0" smtClean="0"/>
+              <a:t>Standalone, offline video game for the PC.</a:t>
+            </a:r>
+            <a:endParaRPr lang="en-US" sz="2800" dirty="0"/>
           </a:p>
           <a:p>
             <a:pPr>
@@ -5203,40 +5314,9 @@
               <a:buChar char="o"/>
             </a:pPr>
             <a:r>
-              <a:rPr lang="en-US" dirty="0" smtClean="0"/>
-              <a:t>Characters</a:t>
-            </a:r>
-          </a:p>
-          <a:p>
-            <a:pPr lvl="1">
-              <a:buFont typeface="Courier New" panose="02070309020205020404" pitchFamily="49" charset="0"/>
-              <a:buChar char="o"/>
-            </a:pPr>
-            <a:r>
-              <a:rPr lang="en-US" sz="2000" dirty="0" smtClean="0"/>
-              <a:t>Player character</a:t>
-            </a:r>
-          </a:p>
-          <a:p>
-            <a:pPr lvl="1">
-              <a:buFont typeface="Courier New" panose="02070309020205020404" pitchFamily="49" charset="0"/>
-              <a:buChar char="o"/>
-            </a:pPr>
-            <a:r>
-              <a:rPr lang="en-US" sz="2000" dirty="0" smtClean="0"/>
-              <a:t>Friendly NPC</a:t>
-            </a:r>
-          </a:p>
-          <a:p>
-            <a:pPr lvl="1">
-              <a:buFont typeface="Courier New" panose="02070309020205020404" pitchFamily="49" charset="0"/>
-              <a:buChar char="o"/>
-            </a:pPr>
-            <a:r>
-              <a:rPr lang="en-US" sz="2000" dirty="0" smtClean="0"/>
-              <a:t>Enemy NPCs</a:t>
-            </a:r>
-            <a:endParaRPr lang="en-US" sz="2000" dirty="0"/>
+              <a:rPr lang="en-US" sz="2800" dirty="0" smtClean="0"/>
+              <a:t>Every player is different.</a:t>
+            </a:r>
           </a:p>
           <a:p>
             <a:pPr>
@@ -5244,33 +5324,10 @@
               <a:buChar char="o"/>
             </a:pPr>
             <a:r>
-              <a:rPr lang="en-US" dirty="0" smtClean="0"/>
-              <a:t>User Interface</a:t>
-            </a:r>
-          </a:p>
-          <a:p>
-            <a:pPr lvl="1">
-              <a:buFont typeface="Courier New" panose="02070309020205020404" pitchFamily="49" charset="0"/>
-              <a:buChar char="o"/>
-            </a:pPr>
-            <a:r>
-              <a:rPr lang="en-US" sz="2000" dirty="0" smtClean="0"/>
-              <a:t>Minimalist</a:t>
-            </a:r>
-          </a:p>
-          <a:p>
-            <a:pPr lvl="1">
-              <a:buFont typeface="Courier New" panose="02070309020205020404" pitchFamily="49" charset="0"/>
-              <a:buChar char="o"/>
-            </a:pPr>
-            <a:r>
-              <a:rPr lang="en-US" sz="2000" dirty="0" smtClean="0"/>
-              <a:t>In-game pause</a:t>
-            </a:r>
-            <a:endParaRPr lang="en-US" sz="2000" dirty="0"/>
-          </a:p>
-          <a:p>
-            <a:endParaRPr lang="en-US" dirty="0"/>
+              <a:rPr lang="en-US" sz="2800" dirty="0" smtClean="0"/>
+              <a:t>Demo guides players through basic fundamentals of gameplay</a:t>
+            </a:r>
+            <a:endParaRPr lang="en-US" sz="2800" dirty="0"/>
           </a:p>
         </p:txBody>
       </p:sp>
@@ -5296,8 +5353,8 @@
         </p:blipFill>
         <p:spPr>
           <a:xfrm>
-            <a:off x="7094540" y="1845734"/>
-            <a:ext cx="2979492" cy="4442896"/>
+            <a:off x="1813706" y="3579445"/>
+            <a:ext cx="2555094" cy="2747127"/>
           </a:xfrm>
           <a:prstGeom prst="roundRect">
             <a:avLst>
@@ -5317,10 +5374,40 @@
           </a:effectLst>
         </p:spPr>
       </p:pic>
+      <p:pic>
+        <p:nvPicPr>
+          <p:cNvPr id="6" name="Picture 5"/>
+          <p:cNvPicPr>
+            <a:picLocks noChangeAspect="1"/>
+          </p:cNvPicPr>
+          <p:nvPr/>
+        </p:nvPicPr>
+        <p:blipFill>
+          <a:blip r:embed="rId3">
+            <a:extLst>
+              <a:ext uri="{28A0092B-C50C-407E-A947-70E740481C1C}">
+                <a14:useLocalDpi xmlns:a14="http://schemas.microsoft.com/office/drawing/2010/main" val="0"/>
+              </a:ext>
+            </a:extLst>
+          </a:blip>
+          <a:stretch>
+            <a:fillRect/>
+          </a:stretch>
+        </p:blipFill>
+        <p:spPr>
+          <a:xfrm>
+            <a:off x="9801114" y="286603"/>
+            <a:ext cx="1288917" cy="1325638"/>
+          </a:xfrm>
+          <a:prstGeom prst="rect">
+            <a:avLst/>
+          </a:prstGeom>
+        </p:spPr>
+      </p:pic>
     </p:spTree>
     <p:extLst>
       <p:ext uri="{BB962C8B-B14F-4D97-AF65-F5344CB8AC3E}">
-        <p14:creationId xmlns:p14="http://schemas.microsoft.com/office/powerpoint/2010/main" val="399732649"/>
+        <p14:creationId xmlns:p14="http://schemas.microsoft.com/office/powerpoint/2010/main" val="204447137"/>
       </p:ext>
     </p:extLst>
   </p:cSld>
@@ -5371,45 +5458,206 @@
           <a:p>
             <a:r>
               <a:rPr lang="en-US" dirty="0" smtClean="0"/>
-              <a:t>Menu Screen</a:t>
-            </a:r>
+              <a:t>Main Features</a:t>
+            </a:r>
+            <a:endParaRPr lang="en-US" dirty="0"/>
+          </a:p>
+        </p:txBody>
+      </p:sp>
+      <p:sp>
+        <p:nvSpPr>
+          <p:cNvPr id="3" name="Content Placeholder 2"/>
+          <p:cNvSpPr>
+            <a:spLocks noGrp="1"/>
+          </p:cNvSpPr>
+          <p:nvPr>
+            <p:ph idx="1"/>
+          </p:nvPr>
+        </p:nvSpPr>
+        <p:spPr/>
+        <p:txBody>
+          <a:bodyPr>
+            <a:normAutofit lnSpcReduction="10000"/>
+          </a:bodyPr>
+          <a:lstStyle/>
+          <a:p>
+            <a:pPr>
+              <a:buFont typeface="Courier New" panose="02070309020205020404" pitchFamily="49" charset="0"/>
+              <a:buChar char="o"/>
+            </a:pPr>
+            <a:r>
+              <a:rPr lang="en-US" dirty="0" smtClean="0"/>
+              <a:t>Environment</a:t>
+            </a:r>
+          </a:p>
+          <a:p>
+            <a:pPr lvl="1">
+              <a:buFont typeface="Courier New" panose="02070309020205020404" pitchFamily="49" charset="0"/>
+              <a:buChar char="o"/>
+            </a:pPr>
+            <a:r>
+              <a:rPr lang="en-US" sz="2000" dirty="0" smtClean="0"/>
+              <a:t>Obstacles and puzzles</a:t>
+            </a:r>
+          </a:p>
+          <a:p>
+            <a:pPr lvl="1">
+              <a:buFont typeface="Courier New" panose="02070309020205020404" pitchFamily="49" charset="0"/>
+              <a:buChar char="o"/>
+            </a:pPr>
+            <a:r>
+              <a:rPr lang="en-US" sz="2000" dirty="0" smtClean="0"/>
+              <a:t>Island can be explored to find helpful items</a:t>
+            </a:r>
+          </a:p>
+          <a:p>
+            <a:pPr lvl="1">
+              <a:buFont typeface="Courier New" panose="02070309020205020404" pitchFamily="49" charset="0"/>
+              <a:buChar char="o"/>
+            </a:pPr>
+            <a:r>
+              <a:rPr lang="en-US" sz="2000" dirty="0" smtClean="0"/>
+              <a:t>Day &amp; night cycle with music</a:t>
+            </a:r>
+            <a:endParaRPr lang="en-US" sz="2000" dirty="0"/>
+          </a:p>
+          <a:p>
+            <a:pPr>
+              <a:buFont typeface="Courier New" panose="02070309020205020404" pitchFamily="49" charset="0"/>
+              <a:buChar char="o"/>
+            </a:pPr>
+            <a:r>
+              <a:rPr lang="en-US" dirty="0" smtClean="0"/>
+              <a:t>Characters</a:t>
+            </a:r>
+          </a:p>
+          <a:p>
+            <a:pPr lvl="1">
+              <a:buFont typeface="Courier New" panose="02070309020205020404" pitchFamily="49" charset="0"/>
+              <a:buChar char="o"/>
+            </a:pPr>
+            <a:r>
+              <a:rPr lang="en-US" sz="2000" dirty="0" smtClean="0"/>
+              <a:t>Player character</a:t>
+            </a:r>
+          </a:p>
+          <a:p>
+            <a:pPr lvl="1">
+              <a:buFont typeface="Courier New" panose="02070309020205020404" pitchFamily="49" charset="0"/>
+              <a:buChar char="o"/>
+            </a:pPr>
+            <a:r>
+              <a:rPr lang="en-US" sz="2000" dirty="0" smtClean="0"/>
+              <a:t>Friendly NPC</a:t>
+            </a:r>
+          </a:p>
+          <a:p>
+            <a:pPr lvl="1">
+              <a:buFont typeface="Courier New" panose="02070309020205020404" pitchFamily="49" charset="0"/>
+              <a:buChar char="o"/>
+            </a:pPr>
+            <a:r>
+              <a:rPr lang="en-US" sz="2000" dirty="0" smtClean="0"/>
+              <a:t>Enemy NPCs</a:t>
+            </a:r>
+            <a:endParaRPr lang="en-US" sz="2000" dirty="0"/>
+          </a:p>
+          <a:p>
+            <a:pPr>
+              <a:buFont typeface="Courier New" panose="02070309020205020404" pitchFamily="49" charset="0"/>
+              <a:buChar char="o"/>
+            </a:pPr>
+            <a:r>
+              <a:rPr lang="en-US" dirty="0" smtClean="0"/>
+              <a:t>User Interface</a:t>
+            </a:r>
+          </a:p>
+          <a:p>
+            <a:pPr lvl="1">
+              <a:buFont typeface="Courier New" panose="02070309020205020404" pitchFamily="49" charset="0"/>
+              <a:buChar char="o"/>
+            </a:pPr>
+            <a:r>
+              <a:rPr lang="en-US" sz="2000" dirty="0" smtClean="0"/>
+              <a:t>Minimalist</a:t>
+            </a:r>
+          </a:p>
+          <a:p>
+            <a:pPr lvl="1">
+              <a:buFont typeface="Courier New" panose="02070309020205020404" pitchFamily="49" charset="0"/>
+              <a:buChar char="o"/>
+            </a:pPr>
+            <a:r>
+              <a:rPr lang="en-US" sz="2000" dirty="0" smtClean="0"/>
+              <a:t>In-game pause</a:t>
+            </a:r>
+            <a:endParaRPr lang="en-US" sz="2000" dirty="0"/>
+          </a:p>
+          <a:p>
             <a:endParaRPr lang="en-US" dirty="0"/>
           </a:p>
         </p:txBody>
       </p:sp>
       <p:pic>
         <p:nvPicPr>
-          <p:cNvPr id="4" name="Picture 3"/>
+          <p:cNvPr id="5" name="Picture 4"/>
           <p:cNvPicPr>
             <a:picLocks noChangeAspect="1"/>
           </p:cNvPicPr>
           <p:nvPr/>
         </p:nvPicPr>
-        <p:blipFill rotWithShape="1">
-          <a:blip r:embed="rId2"/>
-          <a:srcRect l="278" t="14393" r="12222" b="8495"/>
-          <a:stretch/>
+        <p:blipFill>
+          <a:blip r:embed="rId2">
+            <a:extLst>
+              <a:ext uri="{28A0092B-C50C-407E-A947-70E740481C1C}">
+                <a14:useLocalDpi xmlns:a14="http://schemas.microsoft.com/office/drawing/2010/main" val="0"/>
+              </a:ext>
+            </a:extLst>
+          </a:blip>
+          <a:stretch>
+            <a:fillRect/>
+          </a:stretch>
         </p:blipFill>
         <p:spPr>
           <a:xfrm>
-            <a:off x="1676830" y="1845734"/>
-            <a:ext cx="8899300" cy="4409381"/>
-          </a:xfrm>
-          <a:prstGeom prst="rect">
-            <a:avLst/>
+            <a:off x="7094540" y="1845734"/>
+            <a:ext cx="2979492" cy="4442896"/>
+          </a:xfrm>
+          <a:prstGeom prst="roundRect">
+            <a:avLst>
+              <a:gd name="adj" fmla="val 8594"/>
+            </a:avLst>
           </a:prstGeom>
+          <a:solidFill>
+            <a:srgbClr val="FFFFFF">
+              <a:shade val="85000"/>
+            </a:srgbClr>
+          </a:solidFill>
+          <a:ln>
+            <a:noFill/>
+          </a:ln>
+          <a:effectLst>
+            <a:reflection blurRad="12700" stA="38000" endPos="28000" dist="5000" dir="5400000" sy="-100000" algn="bl" rotWithShape="0"/>
+          </a:effectLst>
         </p:spPr>
       </p:pic>
     </p:spTree>
     <p:extLst>
       <p:ext uri="{BB962C8B-B14F-4D97-AF65-F5344CB8AC3E}">
-        <p14:creationId xmlns:p14="http://schemas.microsoft.com/office/powerpoint/2010/main" val="1011527283"/>
+        <p14:creationId xmlns:p14="http://schemas.microsoft.com/office/powerpoint/2010/main" val="399732649"/>
       </p:ext>
     </p:extLst>
   </p:cSld>
   <p:clrMapOvr>
     <a:masterClrMapping/>
   </p:clrMapOvr>
+  <p:timing>
+    <p:tnLst>
+      <p:par>
+        <p:cTn id="1" dur="indefinite" restart="never" nodeType="tmRoot"/>
+      </p:par>
+    </p:tnLst>
+  </p:timing>
 </p:sld>
 </file>
 
@@ -5447,7 +5695,7 @@
           <a:p>
             <a:r>
               <a:rPr lang="en-US" dirty="0" smtClean="0"/>
-              <a:t>In-Game</a:t>
+              <a:t>Menu Screen</a:t>
             </a:r>
             <a:endParaRPr lang="en-US" dirty="0"/>
           </a:p>
@@ -5455,7 +5703,7 @@
       </p:sp>
       <p:pic>
         <p:nvPicPr>
-          <p:cNvPr id="6" name="Picture 5"/>
+          <p:cNvPr id="4" name="Picture 3"/>
           <p:cNvPicPr>
             <a:picLocks noChangeAspect="1"/>
           </p:cNvPicPr>
@@ -5463,13 +5711,13 @@
         </p:nvPicPr>
         <p:blipFill rotWithShape="1">
           <a:blip r:embed="rId2"/>
-          <a:srcRect l="376" t="14392" r="838" b="8319"/>
+          <a:srcRect l="278" t="14393" r="12222" b="8495"/>
           <a:stretch/>
         </p:blipFill>
         <p:spPr>
           <a:xfrm>
-            <a:off x="1149192" y="1880316"/>
-            <a:ext cx="9954576" cy="4378816"/>
+            <a:off x="1676830" y="1845734"/>
+            <a:ext cx="8899300" cy="4409381"/>
           </a:xfrm>
           <a:prstGeom prst="rect">
             <a:avLst/>
@@ -5479,7 +5727,7 @@
     </p:spTree>
     <p:extLst>
       <p:ext uri="{BB962C8B-B14F-4D97-AF65-F5344CB8AC3E}">
-        <p14:creationId xmlns:p14="http://schemas.microsoft.com/office/powerpoint/2010/main" val="2017368839"/>
+        <p14:creationId xmlns:p14="http://schemas.microsoft.com/office/powerpoint/2010/main" val="1011527283"/>
       </p:ext>
     </p:extLst>
   </p:cSld>
@@ -5523,6 +5771,82 @@
           <a:p>
             <a:r>
               <a:rPr lang="en-US" dirty="0" smtClean="0"/>
+              <a:t>In-Game</a:t>
+            </a:r>
+            <a:endParaRPr lang="en-US" dirty="0"/>
+          </a:p>
+        </p:txBody>
+      </p:sp>
+      <p:pic>
+        <p:nvPicPr>
+          <p:cNvPr id="6" name="Picture 5"/>
+          <p:cNvPicPr>
+            <a:picLocks noChangeAspect="1"/>
+          </p:cNvPicPr>
+          <p:nvPr/>
+        </p:nvPicPr>
+        <p:blipFill rotWithShape="1">
+          <a:blip r:embed="rId2"/>
+          <a:srcRect l="376" t="14392" r="838" b="8319"/>
+          <a:stretch/>
+        </p:blipFill>
+        <p:spPr>
+          <a:xfrm>
+            <a:off x="1149192" y="1880316"/>
+            <a:ext cx="9954576" cy="4378816"/>
+          </a:xfrm>
+          <a:prstGeom prst="rect">
+            <a:avLst/>
+          </a:prstGeom>
+        </p:spPr>
+      </p:pic>
+    </p:spTree>
+    <p:extLst>
+      <p:ext uri="{BB962C8B-B14F-4D97-AF65-F5344CB8AC3E}">
+        <p14:creationId xmlns:p14="http://schemas.microsoft.com/office/powerpoint/2010/main" val="2017368839"/>
+      </p:ext>
+    </p:extLst>
+  </p:cSld>
+  <p:clrMapOvr>
+    <a:masterClrMapping/>
+  </p:clrMapOvr>
+</p:sld>
+</file>
+
+<file path=ppt/slides/slide8.xml><?xml version="1.0" encoding="utf-8"?>
+<p:sld xmlns:a="http://schemas.openxmlformats.org/drawingml/2006/main" xmlns:r="http://schemas.openxmlformats.org/officeDocument/2006/relationships" xmlns:p="http://schemas.openxmlformats.org/presentationml/2006/main">
+  <p:cSld>
+    <p:spTree>
+      <p:nvGrpSpPr>
+        <p:cNvPr id="1" name=""/>
+        <p:cNvGrpSpPr/>
+        <p:nvPr/>
+      </p:nvGrpSpPr>
+      <p:grpSpPr>
+        <a:xfrm>
+          <a:off x="0" y="0"/>
+          <a:ext cx="0" cy="0"/>
+          <a:chOff x="0" y="0"/>
+          <a:chExt cx="0" cy="0"/>
+        </a:xfrm>
+      </p:grpSpPr>
+      <p:sp>
+        <p:nvSpPr>
+          <p:cNvPr id="2" name="Title 1"/>
+          <p:cNvSpPr>
+            <a:spLocks noGrp="1"/>
+          </p:cNvSpPr>
+          <p:nvPr>
+            <p:ph type="title"/>
+          </p:nvPr>
+        </p:nvSpPr>
+        <p:spPr/>
+        <p:txBody>
+          <a:bodyPr/>
+          <a:lstStyle/>
+          <a:p>
+            <a:r>
+              <a:rPr lang="en-US" dirty="0" smtClean="0"/>
               <a:t>In-Game Menu</a:t>
             </a:r>
             <a:endParaRPr lang="en-US" dirty="0"/>
@@ -5565,7 +5889,7 @@
 </p:sld>
 </file>
 
-<file path=ppt/slides/slide8.xml><?xml version="1.0" encoding="utf-8"?>
+<file path=ppt/slides/slide9.xml><?xml version="1.0" encoding="utf-8"?>
 <p:sld xmlns:a="http://schemas.openxmlformats.org/drawingml/2006/main" xmlns:r="http://schemas.openxmlformats.org/officeDocument/2006/relationships" xmlns:p="http://schemas.openxmlformats.org/presentationml/2006/main">
   <p:cSld>
     <p:spTree>
@@ -5781,330 +6105,6 @@
     <p:extLst>
       <p:ext uri="{BB962C8B-B14F-4D97-AF65-F5344CB8AC3E}">
         <p14:creationId xmlns:p14="http://schemas.microsoft.com/office/powerpoint/2010/main" val="3925709861"/>
-      </p:ext>
-    </p:extLst>
-  </p:cSld>
-  <p:clrMapOvr>
-    <a:masterClrMapping/>
-  </p:clrMapOvr>
-  <p:timing>
-    <p:tnLst>
-      <p:par>
-        <p:cTn id="1" dur="indefinite" restart="never" nodeType="tmRoot"/>
-      </p:par>
-    </p:tnLst>
-  </p:timing>
-</p:sld>
-</file>
-
-<file path=ppt/slides/slide9.xml><?xml version="1.0" encoding="utf-8"?>
-<p:sld xmlns:a="http://schemas.openxmlformats.org/drawingml/2006/main" xmlns:r="http://schemas.openxmlformats.org/officeDocument/2006/relationships" xmlns:p="http://schemas.openxmlformats.org/presentationml/2006/main">
-  <p:cSld>
-    <p:spTree>
-      <p:nvGrpSpPr>
-        <p:cNvPr id="1" name=""/>
-        <p:cNvGrpSpPr/>
-        <p:nvPr/>
-      </p:nvGrpSpPr>
-      <p:grpSpPr>
-        <a:xfrm>
-          <a:off x="0" y="0"/>
-          <a:ext cx="0" cy="0"/>
-          <a:chOff x="0" y="0"/>
-          <a:chExt cx="0" cy="0"/>
-        </a:xfrm>
-      </p:grpSpPr>
-      <p:sp>
-        <p:nvSpPr>
-          <p:cNvPr id="2" name="Title 1"/>
-          <p:cNvSpPr>
-            <a:spLocks noGrp="1"/>
-          </p:cNvSpPr>
-          <p:nvPr>
-            <p:ph type="title"/>
-          </p:nvPr>
-        </p:nvSpPr>
-        <p:spPr/>
-        <p:txBody>
-          <a:bodyPr/>
-          <a:lstStyle/>
-          <a:p>
-            <a:r>
-              <a:rPr lang="en-US" dirty="0" smtClean="0"/>
-              <a:t>Constraints</a:t>
-            </a:r>
-            <a:endParaRPr lang="en-US" dirty="0"/>
-          </a:p>
-        </p:txBody>
-      </p:sp>
-      <p:sp>
-        <p:nvSpPr>
-          <p:cNvPr id="3" name="Content Placeholder 2"/>
-          <p:cNvSpPr>
-            <a:spLocks noGrp="1"/>
-          </p:cNvSpPr>
-          <p:nvPr>
-            <p:ph idx="1"/>
-          </p:nvPr>
-        </p:nvSpPr>
-        <p:spPr/>
-        <p:txBody>
-          <a:bodyPr/>
-          <a:lstStyle/>
-          <a:p>
-            <a:pPr>
-              <a:buFont typeface="Courier New" panose="02070309020205020404" pitchFamily="49" charset="0"/>
-              <a:buChar char="o"/>
-            </a:pPr>
-            <a:r>
-              <a:rPr lang="en-US" sz="2800" dirty="0" smtClean="0"/>
-              <a:t>Business Constraints</a:t>
-            </a:r>
-            <a:endParaRPr lang="en-US" sz="2800" dirty="0"/>
-          </a:p>
-          <a:p>
-            <a:pPr lvl="1">
-              <a:buFont typeface="Courier New" panose="02070309020205020404" pitchFamily="49" charset="0"/>
-              <a:buChar char="o"/>
-            </a:pPr>
-            <a:r>
-              <a:rPr lang="en-US" sz="2800" dirty="0" smtClean="0"/>
-              <a:t>$500 budget</a:t>
-            </a:r>
-            <a:endParaRPr lang="en-US" sz="2800" dirty="0"/>
-          </a:p>
-          <a:p>
-            <a:pPr lvl="1">
-              <a:buFont typeface="Courier New" panose="02070309020205020404" pitchFamily="49" charset="0"/>
-              <a:buChar char="o"/>
-            </a:pPr>
-            <a:r>
-              <a:rPr lang="en-US" sz="2800" dirty="0" smtClean="0"/>
-              <a:t>English only </a:t>
-            </a:r>
-          </a:p>
-          <a:p>
-            <a:pPr>
-              <a:buFont typeface="Courier New" panose="02070309020205020404" pitchFamily="49" charset="0"/>
-              <a:buChar char="o"/>
-            </a:pPr>
-            <a:r>
-              <a:rPr lang="en-US" sz="2800" dirty="0" smtClean="0"/>
-              <a:t>Technical Constraints</a:t>
-            </a:r>
-          </a:p>
-          <a:p>
-            <a:pPr lvl="1">
-              <a:buFont typeface="Courier New" panose="02070309020205020404" pitchFamily="49" charset="0"/>
-              <a:buChar char="o"/>
-            </a:pPr>
-            <a:r>
-              <a:rPr lang="en-US" sz="2800" dirty="0" smtClean="0"/>
-              <a:t>Windows 7 and 8 support</a:t>
-            </a:r>
-          </a:p>
-          <a:p>
-            <a:pPr lvl="1">
-              <a:buFont typeface="Courier New" panose="02070309020205020404" pitchFamily="49" charset="0"/>
-              <a:buChar char="o"/>
-            </a:pPr>
-            <a:r>
-              <a:rPr lang="en-US" sz="2800" dirty="0" smtClean="0"/>
-              <a:t>20 FPS with minimum requirements</a:t>
-            </a:r>
-          </a:p>
-          <a:p>
-            <a:pPr lvl="1">
-              <a:buFont typeface="Courier New" panose="02070309020205020404" pitchFamily="49" charset="0"/>
-              <a:buChar char="o"/>
-            </a:pPr>
-            <a:r>
-              <a:rPr lang="en-US" sz="2800" dirty="0" smtClean="0"/>
-              <a:t>Unity Engine</a:t>
-            </a:r>
-            <a:endParaRPr lang="en-US" sz="2800" dirty="0"/>
-          </a:p>
-          <a:p>
-            <a:endParaRPr lang="en-US" dirty="0"/>
-          </a:p>
-        </p:txBody>
-      </p:sp>
-      <p:sp>
-        <p:nvSpPr>
-          <p:cNvPr id="4" name="Rectangle 3"/>
-          <p:cNvSpPr/>
-          <p:nvPr/>
-        </p:nvSpPr>
-        <p:spPr>
-          <a:xfrm>
-            <a:off x="7065107" y="2211754"/>
-            <a:ext cx="1578708" cy="1219200"/>
-          </a:xfrm>
-          <a:prstGeom prst="rect">
-            <a:avLst/>
-          </a:prstGeom>
-          <a:solidFill>
-            <a:srgbClr val="C00000"/>
-          </a:solidFill>
-        </p:spPr>
-        <p:style>
-          <a:lnRef idx="2">
-            <a:schemeClr val="accent1">
-              <a:shade val="50000"/>
-            </a:schemeClr>
-          </a:lnRef>
-          <a:fillRef idx="1">
-            <a:schemeClr val="accent1"/>
-          </a:fillRef>
-          <a:effectRef idx="0">
-            <a:schemeClr val="accent1"/>
-          </a:effectRef>
-          <a:fontRef idx="minor">
-            <a:schemeClr val="lt1"/>
-          </a:fontRef>
-        </p:style>
-        <p:txBody>
-          <a:bodyPr rtlCol="0" anchor="ctr"/>
-          <a:lstStyle/>
-          <a:p>
-            <a:pPr algn="ctr"/>
-            <a:endParaRPr lang="en-US"/>
-          </a:p>
-        </p:txBody>
-      </p:sp>
-      <p:sp>
-        <p:nvSpPr>
-          <p:cNvPr id="5" name="Rectangle 4"/>
-          <p:cNvSpPr/>
-          <p:nvPr/>
-        </p:nvSpPr>
-        <p:spPr>
-          <a:xfrm>
-            <a:off x="8879840" y="2211754"/>
-            <a:ext cx="1547446" cy="1219200"/>
-          </a:xfrm>
-          <a:prstGeom prst="rect">
-            <a:avLst/>
-          </a:prstGeom>
-          <a:solidFill>
-            <a:srgbClr val="92D050"/>
-          </a:solidFill>
-        </p:spPr>
-        <p:style>
-          <a:lnRef idx="2">
-            <a:schemeClr val="accent1">
-              <a:shade val="50000"/>
-            </a:schemeClr>
-          </a:lnRef>
-          <a:fillRef idx="1">
-            <a:schemeClr val="accent1"/>
-          </a:fillRef>
-          <a:effectRef idx="0">
-            <a:schemeClr val="accent1"/>
-          </a:effectRef>
-          <a:fontRef idx="minor">
-            <a:schemeClr val="lt1"/>
-          </a:fontRef>
-        </p:style>
-        <p:txBody>
-          <a:bodyPr rtlCol="0" anchor="ctr"/>
-          <a:lstStyle/>
-          <a:p>
-            <a:pPr algn="ctr"/>
-            <a:endParaRPr lang="en-US"/>
-          </a:p>
-        </p:txBody>
-      </p:sp>
-      <p:sp>
-        <p:nvSpPr>
-          <p:cNvPr id="6" name="Rectangle 5"/>
-          <p:cNvSpPr/>
-          <p:nvPr/>
-        </p:nvSpPr>
-        <p:spPr>
-          <a:xfrm>
-            <a:off x="7065107" y="3539328"/>
-            <a:ext cx="1578708" cy="1141046"/>
-          </a:xfrm>
-          <a:prstGeom prst="rect">
-            <a:avLst/>
-          </a:prstGeom>
-          <a:solidFill>
-            <a:srgbClr val="00B0F0"/>
-          </a:solidFill>
-        </p:spPr>
-        <p:style>
-          <a:lnRef idx="2">
-            <a:schemeClr val="accent1">
-              <a:shade val="50000"/>
-            </a:schemeClr>
-          </a:lnRef>
-          <a:fillRef idx="1">
-            <a:schemeClr val="accent1"/>
-          </a:fillRef>
-          <a:effectRef idx="0">
-            <a:schemeClr val="accent1"/>
-          </a:effectRef>
-          <a:fontRef idx="minor">
-            <a:schemeClr val="lt1"/>
-          </a:fontRef>
-        </p:style>
-        <p:txBody>
-          <a:bodyPr rtlCol="0" anchor="ctr"/>
-          <a:lstStyle/>
-          <a:p>
-            <a:pPr algn="ctr"/>
-            <a:endParaRPr lang="en-US"/>
-          </a:p>
-        </p:txBody>
-      </p:sp>
-      <p:sp>
-        <p:nvSpPr>
-          <p:cNvPr id="7" name="Rectangle 6"/>
-          <p:cNvSpPr/>
-          <p:nvPr/>
-        </p:nvSpPr>
-        <p:spPr>
-          <a:xfrm>
-            <a:off x="8879840" y="3539328"/>
-            <a:ext cx="1547446" cy="1141046"/>
-          </a:xfrm>
-          <a:prstGeom prst="rect">
-            <a:avLst/>
-          </a:prstGeom>
-          <a:solidFill>
-            <a:srgbClr val="FFFF00"/>
-          </a:solidFill>
-        </p:spPr>
-        <p:style>
-          <a:lnRef idx="2">
-            <a:schemeClr val="accent1">
-              <a:shade val="50000"/>
-            </a:schemeClr>
-          </a:lnRef>
-          <a:fillRef idx="1">
-            <a:schemeClr val="accent1"/>
-          </a:fillRef>
-          <a:effectRef idx="0">
-            <a:schemeClr val="accent1"/>
-          </a:effectRef>
-          <a:fontRef idx="minor">
-            <a:schemeClr val="lt1"/>
-          </a:fontRef>
-        </p:style>
-        <p:txBody>
-          <a:bodyPr rtlCol="0" anchor="ctr"/>
-          <a:lstStyle/>
-          <a:p>
-            <a:pPr algn="ctr"/>
-            <a:endParaRPr lang="en-US"/>
-          </a:p>
-        </p:txBody>
-      </p:sp>
-    </p:spTree>
-    <p:extLst>
-      <p:ext uri="{BB962C8B-B14F-4D97-AF65-F5344CB8AC3E}">
-        <p14:creationId xmlns:p14="http://schemas.microsoft.com/office/powerpoint/2010/main" val="2528391778"/>
       </p:ext>
     </p:extLst>
   </p:cSld>

</xml_diff>